<commit_message>
add some notes to pptx about data downloading and pinecone
</commit_message>
<xml_diff>
--- a/project/docs/Milestone-meeting_slides.pptx
+++ b/project/docs/Milestone-meeting_slides.pptx
@@ -5960,7 +5960,7 @@
           <a:p>
             <a:fld id="{880CDB83-6F76-9545-B287-0ADA9B398D67}" type="slidenum">
               <a:rPr lang="it-IT" smtClean="0"/>
-              <a:t>‹Nr.›</a:t>
+              <a:t>‹#›</a:t>
             </a:fld>
             <a:endParaRPr lang="it-IT"/>
           </a:p>
@@ -9704,7 +9704,7 @@
           <a:p>
             <a:fld id="{C54E6C4E-D06C-4D41-BB81-A1DAC100CD54}" type="slidenum">
               <a:rPr lang="it-IT" smtClean="0"/>
-              <a:t>‹Nr.›</a:t>
+              <a:t>‹#›</a:t>
             </a:fld>
             <a:endParaRPr lang="it-IT"/>
           </a:p>
@@ -9912,7 +9912,7 @@
           <a:p>
             <a:fld id="{C54E6C4E-D06C-4D41-BB81-A1DAC100CD54}" type="slidenum">
               <a:rPr lang="it-IT" smtClean="0"/>
-              <a:t>‹Nr.›</a:t>
+              <a:t>‹#›</a:t>
             </a:fld>
             <a:endParaRPr lang="it-IT"/>
           </a:p>
@@ -10168,7 +10168,7 @@
           <a:p>
             <a:fld id="{C54E6C4E-D06C-4D41-BB81-A1DAC100CD54}" type="slidenum">
               <a:rPr lang="it-IT" smtClean="0"/>
-              <a:t>‹Nr.›</a:t>
+              <a:t>‹#›</a:t>
             </a:fld>
             <a:endParaRPr lang="it-IT"/>
           </a:p>
@@ -10338,7 +10338,7 @@
           <a:p>
             <a:fld id="{C54E6C4E-D06C-4D41-BB81-A1DAC100CD54}" type="slidenum">
               <a:rPr lang="it-IT" smtClean="0"/>
-              <a:t>‹Nr.›</a:t>
+              <a:t>‹#›</a:t>
             </a:fld>
             <a:endParaRPr lang="it-IT"/>
           </a:p>
@@ -10681,7 +10681,7 @@
           <a:p>
             <a:fld id="{C54E6C4E-D06C-4D41-BB81-A1DAC100CD54}" type="slidenum">
               <a:rPr lang="it-IT" smtClean="0"/>
-              <a:t>‹Nr.›</a:t>
+              <a:t>‹#›</a:t>
             </a:fld>
             <a:endParaRPr lang="it-IT"/>
           </a:p>
@@ -10956,7 +10956,7 @@
           <a:p>
             <a:fld id="{C54E6C4E-D06C-4D41-BB81-A1DAC100CD54}" type="slidenum">
               <a:rPr lang="it-IT" smtClean="0"/>
-              <a:t>‹Nr.›</a:t>
+              <a:t>‹#›</a:t>
             </a:fld>
             <a:endParaRPr lang="it-IT"/>
           </a:p>
@@ -11335,7 +11335,7 @@
           <a:p>
             <a:fld id="{C54E6C4E-D06C-4D41-BB81-A1DAC100CD54}" type="slidenum">
               <a:rPr lang="it-IT" smtClean="0"/>
-              <a:t>‹Nr.›</a:t>
+              <a:t>‹#›</a:t>
             </a:fld>
             <a:endParaRPr lang="it-IT"/>
           </a:p>
@@ -11453,7 +11453,7 @@
           <a:p>
             <a:fld id="{C54E6C4E-D06C-4D41-BB81-A1DAC100CD54}" type="slidenum">
               <a:rPr lang="it-IT" smtClean="0"/>
-              <a:t>‹Nr.›</a:t>
+              <a:t>‹#›</a:t>
             </a:fld>
             <a:endParaRPr lang="it-IT"/>
           </a:p>
@@ -11632,7 +11632,7 @@
           <a:p>
             <a:fld id="{C54E6C4E-D06C-4D41-BB81-A1DAC100CD54}" type="slidenum">
               <a:rPr lang="it-IT" smtClean="0"/>
-              <a:t>‹Nr.›</a:t>
+              <a:t>‹#›</a:t>
             </a:fld>
             <a:endParaRPr lang="it-IT"/>
           </a:p>
@@ -11999,7 +11999,7 @@
           <a:p>
             <a:fld id="{C54E6C4E-D06C-4D41-BB81-A1DAC100CD54}" type="slidenum">
               <a:rPr lang="it-IT" smtClean="0"/>
-              <a:t>‹Nr.›</a:t>
+              <a:t>‹#›</a:t>
             </a:fld>
             <a:endParaRPr lang="it-IT"/>
           </a:p>
@@ -12355,7 +12355,7 @@
           <a:p>
             <a:fld id="{C54E6C4E-D06C-4D41-BB81-A1DAC100CD54}" type="slidenum">
               <a:rPr lang="it-IT" smtClean="0"/>
-              <a:t>‹Nr.›</a:t>
+              <a:t>‹#›</a:t>
             </a:fld>
             <a:endParaRPr lang="it-IT"/>
           </a:p>
@@ -12674,7 +12674,7 @@
           <a:p>
             <a:fld id="{C54E6C4E-D06C-4D41-BB81-A1DAC100CD54}" type="slidenum">
               <a:rPr lang="it-IT" smtClean="0"/>
-              <a:t>‹Nr.›</a:t>
+              <a:t>‹#›</a:t>
             </a:fld>
             <a:endParaRPr lang="it-IT"/>
           </a:p>
@@ -13829,6 +13829,152 @@
           </a:p>
         </p:txBody>
       </p:sp>
+      <p:sp>
+        <p:nvSpPr>
+          <p:cNvPr id="3" name="TextBox 2">
+            <a:extLst>
+              <a:ext uri="{FF2B5EF4-FFF2-40B4-BE49-F238E27FC236}">
+                <a16:creationId xmlns:a16="http://schemas.microsoft.com/office/drawing/2014/main" id="{AEABEB8D-9703-6182-6051-8251D74D324F}"/>
+              </a:ext>
+            </a:extLst>
+          </p:cNvPr>
+          <p:cNvSpPr txBox="1"/>
+          <p:nvPr/>
+        </p:nvSpPr>
+        <p:spPr>
+          <a:xfrm>
+            <a:off x="4222035" y="1469559"/>
+            <a:ext cx="6274676" cy="1477328"/>
+          </a:xfrm>
+          <a:prstGeom prst="rect">
+            <a:avLst/>
+          </a:prstGeom>
+          <a:noFill/>
+        </p:spPr>
+        <p:txBody>
+          <a:bodyPr wrap="square">
+            <a:spAutoFit/>
+          </a:bodyPr>
+          <a:lstStyle/>
+          <a:p>
+            <a:pPr marL="285750" indent="-285750" algn="l">
+              <a:buFont typeface="Arial" panose="020B0604020202020204" pitchFamily="34" charset="0"/>
+              <a:buChar char="•"/>
+            </a:pPr>
+            <a:r>
+              <a:rPr lang="en-GB" dirty="0">
+                <a:solidFill>
+                  <a:schemeClr val="accent2"/>
+                </a:solidFill>
+                <a:latin typeface="Amiri" panose="00000500000000000000" pitchFamily="2" charset="-78"/>
+                <a:ea typeface="Amiri" panose="00000500000000000000" pitchFamily="2" charset="-78"/>
+                <a:cs typeface="Amiri" panose="00000500000000000000" pitchFamily="2" charset="-78"/>
+              </a:rPr>
+              <a:t>Create a free pinecone account</a:t>
+            </a:r>
+          </a:p>
+          <a:p>
+            <a:pPr marL="285750" indent="-285750" algn="l">
+              <a:buFont typeface="Arial" panose="020B0604020202020204" pitchFamily="34" charset="0"/>
+              <a:buChar char="•"/>
+            </a:pPr>
+            <a:r>
+              <a:rPr lang="en-GB" dirty="0">
+                <a:solidFill>
+                  <a:schemeClr val="accent2"/>
+                </a:solidFill>
+                <a:latin typeface="Amiri" panose="00000500000000000000" pitchFamily="2" charset="-78"/>
+                <a:ea typeface="Amiri" panose="00000500000000000000" pitchFamily="2" charset="-78"/>
+                <a:cs typeface="Amiri" panose="00000500000000000000" pitchFamily="2" charset="-78"/>
+              </a:rPr>
+              <a:t>Write a ‘</a:t>
+            </a:r>
+            <a:r>
+              <a:rPr lang="en-GB" dirty="0" err="1">
+                <a:solidFill>
+                  <a:schemeClr val="accent2"/>
+                </a:solidFill>
+                <a:latin typeface="Amiri" panose="00000500000000000000" pitchFamily="2" charset="-78"/>
+                <a:ea typeface="Amiri" panose="00000500000000000000" pitchFamily="2" charset="-78"/>
+                <a:cs typeface="Amiri" panose="00000500000000000000" pitchFamily="2" charset="-78"/>
+              </a:rPr>
+              <a:t>PineconeHandler</a:t>
+            </a:r>
+            <a:r>
+              <a:rPr lang="en-GB" dirty="0">
+                <a:solidFill>
+                  <a:schemeClr val="accent2"/>
+                </a:solidFill>
+                <a:latin typeface="Amiri" panose="00000500000000000000" pitchFamily="2" charset="-78"/>
+                <a:ea typeface="Amiri" panose="00000500000000000000" pitchFamily="2" charset="-78"/>
+                <a:cs typeface="Amiri" panose="00000500000000000000" pitchFamily="2" charset="-78"/>
+              </a:rPr>
+              <a:t>’ class for various operations within Pinecone</a:t>
+            </a:r>
+          </a:p>
+          <a:p>
+            <a:pPr marL="285750" indent="-285750" algn="l">
+              <a:buFont typeface="Arial" panose="020B0604020202020204" pitchFamily="34" charset="0"/>
+              <a:buChar char="•"/>
+            </a:pPr>
+            <a:r>
+              <a:rPr lang="en-GB" dirty="0">
+                <a:solidFill>
+                  <a:schemeClr val="accent2"/>
+                </a:solidFill>
+                <a:latin typeface="Amiri" panose="00000500000000000000" pitchFamily="2" charset="-78"/>
+                <a:ea typeface="Amiri" panose="00000500000000000000" pitchFamily="2" charset="-78"/>
+                <a:cs typeface="Amiri" panose="00000500000000000000" pitchFamily="2" charset="-78"/>
+              </a:rPr>
+              <a:t>Write an ‘</a:t>
+            </a:r>
+            <a:r>
+              <a:rPr lang="en-GB" dirty="0" err="1">
+                <a:solidFill>
+                  <a:schemeClr val="accent2"/>
+                </a:solidFill>
+                <a:latin typeface="Amiri" panose="00000500000000000000" pitchFamily="2" charset="-78"/>
+                <a:ea typeface="Amiri" panose="00000500000000000000" pitchFamily="2" charset="-78"/>
+                <a:cs typeface="Amiri" panose="00000500000000000000" pitchFamily="2" charset="-78"/>
+              </a:rPr>
+              <a:t>upload_embeddings</a:t>
+            </a:r>
+            <a:r>
+              <a:rPr lang="en-GB" dirty="0">
+                <a:solidFill>
+                  <a:schemeClr val="accent2"/>
+                </a:solidFill>
+                <a:latin typeface="Amiri" panose="00000500000000000000" pitchFamily="2" charset="-78"/>
+                <a:ea typeface="Amiri" panose="00000500000000000000" pitchFamily="2" charset="-78"/>
+                <a:cs typeface="Amiri" panose="00000500000000000000" pitchFamily="2" charset="-78"/>
+              </a:rPr>
+              <a:t>’ notebook to </a:t>
+            </a:r>
+            <a:r>
+              <a:rPr lang="en-GB" dirty="0" err="1">
+                <a:solidFill>
+                  <a:schemeClr val="accent2"/>
+                </a:solidFill>
+                <a:latin typeface="Amiri" panose="00000500000000000000" pitchFamily="2" charset="-78"/>
+                <a:ea typeface="Amiri" panose="00000500000000000000" pitchFamily="2" charset="-78"/>
+                <a:cs typeface="Amiri" panose="00000500000000000000" pitchFamily="2" charset="-78"/>
+              </a:rPr>
+              <a:t>upsert</a:t>
+            </a:r>
+            <a:r>
+              <a:rPr lang="en-GB" dirty="0">
+                <a:solidFill>
+                  <a:schemeClr val="accent2"/>
+                </a:solidFill>
+                <a:latin typeface="Amiri" panose="00000500000000000000" pitchFamily="2" charset="-78"/>
+                <a:ea typeface="Amiri" panose="00000500000000000000" pitchFamily="2" charset="-78"/>
+                <a:cs typeface="Amiri" panose="00000500000000000000" pitchFamily="2" charset="-78"/>
+              </a:rPr>
+              <a:t> embeddings into pinecone</a:t>
+            </a:r>
+          </a:p>
+        </p:txBody>
+      </p:sp>
     </p:spTree>
     <p:extLst>
       <p:ext uri="{BB962C8B-B14F-4D97-AF65-F5344CB8AC3E}">
@@ -15405,7 +15551,7 @@
                 </a:solidFill>
                 <a:cs typeface="Amiri"/>
               </a:rPr>
-              <a:t>Download through Python script</a:t>
+              <a:t>Download Data via Python script</a:t>
             </a:r>
           </a:p>
         </p:txBody>
@@ -15491,6 +15637,108 @@
               <a:ea typeface="Amiri" panose="00000500000000000000" pitchFamily="2" charset="-78"/>
               <a:cs typeface="Amiri" panose="00000500000000000000" pitchFamily="2" charset="-78"/>
             </a:endParaRPr>
+          </a:p>
+        </p:txBody>
+      </p:sp>
+      <p:sp>
+        <p:nvSpPr>
+          <p:cNvPr id="2" name="TextBox 1">
+            <a:extLst>
+              <a:ext uri="{FF2B5EF4-FFF2-40B4-BE49-F238E27FC236}">
+                <a16:creationId xmlns:a16="http://schemas.microsoft.com/office/drawing/2014/main" id="{AD6DA1AD-CF0A-844D-FE1E-B3E9B28F5B52}"/>
+              </a:ext>
+            </a:extLst>
+          </p:cNvPr>
+          <p:cNvSpPr txBox="1"/>
+          <p:nvPr/>
+        </p:nvSpPr>
+        <p:spPr>
+          <a:xfrm>
+            <a:off x="1192924" y="1347639"/>
+            <a:ext cx="6274676" cy="1200329"/>
+          </a:xfrm>
+          <a:prstGeom prst="rect">
+            <a:avLst/>
+          </a:prstGeom>
+          <a:noFill/>
+        </p:spPr>
+        <p:txBody>
+          <a:bodyPr wrap="square">
+            <a:spAutoFit/>
+          </a:bodyPr>
+          <a:lstStyle/>
+          <a:p>
+            <a:pPr marL="285750" indent="-285750" algn="l">
+              <a:buFont typeface="Arial" panose="020B0604020202020204" pitchFamily="34" charset="0"/>
+              <a:buChar char="•"/>
+            </a:pPr>
+            <a:r>
+              <a:rPr lang="en-GB" dirty="0">
+                <a:solidFill>
+                  <a:schemeClr val="accent2"/>
+                </a:solidFill>
+                <a:latin typeface="Amiri" panose="00000500000000000000" pitchFamily="2" charset="-78"/>
+                <a:ea typeface="Amiri" panose="00000500000000000000" pitchFamily="2" charset="-78"/>
+                <a:cs typeface="Amiri" panose="00000500000000000000" pitchFamily="2" charset="-78"/>
+              </a:rPr>
+              <a:t>Utilize the ‘</a:t>
+            </a:r>
+            <a:r>
+              <a:rPr lang="en-GB" dirty="0" err="1">
+                <a:solidFill>
+                  <a:schemeClr val="accent2"/>
+                </a:solidFill>
+                <a:latin typeface="Amiri" panose="00000500000000000000" pitchFamily="2" charset="-78"/>
+                <a:ea typeface="Amiri" panose="00000500000000000000" pitchFamily="2" charset="-78"/>
+                <a:cs typeface="Amiri" panose="00000500000000000000" pitchFamily="2" charset="-78"/>
+              </a:rPr>
+              <a:t>Bio.Entrez</a:t>
+            </a:r>
+            <a:r>
+              <a:rPr lang="en-GB" dirty="0">
+                <a:solidFill>
+                  <a:schemeClr val="accent2"/>
+                </a:solidFill>
+                <a:latin typeface="Amiri" panose="00000500000000000000" pitchFamily="2" charset="-78"/>
+                <a:ea typeface="Amiri" panose="00000500000000000000" pitchFamily="2" charset="-78"/>
+                <a:cs typeface="Amiri" panose="00000500000000000000" pitchFamily="2" charset="-78"/>
+              </a:rPr>
+              <a:t>. Module in Python for data downloading</a:t>
+            </a:r>
+          </a:p>
+          <a:p>
+            <a:pPr marL="285750" indent="-285750" algn="l">
+              <a:buFont typeface="Arial" panose="020B0604020202020204" pitchFamily="34" charset="0"/>
+              <a:buChar char="•"/>
+            </a:pPr>
+            <a:r>
+              <a:rPr lang="en-GB" dirty="0">
+                <a:solidFill>
+                  <a:schemeClr val="accent2"/>
+                </a:solidFill>
+                <a:latin typeface="Amiri" panose="00000500000000000000" pitchFamily="2" charset="-78"/>
+                <a:ea typeface="Amiri" panose="00000500000000000000" pitchFamily="2" charset="-78"/>
+                <a:cs typeface="Amiri" panose="00000500000000000000" pitchFamily="2" charset="-78"/>
+              </a:rPr>
+              <a:t>Data Format: XML</a:t>
+            </a:r>
+          </a:p>
+          <a:p>
+            <a:pPr marL="285750" indent="-285750" algn="l">
+              <a:buFont typeface="Arial" panose="020B0604020202020204" pitchFamily="34" charset="0"/>
+              <a:buChar char="•"/>
+            </a:pPr>
+            <a:r>
+              <a:rPr lang="en-GB" dirty="0">
+                <a:solidFill>
+                  <a:schemeClr val="accent2"/>
+                </a:solidFill>
+                <a:latin typeface="Amiri" panose="00000500000000000000" pitchFamily="2" charset="-78"/>
+                <a:ea typeface="Amiri" panose="00000500000000000000" pitchFamily="2" charset="-78"/>
+                <a:cs typeface="Amiri" panose="00000500000000000000" pitchFamily="2" charset="-78"/>
+              </a:rPr>
+              <a:t>Refine filtering criteria to download quarterly </a:t>
+            </a:r>
           </a:p>
         </p:txBody>
       </p:sp>

</xml_diff>

<commit_message>
Added slides on OpenSearch
</commit_message>
<xml_diff>
--- a/project/docs/Milestone-meeting_slides.pptx
+++ b/project/docs/Milestone-meeting_slides.pptx
@@ -5,7 +5,7 @@
     <p:sldMasterId id="2147483690" r:id="rId1"/>
   </p:sldMasterIdLst>
   <p:notesMasterIdLst>
-    <p:notesMasterId r:id="rId16"/>
+    <p:notesMasterId r:id="rId18"/>
   </p:notesMasterIdLst>
   <p:sldIdLst>
     <p:sldId id="256" r:id="rId2"/>
@@ -14,14 +14,16 @@
     <p:sldId id="279" r:id="rId5"/>
     <p:sldId id="261" r:id="rId6"/>
     <p:sldId id="281" r:id="rId7"/>
-    <p:sldId id="280" r:id="rId8"/>
-    <p:sldId id="282" r:id="rId9"/>
-    <p:sldId id="285" r:id="rId10"/>
-    <p:sldId id="286" r:id="rId11"/>
-    <p:sldId id="283" r:id="rId12"/>
-    <p:sldId id="284" r:id="rId13"/>
-    <p:sldId id="287" r:id="rId14"/>
-    <p:sldId id="277" r:id="rId15"/>
+    <p:sldId id="282" r:id="rId8"/>
+    <p:sldId id="288" r:id="rId9"/>
+    <p:sldId id="289" r:id="rId10"/>
+    <p:sldId id="290" r:id="rId11"/>
+    <p:sldId id="285" r:id="rId12"/>
+    <p:sldId id="286" r:id="rId13"/>
+    <p:sldId id="283" r:id="rId14"/>
+    <p:sldId id="284" r:id="rId15"/>
+    <p:sldId id="287" r:id="rId16"/>
+    <p:sldId id="277" r:id="rId17"/>
   </p:sldIdLst>
   <p:sldSz cx="12192000" cy="6858000"/>
   <p:notesSz cx="6858000" cy="9144000"/>
@@ -5960,7 +5962,7 @@
           <a:p>
             <a:fld id="{880CDB83-6F76-9545-B287-0ADA9B398D67}" type="slidenum">
               <a:rPr lang="it-IT" smtClean="0"/>
-              <a:t>‹#›</a:t>
+              <a:t>‹Nr.›</a:t>
             </a:fld>
             <a:endParaRPr lang="it-IT"/>
           </a:p>
@@ -6457,7 +6459,7 @@
     </p:spTree>
     <p:extLst>
       <p:ext uri="{BB962C8B-B14F-4D97-AF65-F5344CB8AC3E}">
-        <p14:creationId xmlns:p14="http://schemas.microsoft.com/office/powerpoint/2010/main" val="396421900"/>
+        <p14:creationId xmlns:p14="http://schemas.microsoft.com/office/powerpoint/2010/main" val="2463884889"/>
       </p:ext>
     </p:extLst>
   </p:cSld>
@@ -6628,7 +6630,7 @@
     </p:spTree>
     <p:extLst>
       <p:ext uri="{BB962C8B-B14F-4D97-AF65-F5344CB8AC3E}">
-        <p14:creationId xmlns:p14="http://schemas.microsoft.com/office/powerpoint/2010/main" val="1450128186"/>
+        <p14:creationId xmlns:p14="http://schemas.microsoft.com/office/powerpoint/2010/main" val="1168173129"/>
       </p:ext>
     </p:extLst>
   </p:cSld>
@@ -6942,7 +6944,7 @@
     </p:spTree>
     <p:extLst>
       <p:ext uri="{BB962C8B-B14F-4D97-AF65-F5344CB8AC3E}">
-        <p14:creationId xmlns:p14="http://schemas.microsoft.com/office/powerpoint/2010/main" val="4178231289"/>
+        <p14:creationId xmlns:p14="http://schemas.microsoft.com/office/powerpoint/2010/main" val="396421900"/>
       </p:ext>
     </p:extLst>
   </p:cSld>
@@ -7113,7 +7115,7 @@
     </p:spTree>
     <p:extLst>
       <p:ext uri="{BB962C8B-B14F-4D97-AF65-F5344CB8AC3E}">
-        <p14:creationId xmlns:p14="http://schemas.microsoft.com/office/powerpoint/2010/main" val="1923579796"/>
+        <p14:creationId xmlns:p14="http://schemas.microsoft.com/office/powerpoint/2010/main" val="1450128186"/>
       </p:ext>
     </p:extLst>
   </p:cSld>
@@ -7169,8 +7171,235 @@
           <a:p>
             <a:r>
               <a:rPr lang="it-IT"/>
-              <a:t>Schema interattivo</a:t>
-            </a:r>
+              <a:t>Fin qua 4 minuti</a:t>
+            </a:r>
+          </a:p>
+          <a:p>
+            <a:pPr marL="171450" indent="-171450">
+              <a:buFont typeface="Calibri"/>
+              <a:buChar char="-"/>
+            </a:pPr>
+            <a:r>
+              <a:rPr lang="it-IT" err="1">
+                <a:cs typeface="Calibri"/>
+              </a:rPr>
+              <a:t>Description</a:t>
+            </a:r>
+            <a:r>
+              <a:rPr lang="it-IT">
+                <a:cs typeface="Calibri"/>
+              </a:rPr>
+              <a:t> of </a:t>
+            </a:r>
+            <a:r>
+              <a:rPr lang="it-IT" err="1">
+                <a:cs typeface="Calibri"/>
+              </a:rPr>
+              <a:t>our</a:t>
+            </a:r>
+            <a:r>
+              <a:rPr lang="it-IT">
+                <a:cs typeface="Calibri"/>
+              </a:rPr>
+              <a:t> </a:t>
+            </a:r>
+            <a:r>
+              <a:rPr lang="it-IT" err="1">
+                <a:cs typeface="Calibri"/>
+              </a:rPr>
+              <a:t>problem</a:t>
+            </a:r>
+            <a:r>
+              <a:rPr lang="it-IT">
+                <a:cs typeface="Calibri"/>
+              </a:rPr>
+              <a:t> </a:t>
+            </a:r>
+            <a:r>
+              <a:rPr lang="it-IT" err="1">
+                <a:cs typeface="Calibri"/>
+              </a:rPr>
+              <a:t>environment</a:t>
+            </a:r>
+            <a:endParaRPr lang="it-IT">
+              <a:cs typeface="Calibri"/>
+            </a:endParaRPr>
+          </a:p>
+          <a:p>
+            <a:pPr marL="171450" indent="-171450">
+              <a:buFont typeface="Calibri"/>
+              <a:buChar char="-"/>
+            </a:pPr>
+            <a:r>
+              <a:rPr lang="it-IT" err="1">
+                <a:cs typeface="Calibri"/>
+              </a:rPr>
+              <a:t>Emitter</a:t>
+            </a:r>
+            <a:r>
+              <a:rPr lang="it-IT">
+                <a:cs typeface="Calibri"/>
+              </a:rPr>
+              <a:t> with small </a:t>
+            </a:r>
+            <a:r>
+              <a:rPr lang="it-IT" err="1">
+                <a:cs typeface="Calibri"/>
+              </a:rPr>
+              <a:t>radius</a:t>
+            </a:r>
+            <a:endParaRPr lang="it-IT">
+              <a:cs typeface="Calibri"/>
+            </a:endParaRPr>
+          </a:p>
+          <a:p>
+            <a:pPr marL="171450" indent="-171450">
+              <a:buFont typeface="Calibri"/>
+              <a:buChar char="-"/>
+            </a:pPr>
+            <a:r>
+              <a:rPr lang="it-IT" err="1">
+                <a:cs typeface="Calibri"/>
+              </a:rPr>
+              <a:t>Collector</a:t>
+            </a:r>
+            <a:r>
+              <a:rPr lang="it-IT">
+                <a:cs typeface="Calibri"/>
+              </a:rPr>
+              <a:t> non in mesh</a:t>
+            </a:r>
+          </a:p>
+          <a:p>
+            <a:pPr marL="171450" indent="-171450">
+              <a:buFont typeface="Calibri"/>
+              <a:buChar char="-"/>
+            </a:pPr>
+            <a:r>
+              <a:rPr lang="it-IT" err="1">
+                <a:cs typeface="Calibri"/>
+              </a:rPr>
+              <a:t>BCs</a:t>
+            </a:r>
+          </a:p>
+          <a:p>
+            <a:pPr marL="171450" indent="-171450">
+              <a:buFont typeface="Calibri"/>
+              <a:buChar char="-"/>
+            </a:pPr>
+            <a:r>
+              <a:rPr lang="it-IT" err="1">
+                <a:cs typeface="Calibri"/>
+              </a:rPr>
+              <a:t>Initial</a:t>
+            </a:r>
+            <a:r>
+              <a:rPr lang="it-IT">
+                <a:cs typeface="Calibri"/>
+              </a:rPr>
+              <a:t> </a:t>
+            </a:r>
+            <a:r>
+              <a:rPr lang="it-IT" err="1">
+                <a:cs typeface="Calibri"/>
+              </a:rPr>
+              <a:t>refinement</a:t>
+            </a:r>
+            <a:r>
+              <a:rPr lang="it-IT">
+                <a:cs typeface="Calibri"/>
+              </a:rPr>
+              <a:t> </a:t>
+            </a:r>
+            <a:r>
+              <a:rPr lang="it-IT" err="1">
+                <a:cs typeface="Calibri"/>
+              </a:rPr>
+              <a:t>at</a:t>
+            </a:r>
+            <a:r>
+              <a:rPr lang="it-IT">
+                <a:cs typeface="Calibri"/>
+              </a:rPr>
+              <a:t> </a:t>
+            </a:r>
+            <a:r>
+              <a:rPr lang="it-IT" err="1">
+                <a:cs typeface="Calibri"/>
+              </a:rPr>
+              <a:t>emitter</a:t>
+            </a:r>
+            <a:r>
+              <a:rPr lang="it-IT">
+                <a:cs typeface="Calibri"/>
+              </a:rPr>
+              <a:t> (</a:t>
+            </a:r>
+            <a:r>
+              <a:rPr lang="it-IT" err="1">
+                <a:cs typeface="Calibri"/>
+              </a:rPr>
+              <a:t>not</a:t>
+            </a:r>
+            <a:r>
+              <a:rPr lang="it-IT">
+                <a:cs typeface="Calibri"/>
+              </a:rPr>
+              <a:t> </a:t>
+            </a:r>
+            <a:r>
+              <a:rPr lang="it-IT" err="1">
+                <a:cs typeface="Calibri"/>
+              </a:rPr>
+              <a:t>distorted</a:t>
+            </a:r>
+            <a:r>
+              <a:rPr lang="it-IT">
+                <a:cs typeface="Calibri"/>
+              </a:rPr>
+              <a:t> mesh, emitter </a:t>
+            </a:r>
+            <a:r>
+              <a:rPr lang="it-IT" err="1">
+                <a:cs typeface="Calibri"/>
+              </a:rPr>
+              <a:t>is</a:t>
+            </a:r>
+            <a:r>
+              <a:rPr lang="it-IT">
+                <a:cs typeface="Calibri"/>
+              </a:rPr>
+              <a:t> </a:t>
+            </a:r>
+            <a:r>
+              <a:rPr lang="it-IT" err="1">
+                <a:cs typeface="Calibri"/>
+              </a:rPr>
+              <a:t>our</a:t>
+            </a:r>
+            <a:r>
+              <a:rPr lang="it-IT">
+                <a:cs typeface="Calibri"/>
+              </a:rPr>
+              <a:t> </a:t>
+            </a:r>
+            <a:r>
+              <a:rPr lang="it-IT" err="1">
+                <a:cs typeface="Calibri"/>
+              </a:rPr>
+              <a:t>interest</a:t>
+            </a:r>
+            <a:r>
+              <a:rPr lang="it-IT">
+                <a:cs typeface="Calibri"/>
+              </a:rPr>
+              <a:t>)</a:t>
+            </a:r>
+          </a:p>
+          <a:p>
+            <a:endParaRPr lang="it-IT">
+              <a:cs typeface="Calibri"/>
+            </a:endParaRPr>
           </a:p>
         </p:txBody>
       </p:sp>
@@ -7192,6 +7421,264 @@
             <a:fld id="{880CDB83-6F76-9545-B287-0ADA9B398D67}" type="slidenum">
               <a:rPr lang="it-IT" smtClean="0"/>
               <a:t>14</a:t>
+            </a:fld>
+            <a:endParaRPr lang="it-IT"/>
+          </a:p>
+        </p:txBody>
+      </p:sp>
+    </p:spTree>
+    <p:extLst>
+      <p:ext uri="{BB962C8B-B14F-4D97-AF65-F5344CB8AC3E}">
+        <p14:creationId xmlns:p14="http://schemas.microsoft.com/office/powerpoint/2010/main" val="4178231289"/>
+      </p:ext>
+    </p:extLst>
+  </p:cSld>
+  <p:clrMapOvr>
+    <a:masterClrMapping/>
+  </p:clrMapOvr>
+</p:notes>
+</file>
+
+<file path=ppt/notesSlides/notesSlide15.xml><?xml version="1.0" encoding="utf-8"?>
+<p:notes xmlns:a="http://schemas.openxmlformats.org/drawingml/2006/main" xmlns:r="http://schemas.openxmlformats.org/officeDocument/2006/relationships" xmlns:p="http://schemas.openxmlformats.org/presentationml/2006/main">
+  <p:cSld>
+    <p:spTree>
+      <p:nvGrpSpPr>
+        <p:cNvPr id="1" name=""/>
+        <p:cNvGrpSpPr/>
+        <p:nvPr/>
+      </p:nvGrpSpPr>
+      <p:grpSpPr>
+        <a:xfrm>
+          <a:off x="0" y="0"/>
+          <a:ext cx="0" cy="0"/>
+          <a:chOff x="0" y="0"/>
+          <a:chExt cx="0" cy="0"/>
+        </a:xfrm>
+      </p:grpSpPr>
+      <p:sp>
+        <p:nvSpPr>
+          <p:cNvPr id="2" name="Segnaposto immagine diapositiva 1"/>
+          <p:cNvSpPr>
+            <a:spLocks noGrp="1" noRot="1" noChangeAspect="1"/>
+          </p:cNvSpPr>
+          <p:nvPr>
+            <p:ph type="sldImg"/>
+          </p:nvPr>
+        </p:nvSpPr>
+        <p:spPr/>
+      </p:sp>
+      <p:sp>
+        <p:nvSpPr>
+          <p:cNvPr id="3" name="Segnaposto note 2"/>
+          <p:cNvSpPr>
+            <a:spLocks noGrp="1"/>
+          </p:cNvSpPr>
+          <p:nvPr>
+            <p:ph type="body" idx="1"/>
+          </p:nvPr>
+        </p:nvSpPr>
+        <p:spPr/>
+        <p:txBody>
+          <a:bodyPr/>
+          <a:lstStyle/>
+          <a:p>
+            <a:pPr marL="171450" indent="-171450">
+              <a:buFont typeface="Calibri"/>
+              <a:buChar char="-"/>
+            </a:pPr>
+            <a:r>
+              <a:rPr lang="it-IT">
+                <a:cs typeface="Calibri"/>
+              </a:rPr>
+              <a:t>Poisson formula</a:t>
+            </a:r>
+          </a:p>
+          <a:p>
+            <a:pPr marL="171450" indent="-171450">
+              <a:buFont typeface="Calibri"/>
+              <a:buChar char="-"/>
+            </a:pPr>
+            <a:r>
+              <a:rPr lang="it-IT" err="1">
+                <a:cs typeface="Calibri"/>
+              </a:rPr>
+              <a:t>Representation</a:t>
+            </a:r>
+            <a:r>
+              <a:rPr lang="it-IT">
+                <a:cs typeface="Calibri"/>
+              </a:rPr>
+              <a:t> of </a:t>
+            </a:r>
+            <a:r>
+              <a:rPr lang="it-IT" err="1">
+                <a:cs typeface="Calibri"/>
+              </a:rPr>
+              <a:t>f</a:t>
+            </a:r>
+            <a:r>
+              <a:rPr lang="it-IT">
+                <a:cs typeface="Calibri"/>
+              </a:rPr>
+              <a:t> and </a:t>
+            </a:r>
+            <a:r>
+              <a:rPr lang="it-IT" err="1">
+                <a:cs typeface="Calibri"/>
+              </a:rPr>
+              <a:t>why</a:t>
+            </a:r>
+            <a:r>
+              <a:rPr lang="it-IT">
+                <a:cs typeface="Calibri"/>
+              </a:rPr>
+              <a:t> </a:t>
+            </a:r>
+            <a:r>
+              <a:rPr lang="it-IT" err="1">
+                <a:cs typeface="Calibri"/>
+              </a:rPr>
+              <a:t>is</a:t>
+            </a:r>
+            <a:r>
+              <a:rPr lang="it-IT">
+                <a:cs typeface="Calibri"/>
+              </a:rPr>
+              <a:t> </a:t>
+            </a:r>
+            <a:r>
+              <a:rPr lang="it-IT" err="1">
+                <a:cs typeface="Calibri"/>
+              </a:rPr>
+              <a:t>negligible</a:t>
+            </a:r>
+            <a:endParaRPr lang="it-IT">
+              <a:cs typeface="Calibri"/>
+            </a:endParaRPr>
+          </a:p>
+          <a:p>
+            <a:pPr marL="171450" indent="-171450">
+              <a:buFont typeface="Calibri"/>
+              <a:buChar char="-"/>
+            </a:pPr>
+            <a:r>
+              <a:rPr lang="it-IT" err="1">
+                <a:cs typeface="Calibri"/>
+              </a:rPr>
+              <a:t>BCs</a:t>
+            </a:r>
+            <a:endParaRPr lang="it-IT">
+              <a:cs typeface="Calibri"/>
+            </a:endParaRPr>
+          </a:p>
+        </p:txBody>
+      </p:sp>
+      <p:sp>
+        <p:nvSpPr>
+          <p:cNvPr id="4" name="Segnaposto numero diapositiva 3"/>
+          <p:cNvSpPr>
+            <a:spLocks noGrp="1"/>
+          </p:cNvSpPr>
+          <p:nvPr>
+            <p:ph type="sldNum" sz="quarter" idx="5"/>
+          </p:nvPr>
+        </p:nvSpPr>
+        <p:spPr/>
+        <p:txBody>
+          <a:bodyPr/>
+          <a:lstStyle/>
+          <a:p>
+            <a:fld id="{880CDB83-6F76-9545-B287-0ADA9B398D67}" type="slidenum">
+              <a:rPr lang="it-IT" smtClean="0"/>
+              <a:t>15</a:t>
+            </a:fld>
+            <a:endParaRPr lang="it-IT"/>
+          </a:p>
+        </p:txBody>
+      </p:sp>
+    </p:spTree>
+    <p:extLst>
+      <p:ext uri="{BB962C8B-B14F-4D97-AF65-F5344CB8AC3E}">
+        <p14:creationId xmlns:p14="http://schemas.microsoft.com/office/powerpoint/2010/main" val="1923579796"/>
+      </p:ext>
+    </p:extLst>
+  </p:cSld>
+  <p:clrMapOvr>
+    <a:masterClrMapping/>
+  </p:clrMapOvr>
+</p:notes>
+</file>
+
+<file path=ppt/notesSlides/notesSlide16.xml><?xml version="1.0" encoding="utf-8"?>
+<p:notes xmlns:a="http://schemas.openxmlformats.org/drawingml/2006/main" xmlns:r="http://schemas.openxmlformats.org/officeDocument/2006/relationships" xmlns:p="http://schemas.openxmlformats.org/presentationml/2006/main">
+  <p:cSld>
+    <p:spTree>
+      <p:nvGrpSpPr>
+        <p:cNvPr id="1" name=""/>
+        <p:cNvGrpSpPr/>
+        <p:nvPr/>
+      </p:nvGrpSpPr>
+      <p:grpSpPr>
+        <a:xfrm>
+          <a:off x="0" y="0"/>
+          <a:ext cx="0" cy="0"/>
+          <a:chOff x="0" y="0"/>
+          <a:chExt cx="0" cy="0"/>
+        </a:xfrm>
+      </p:grpSpPr>
+      <p:sp>
+        <p:nvSpPr>
+          <p:cNvPr id="2" name="Segnaposto immagine diapositiva 1"/>
+          <p:cNvSpPr>
+            <a:spLocks noGrp="1" noRot="1" noChangeAspect="1"/>
+          </p:cNvSpPr>
+          <p:nvPr>
+            <p:ph type="sldImg"/>
+          </p:nvPr>
+        </p:nvSpPr>
+        <p:spPr/>
+      </p:sp>
+      <p:sp>
+        <p:nvSpPr>
+          <p:cNvPr id="3" name="Segnaposto note 2"/>
+          <p:cNvSpPr>
+            <a:spLocks noGrp="1"/>
+          </p:cNvSpPr>
+          <p:nvPr>
+            <p:ph type="body" idx="1"/>
+          </p:nvPr>
+        </p:nvSpPr>
+        <p:spPr/>
+        <p:txBody>
+          <a:bodyPr/>
+          <a:lstStyle/>
+          <a:p>
+            <a:r>
+              <a:rPr lang="it-IT"/>
+              <a:t>Schema interattivo</a:t>
+            </a:r>
+          </a:p>
+        </p:txBody>
+      </p:sp>
+      <p:sp>
+        <p:nvSpPr>
+          <p:cNvPr id="4" name="Segnaposto numero diapositiva 3"/>
+          <p:cNvSpPr>
+            <a:spLocks noGrp="1"/>
+          </p:cNvSpPr>
+          <p:nvPr>
+            <p:ph type="sldNum" sz="quarter" idx="5"/>
+          </p:nvPr>
+        </p:nvSpPr>
+        <p:spPr/>
+        <p:txBody>
+          <a:bodyPr/>
+          <a:lstStyle/>
+          <a:p>
+            <a:fld id="{880CDB83-6F76-9545-B287-0ADA9B398D67}" type="slidenum">
+              <a:rPr lang="it-IT" smtClean="0"/>
+              <a:t>16</a:t>
             </a:fld>
             <a:endParaRPr lang="it-IT"/>
           </a:p>
@@ -8201,7 +8688,7 @@
               <a:buChar char="-"/>
             </a:pPr>
             <a:r>
-              <a:rPr lang="it-IT">
+              <a:rPr lang="it-IT" dirty="0">
                 <a:cs typeface="Calibri"/>
               </a:rPr>
               <a:t>Poisson formula</a:t>
@@ -8213,60 +8700,60 @@
               <a:buChar char="-"/>
             </a:pPr>
             <a:r>
-              <a:rPr lang="it-IT" err="1">
+              <a:rPr lang="it-IT" dirty="0" err="1">
                 <a:cs typeface="Calibri"/>
               </a:rPr>
               <a:t>Representation</a:t>
             </a:r>
             <a:r>
-              <a:rPr lang="it-IT">
+              <a:rPr lang="it-IT" dirty="0">
                 <a:cs typeface="Calibri"/>
               </a:rPr>
               <a:t> of </a:t>
             </a:r>
             <a:r>
-              <a:rPr lang="it-IT" err="1">
+              <a:rPr lang="it-IT" dirty="0" err="1">
                 <a:cs typeface="Calibri"/>
               </a:rPr>
               <a:t>f</a:t>
             </a:r>
             <a:r>
-              <a:rPr lang="it-IT">
+              <a:rPr lang="it-IT" dirty="0">
                 <a:cs typeface="Calibri"/>
               </a:rPr>
               <a:t> and </a:t>
             </a:r>
             <a:r>
-              <a:rPr lang="it-IT" err="1">
+              <a:rPr lang="it-IT" dirty="0" err="1">
                 <a:cs typeface="Calibri"/>
               </a:rPr>
               <a:t>why</a:t>
             </a:r>
             <a:r>
-              <a:rPr lang="it-IT">
+              <a:rPr lang="it-IT" dirty="0">
                 <a:cs typeface="Calibri"/>
               </a:rPr>
               <a:t> </a:t>
             </a:r>
             <a:r>
-              <a:rPr lang="it-IT" err="1">
+              <a:rPr lang="it-IT" dirty="0" err="1">
                 <a:cs typeface="Calibri"/>
               </a:rPr>
               <a:t>is</a:t>
             </a:r>
             <a:r>
-              <a:rPr lang="it-IT">
+              <a:rPr lang="it-IT" dirty="0">
                 <a:cs typeface="Calibri"/>
               </a:rPr>
               <a:t> </a:t>
             </a:r>
             <a:r>
-              <a:rPr lang="it-IT" err="1">
+              <a:rPr lang="it-IT" dirty="0" err="1">
                 <a:cs typeface="Calibri"/>
               </a:rPr>
               <a:t>negligible</a:t>
             </a:r>
-            <a:endParaRPr lang="it-IT">
+            <a:endParaRPr lang="it-IT" dirty="0">
               <a:cs typeface="Calibri"/>
             </a:endParaRPr>
           </a:p>
@@ -8276,12 +8763,12 @@
               <a:buChar char="-"/>
             </a:pPr>
             <a:r>
-              <a:rPr lang="it-IT" err="1">
+              <a:rPr lang="it-IT" dirty="0" err="1">
                 <a:cs typeface="Calibri"/>
               </a:rPr>
               <a:t>BCs</a:t>
             </a:r>
-            <a:endParaRPr lang="it-IT">
+            <a:endParaRPr lang="it-IT" dirty="0">
               <a:cs typeface="Calibri"/>
             </a:endParaRPr>
           </a:p>
@@ -8941,7 +9428,7 @@
     </p:spTree>
     <p:extLst>
       <p:ext uri="{BB962C8B-B14F-4D97-AF65-F5344CB8AC3E}">
-        <p14:creationId xmlns:p14="http://schemas.microsoft.com/office/powerpoint/2010/main" val="2965884639"/>
+        <p14:creationId xmlns:p14="http://schemas.microsoft.com/office/powerpoint/2010/main" val="2611923425"/>
       </p:ext>
     </p:extLst>
   </p:cSld>
@@ -9255,7 +9742,7 @@
     </p:spTree>
     <p:extLst>
       <p:ext uri="{BB962C8B-B14F-4D97-AF65-F5344CB8AC3E}">
-        <p14:creationId xmlns:p14="http://schemas.microsoft.com/office/powerpoint/2010/main" val="2611923425"/>
+        <p14:creationId xmlns:p14="http://schemas.microsoft.com/office/powerpoint/2010/main" val="2510739449"/>
       </p:ext>
     </p:extLst>
   </p:cSld>
@@ -9309,16 +9796,61 @@
           <a:bodyPr/>
           <a:lstStyle/>
           <a:p>
+            <a:r>
+              <a:rPr lang="it-IT"/>
+              <a:t>Fin qua 4 minuti</a:t>
+            </a:r>
+          </a:p>
+          <a:p>
             <a:pPr marL="171450" indent="-171450">
               <a:buFont typeface="Calibri"/>
               <a:buChar char="-"/>
             </a:pPr>
             <a:r>
+              <a:rPr lang="it-IT" err="1">
+                <a:cs typeface="Calibri"/>
+              </a:rPr>
+              <a:t>Description</a:t>
+            </a:r>
+            <a:r>
               <a:rPr lang="it-IT">
                 <a:cs typeface="Calibri"/>
               </a:rPr>
-              <a:t>Poisson formula</a:t>
-            </a:r>
+              <a:t> of </a:t>
+            </a:r>
+            <a:r>
+              <a:rPr lang="it-IT" err="1">
+                <a:cs typeface="Calibri"/>
+              </a:rPr>
+              <a:t>our</a:t>
+            </a:r>
+            <a:r>
+              <a:rPr lang="it-IT">
+                <a:cs typeface="Calibri"/>
+              </a:rPr>
+              <a:t> </a:t>
+            </a:r>
+            <a:r>
+              <a:rPr lang="it-IT" err="1">
+                <a:cs typeface="Calibri"/>
+              </a:rPr>
+              <a:t>problem</a:t>
+            </a:r>
+            <a:r>
+              <a:rPr lang="it-IT">
+                <a:cs typeface="Calibri"/>
+              </a:rPr>
+              <a:t> </a:t>
+            </a:r>
+            <a:r>
+              <a:rPr lang="it-IT" err="1">
+                <a:cs typeface="Calibri"/>
+              </a:rPr>
+              <a:t>environment</a:t>
+            </a:r>
+            <a:endParaRPr lang="it-IT">
+              <a:cs typeface="Calibri"/>
+            </a:endParaRPr>
           </a:p>
           <a:p>
             <a:pPr marL="171450" indent="-171450">
@@ -9329,55 +9861,19 @@
               <a:rPr lang="it-IT" err="1">
                 <a:cs typeface="Calibri"/>
               </a:rPr>
-              <a:t>Representation</a:t>
+              <a:t>Emitter</a:t>
             </a:r>
             <a:r>
               <a:rPr lang="it-IT">
                 <a:cs typeface="Calibri"/>
               </a:rPr>
-              <a:t> of </a:t>
+              <a:t> with small </a:t>
             </a:r>
             <a:r>
               <a:rPr lang="it-IT" err="1">
                 <a:cs typeface="Calibri"/>
               </a:rPr>
-              <a:t>f</a:t>
-            </a:r>
-            <a:r>
-              <a:rPr lang="it-IT">
-                <a:cs typeface="Calibri"/>
-              </a:rPr>
-              <a:t> and </a:t>
-            </a:r>
-            <a:r>
-              <a:rPr lang="it-IT" err="1">
-                <a:cs typeface="Calibri"/>
-              </a:rPr>
-              <a:t>why</a:t>
-            </a:r>
-            <a:r>
-              <a:rPr lang="it-IT">
-                <a:cs typeface="Calibri"/>
-              </a:rPr>
-              <a:t> </a:t>
-            </a:r>
-            <a:r>
-              <a:rPr lang="it-IT" err="1">
-                <a:cs typeface="Calibri"/>
-              </a:rPr>
-              <a:t>is</a:t>
-            </a:r>
-            <a:r>
-              <a:rPr lang="it-IT">
-                <a:cs typeface="Calibri"/>
-              </a:rPr>
-              <a:t> </a:t>
-            </a:r>
-            <a:r>
-              <a:rPr lang="it-IT" err="1">
-                <a:cs typeface="Calibri"/>
-              </a:rPr>
-              <a:t>negligible</a:t>
+              <a:t>radius</a:t>
             </a:r>
             <a:endParaRPr lang="it-IT">
               <a:cs typeface="Calibri"/>
@@ -9392,8 +9888,142 @@
               <a:rPr lang="it-IT" err="1">
                 <a:cs typeface="Calibri"/>
               </a:rPr>
+              <a:t>Collector</a:t>
+            </a:r>
+            <a:r>
+              <a:rPr lang="it-IT">
+                <a:cs typeface="Calibri"/>
+              </a:rPr>
+              <a:t> non in mesh</a:t>
+            </a:r>
+          </a:p>
+          <a:p>
+            <a:pPr marL="171450" indent="-171450">
+              <a:buFont typeface="Calibri"/>
+              <a:buChar char="-"/>
+            </a:pPr>
+            <a:r>
+              <a:rPr lang="it-IT" err="1">
+                <a:cs typeface="Calibri"/>
+              </a:rPr>
               <a:t>BCs</a:t>
             </a:r>
+          </a:p>
+          <a:p>
+            <a:pPr marL="171450" indent="-171450">
+              <a:buFont typeface="Calibri"/>
+              <a:buChar char="-"/>
+            </a:pPr>
+            <a:r>
+              <a:rPr lang="it-IT" err="1">
+                <a:cs typeface="Calibri"/>
+              </a:rPr>
+              <a:t>Initial</a:t>
+            </a:r>
+            <a:r>
+              <a:rPr lang="it-IT">
+                <a:cs typeface="Calibri"/>
+              </a:rPr>
+              <a:t> </a:t>
+            </a:r>
+            <a:r>
+              <a:rPr lang="it-IT" err="1">
+                <a:cs typeface="Calibri"/>
+              </a:rPr>
+              <a:t>refinement</a:t>
+            </a:r>
+            <a:r>
+              <a:rPr lang="it-IT">
+                <a:cs typeface="Calibri"/>
+              </a:rPr>
+              <a:t> </a:t>
+            </a:r>
+            <a:r>
+              <a:rPr lang="it-IT" err="1">
+                <a:cs typeface="Calibri"/>
+              </a:rPr>
+              <a:t>at</a:t>
+            </a:r>
+            <a:r>
+              <a:rPr lang="it-IT">
+                <a:cs typeface="Calibri"/>
+              </a:rPr>
+              <a:t> </a:t>
+            </a:r>
+            <a:r>
+              <a:rPr lang="it-IT" err="1">
+                <a:cs typeface="Calibri"/>
+              </a:rPr>
+              <a:t>emitter</a:t>
+            </a:r>
+            <a:r>
+              <a:rPr lang="it-IT">
+                <a:cs typeface="Calibri"/>
+              </a:rPr>
+              <a:t> (</a:t>
+            </a:r>
+            <a:r>
+              <a:rPr lang="it-IT" err="1">
+                <a:cs typeface="Calibri"/>
+              </a:rPr>
+              <a:t>not</a:t>
+            </a:r>
+            <a:r>
+              <a:rPr lang="it-IT">
+                <a:cs typeface="Calibri"/>
+              </a:rPr>
+              <a:t> </a:t>
+            </a:r>
+            <a:r>
+              <a:rPr lang="it-IT" err="1">
+                <a:cs typeface="Calibri"/>
+              </a:rPr>
+              <a:t>distorted</a:t>
+            </a:r>
+            <a:r>
+              <a:rPr lang="it-IT">
+                <a:cs typeface="Calibri"/>
+              </a:rPr>
+              <a:t> mesh, emitter </a:t>
+            </a:r>
+            <a:r>
+              <a:rPr lang="it-IT" err="1">
+                <a:cs typeface="Calibri"/>
+              </a:rPr>
+              <a:t>is</a:t>
+            </a:r>
+            <a:r>
+              <a:rPr lang="it-IT">
+                <a:cs typeface="Calibri"/>
+              </a:rPr>
+              <a:t> </a:t>
+            </a:r>
+            <a:r>
+              <a:rPr lang="it-IT" err="1">
+                <a:cs typeface="Calibri"/>
+              </a:rPr>
+              <a:t>our</a:t>
+            </a:r>
+            <a:r>
+              <a:rPr lang="it-IT">
+                <a:cs typeface="Calibri"/>
+              </a:rPr>
+              <a:t> </a:t>
+            </a:r>
+            <a:r>
+              <a:rPr lang="it-IT" err="1">
+                <a:cs typeface="Calibri"/>
+              </a:rPr>
+              <a:t>interest</a:t>
+            </a:r>
+            <a:r>
+              <a:rPr lang="it-IT">
+                <a:cs typeface="Calibri"/>
+              </a:rPr>
+              <a:t>)</a:t>
+            </a:r>
+          </a:p>
+          <a:p>
             <a:endParaRPr lang="it-IT">
               <a:cs typeface="Calibri"/>
             </a:endParaRPr>
@@ -9426,7 +10056,7 @@
     </p:spTree>
     <p:extLst>
       <p:ext uri="{BB962C8B-B14F-4D97-AF65-F5344CB8AC3E}">
-        <p14:creationId xmlns:p14="http://schemas.microsoft.com/office/powerpoint/2010/main" val="1168173129"/>
+        <p14:creationId xmlns:p14="http://schemas.microsoft.com/office/powerpoint/2010/main" val="3417475041"/>
       </p:ext>
     </p:extLst>
   </p:cSld>
@@ -9704,7 +10334,7 @@
           <a:p>
             <a:fld id="{C54E6C4E-D06C-4D41-BB81-A1DAC100CD54}" type="slidenum">
               <a:rPr lang="it-IT" smtClean="0"/>
-              <a:t>‹#›</a:t>
+              <a:t>‹Nr.›</a:t>
             </a:fld>
             <a:endParaRPr lang="it-IT"/>
           </a:p>
@@ -9912,7 +10542,7 @@
           <a:p>
             <a:fld id="{C54E6C4E-D06C-4D41-BB81-A1DAC100CD54}" type="slidenum">
               <a:rPr lang="it-IT" smtClean="0"/>
-              <a:t>‹#›</a:t>
+              <a:t>‹Nr.›</a:t>
             </a:fld>
             <a:endParaRPr lang="it-IT"/>
           </a:p>
@@ -10168,7 +10798,7 @@
           <a:p>
             <a:fld id="{C54E6C4E-D06C-4D41-BB81-A1DAC100CD54}" type="slidenum">
               <a:rPr lang="it-IT" smtClean="0"/>
-              <a:t>‹#›</a:t>
+              <a:t>‹Nr.›</a:t>
             </a:fld>
             <a:endParaRPr lang="it-IT"/>
           </a:p>
@@ -10338,7 +10968,7 @@
           <a:p>
             <a:fld id="{C54E6C4E-D06C-4D41-BB81-A1DAC100CD54}" type="slidenum">
               <a:rPr lang="it-IT" smtClean="0"/>
-              <a:t>‹#›</a:t>
+              <a:t>‹Nr.›</a:t>
             </a:fld>
             <a:endParaRPr lang="it-IT"/>
           </a:p>
@@ -10681,7 +11311,7 @@
           <a:p>
             <a:fld id="{C54E6C4E-D06C-4D41-BB81-A1DAC100CD54}" type="slidenum">
               <a:rPr lang="it-IT" smtClean="0"/>
-              <a:t>‹#›</a:t>
+              <a:t>‹Nr.›</a:t>
             </a:fld>
             <a:endParaRPr lang="it-IT"/>
           </a:p>
@@ -10956,7 +11586,7 @@
           <a:p>
             <a:fld id="{C54E6C4E-D06C-4D41-BB81-A1DAC100CD54}" type="slidenum">
               <a:rPr lang="it-IT" smtClean="0"/>
-              <a:t>‹#›</a:t>
+              <a:t>‹Nr.›</a:t>
             </a:fld>
             <a:endParaRPr lang="it-IT"/>
           </a:p>
@@ -11335,7 +11965,7 @@
           <a:p>
             <a:fld id="{C54E6C4E-D06C-4D41-BB81-A1DAC100CD54}" type="slidenum">
               <a:rPr lang="it-IT" smtClean="0"/>
-              <a:t>‹#›</a:t>
+              <a:t>‹Nr.›</a:t>
             </a:fld>
             <a:endParaRPr lang="it-IT"/>
           </a:p>
@@ -11453,7 +12083,7 @@
           <a:p>
             <a:fld id="{C54E6C4E-D06C-4D41-BB81-A1DAC100CD54}" type="slidenum">
               <a:rPr lang="it-IT" smtClean="0"/>
-              <a:t>‹#›</a:t>
+              <a:t>‹Nr.›</a:t>
             </a:fld>
             <a:endParaRPr lang="it-IT"/>
           </a:p>
@@ -11632,7 +12262,7 @@
           <a:p>
             <a:fld id="{C54E6C4E-D06C-4D41-BB81-A1DAC100CD54}" type="slidenum">
               <a:rPr lang="it-IT" smtClean="0"/>
-              <a:t>‹#›</a:t>
+              <a:t>‹Nr.›</a:t>
             </a:fld>
             <a:endParaRPr lang="it-IT"/>
           </a:p>
@@ -11999,7 +12629,7 @@
           <a:p>
             <a:fld id="{C54E6C4E-D06C-4D41-BB81-A1DAC100CD54}" type="slidenum">
               <a:rPr lang="it-IT" smtClean="0"/>
-              <a:t>‹#›</a:t>
+              <a:t>‹Nr.›</a:t>
             </a:fld>
             <a:endParaRPr lang="it-IT"/>
           </a:p>
@@ -12355,7 +12985,7 @@
           <a:p>
             <a:fld id="{C54E6C4E-D06C-4D41-BB81-A1DAC100CD54}" type="slidenum">
               <a:rPr lang="it-IT" smtClean="0"/>
-              <a:t>‹#›</a:t>
+              <a:t>‹Nr.›</a:t>
             </a:fld>
             <a:endParaRPr lang="it-IT"/>
           </a:p>
@@ -12674,7 +13304,7 @@
           <a:p>
             <a:fld id="{C54E6C4E-D06C-4D41-BB81-A1DAC100CD54}" type="slidenum">
               <a:rPr lang="it-IT" smtClean="0"/>
-              <a:t>‹#›</a:t>
+              <a:t>‹Nr.›</a:t>
             </a:fld>
             <a:endParaRPr lang="it-IT"/>
           </a:p>
@@ -13357,10 +13987,53 @@
       </p:sp>
       <p:sp>
         <p:nvSpPr>
+          <p:cNvPr id="5" name="CasellaDiTesto 1">
+            <a:extLst>
+              <a:ext uri="{FF2B5EF4-FFF2-40B4-BE49-F238E27FC236}">
+                <a16:creationId xmlns:a16="http://schemas.microsoft.com/office/drawing/2014/main" id="{C95A19C8-8308-645B-35D1-F3852392CC09}"/>
+              </a:ext>
+            </a:extLst>
+          </p:cNvPr>
+          <p:cNvSpPr txBox="1"/>
+          <p:nvPr/>
+        </p:nvSpPr>
+        <p:spPr>
+          <a:xfrm>
+            <a:off x="912778" y="454308"/>
+            <a:ext cx="9305279" cy="523220"/>
+          </a:xfrm>
+          <a:prstGeom prst="rect">
+            <a:avLst/>
+          </a:prstGeom>
+          <a:noFill/>
+        </p:spPr>
+        <p:txBody>
+          <a:bodyPr rot="0" spcFirstLastPara="0" vertOverflow="overflow" horzOverflow="overflow" vert="horz" wrap="square" lIns="91440" tIns="45720" rIns="91440" bIns="45720" numCol="1" spcCol="0" rtlCol="0" fromWordArt="0" anchor="t" anchorCtr="0" forceAA="0" compatLnSpc="1">
+            <a:prstTxWarp prst="textNoShape">
+              <a:avLst/>
+            </a:prstTxWarp>
+            <a:spAutoFit/>
+          </a:bodyPr>
+          <a:lstStyle/>
+          <a:p>
+            <a:r>
+              <a:rPr lang="en-GB" sz="2800" b="1" dirty="0">
+                <a:solidFill>
+                  <a:schemeClr val="accent2"/>
+                </a:solidFill>
+                <a:cs typeface="Amiri"/>
+              </a:rPr>
+              <a:t>Some query example to prove it’s working properly</a:t>
+            </a:r>
+          </a:p>
+        </p:txBody>
+      </p:sp>
+      <p:sp>
+        <p:nvSpPr>
           <p:cNvPr id="2" name="CasellaDiTesto 1">
             <a:extLst>
               <a:ext uri="{FF2B5EF4-FFF2-40B4-BE49-F238E27FC236}">
-                <a16:creationId xmlns:a16="http://schemas.microsoft.com/office/drawing/2014/main" id="{6FE84CCB-E39C-D846-E01E-8D68D6243FD9}"/>
+                <a16:creationId xmlns:a16="http://schemas.microsoft.com/office/drawing/2014/main" id="{1F8AF9EB-6392-D2B7-C526-E8B4D6C836CC}"/>
               </a:ext>
             </a:extLst>
           </p:cNvPr>
@@ -13439,12 +14112,47 @@
           </a:p>
         </p:txBody>
       </p:sp>
+      <p:pic>
+        <p:nvPicPr>
+          <p:cNvPr id="6" name="Grafik 5" descr="Ein Bild, das Text, Multimedia-Software, Grafiksoftware, Software enthält.&#10;&#10;Automatisch generierte Beschreibung">
+            <a:extLst>
+              <a:ext uri="{FF2B5EF4-FFF2-40B4-BE49-F238E27FC236}">
+                <a16:creationId xmlns:a16="http://schemas.microsoft.com/office/drawing/2014/main" id="{4098EF1E-C3D3-8ABA-6902-E852EA780649}"/>
+              </a:ext>
+            </a:extLst>
+          </p:cNvPr>
+          <p:cNvPicPr>
+            <a:picLocks noChangeAspect="1"/>
+          </p:cNvPicPr>
+          <p:nvPr/>
+        </p:nvPicPr>
+        <p:blipFill>
+          <a:blip r:embed="rId3"/>
+          <a:stretch>
+            <a:fillRect/>
+          </a:stretch>
+        </p:blipFill>
+        <p:spPr>
+          <a:xfrm>
+            <a:off x="1798410" y="1256105"/>
+            <a:ext cx="9262838" cy="4713632"/>
+          </a:xfrm>
+          <a:prstGeom prst="rect">
+            <a:avLst/>
+          </a:prstGeom>
+          <a:ln w="76200">
+            <a:solidFill>
+              <a:schemeClr val="accent1"/>
+            </a:solidFill>
+          </a:ln>
+        </p:spPr>
+      </p:pic>
       <p:sp>
         <p:nvSpPr>
-          <p:cNvPr id="3" name="CasellaDiTesto 1">
+          <p:cNvPr id="11" name="Textfeld 10">
             <a:extLst>
               <a:ext uri="{FF2B5EF4-FFF2-40B4-BE49-F238E27FC236}">
-                <a16:creationId xmlns:a16="http://schemas.microsoft.com/office/drawing/2014/main" id="{4DDB1793-A519-F762-FB6C-6F3790EB18B8}"/>
+                <a16:creationId xmlns:a16="http://schemas.microsoft.com/office/drawing/2014/main" id="{E8141E13-7B2C-004A-F870-9A4321B1AFEB}"/>
               </a:ext>
             </a:extLst>
           </p:cNvPr>
@@ -13453,45 +14161,453 @@
         </p:nvSpPr>
         <p:spPr>
           <a:xfrm>
-            <a:off x="980512" y="2621775"/>
-            <a:ext cx="9305279" cy="954107"/>
+            <a:off x="6429829" y="1738587"/>
+            <a:ext cx="4336025" cy="1200329"/>
           </a:xfrm>
           <a:prstGeom prst="rect">
             <a:avLst/>
           </a:prstGeom>
           <a:noFill/>
+          <a:ln w="38100">
+            <a:solidFill>
+              <a:schemeClr val="bg1"/>
+            </a:solidFill>
+          </a:ln>
         </p:spPr>
         <p:txBody>
-          <a:bodyPr rot="0" spcFirstLastPara="0" vertOverflow="overflow" horzOverflow="overflow" vert="horz" wrap="square" lIns="91440" tIns="45720" rIns="91440" bIns="45720" numCol="1" spcCol="0" rtlCol="0" fromWordArt="0" anchor="t" anchorCtr="0" forceAA="0" compatLnSpc="1">
-            <a:prstTxWarp prst="textNoShape">
-              <a:avLst/>
-            </a:prstTxWarp>
+          <a:bodyPr wrap="square" rtlCol="0">
             <a:spAutoFit/>
           </a:bodyPr>
           <a:lstStyle/>
           <a:p>
-            <a:r>
-              <a:rPr lang="en-GB" sz="2800" b="1" dirty="0">
+            <a:pPr algn="l"/>
+            <a:r>
+              <a:rPr lang="de-DE" b="0" i="0" dirty="0">
                 <a:solidFill>
-                  <a:schemeClr val="accent2"/>
+                  <a:schemeClr val="bg1"/>
                 </a:solidFill>
-                <a:cs typeface="Amiri"/>
-              </a:rPr>
-              <a:t>Live-Demo: Retrieval of most similar abstracts based on test queries</a:t>
-            </a:r>
+                <a:effectLst/>
+              </a:rPr>
+              <a:t>'Title': </a:t>
+            </a:r>
+            <a:r>
+              <a:rPr lang="de-DE" b="0" i="1" dirty="0">
+                <a:solidFill>
+                  <a:schemeClr val="bg1"/>
+                </a:solidFill>
+                <a:effectLst/>
+              </a:rPr>
+              <a:t>'</a:t>
+            </a:r>
+            <a:r>
+              <a:rPr lang="de-DE" b="0" i="1" dirty="0" err="1">
+                <a:solidFill>
+                  <a:schemeClr val="bg1"/>
+                </a:solidFill>
+                <a:effectLst/>
+              </a:rPr>
+              <a:t>Structural</a:t>
+            </a:r>
+            <a:r>
+              <a:rPr lang="de-DE" b="0" i="1" dirty="0">
+                <a:solidFill>
+                  <a:schemeClr val="bg1"/>
+                </a:solidFill>
+                <a:effectLst/>
+              </a:rPr>
+              <a:t> </a:t>
+            </a:r>
+            <a:r>
+              <a:rPr lang="de-DE" b="0" i="1" dirty="0" err="1">
+                <a:solidFill>
+                  <a:schemeClr val="bg1"/>
+                </a:solidFill>
+                <a:effectLst/>
+              </a:rPr>
+              <a:t>Factors</a:t>
+            </a:r>
+            <a:r>
+              <a:rPr lang="de-DE" b="0" i="1" dirty="0">
+                <a:solidFill>
+                  <a:schemeClr val="bg1"/>
+                </a:solidFill>
+                <a:effectLst/>
+              </a:rPr>
+              <a:t> </a:t>
+            </a:r>
+            <a:r>
+              <a:rPr lang="de-DE" b="0" i="1" dirty="0" err="1">
+                <a:solidFill>
+                  <a:schemeClr val="bg1"/>
+                </a:solidFill>
+                <a:effectLst/>
+              </a:rPr>
+              <a:t>of</a:t>
+            </a:r>
+            <a:r>
+              <a:rPr lang="de-DE" b="0" i="1" dirty="0">
+                <a:solidFill>
+                  <a:schemeClr val="bg1"/>
+                </a:solidFill>
+                <a:effectLst/>
+              </a:rPr>
+              <a:t> </a:t>
+            </a:r>
+            <a:r>
+              <a:rPr lang="de-DE" b="0" i="1" dirty="0" err="1">
+                <a:solidFill>
+                  <a:schemeClr val="bg1"/>
+                </a:solidFill>
+                <a:effectLst/>
+              </a:rPr>
+              <a:t>the</a:t>
+            </a:r>
+            <a:r>
+              <a:rPr lang="de-DE" b="0" i="1" dirty="0">
+                <a:solidFill>
+                  <a:schemeClr val="bg1"/>
+                </a:solidFill>
+                <a:effectLst/>
+              </a:rPr>
+              <a:t> Middle East </a:t>
+            </a:r>
+            <a:r>
+              <a:rPr lang="de-DE" b="0" i="1" dirty="0" err="1">
+                <a:solidFill>
+                  <a:schemeClr val="bg1"/>
+                </a:solidFill>
+                <a:effectLst/>
+              </a:rPr>
+              <a:t>Respiratory</a:t>
+            </a:r>
+            <a:r>
+              <a:rPr lang="de-DE" b="0" i="1" dirty="0">
+                <a:solidFill>
+                  <a:schemeClr val="bg1"/>
+                </a:solidFill>
+                <a:effectLst/>
+              </a:rPr>
+              <a:t> Syndrome Coronavirus </a:t>
+            </a:r>
+            <a:r>
+              <a:rPr lang="de-DE" b="0" i="1" dirty="0" err="1">
+                <a:solidFill>
+                  <a:schemeClr val="bg1"/>
+                </a:solidFill>
+                <a:effectLst/>
+              </a:rPr>
+              <a:t>Outbreak</a:t>
+            </a:r>
+            <a:r>
+              <a:rPr lang="de-DE" b="0" i="1" dirty="0">
+                <a:solidFill>
+                  <a:schemeClr val="bg1"/>
+                </a:solidFill>
+                <a:effectLst/>
+              </a:rPr>
+              <a:t> </a:t>
+            </a:r>
+            <a:r>
+              <a:rPr lang="de-DE" b="0" i="1" dirty="0" err="1">
+                <a:solidFill>
+                  <a:schemeClr val="bg1"/>
+                </a:solidFill>
+                <a:effectLst/>
+              </a:rPr>
+              <a:t>as</a:t>
+            </a:r>
+            <a:r>
+              <a:rPr lang="de-DE" b="0" i="1" dirty="0">
+                <a:solidFill>
+                  <a:schemeClr val="bg1"/>
+                </a:solidFill>
+                <a:effectLst/>
+              </a:rPr>
+              <a:t> a Public Health Crisis in Korea and Future Response </a:t>
+            </a:r>
+            <a:r>
+              <a:rPr lang="de-DE" b="0" i="1" dirty="0" err="1">
+                <a:solidFill>
+                  <a:schemeClr val="bg1"/>
+                </a:solidFill>
+                <a:effectLst/>
+              </a:rPr>
+              <a:t>Strategies</a:t>
+            </a:r>
+            <a:r>
+              <a:rPr lang="de-DE" b="0" i="1" dirty="0">
+                <a:solidFill>
+                  <a:schemeClr val="bg1"/>
+                </a:solidFill>
+                <a:effectLst/>
+              </a:rPr>
+              <a:t>.'</a:t>
+            </a:r>
+            <a:endParaRPr lang="en-GB" i="1" dirty="0">
+              <a:solidFill>
+                <a:schemeClr val="bg1"/>
+              </a:solidFill>
+              <a:ea typeface="Amiri" panose="00000500000000000000" pitchFamily="2" charset="-78"/>
+              <a:cs typeface="Amiri" panose="00000500000000000000" pitchFamily="2" charset="-78"/>
+            </a:endParaRPr>
+          </a:p>
+        </p:txBody>
+      </p:sp>
+      <p:sp>
+        <p:nvSpPr>
+          <p:cNvPr id="12" name="Oval 11">
+            <a:extLst>
+              <a:ext uri="{FF2B5EF4-FFF2-40B4-BE49-F238E27FC236}">
+                <a16:creationId xmlns:a16="http://schemas.microsoft.com/office/drawing/2014/main" id="{12FDE60B-1CB9-472A-CD1E-4F1060863DB4}"/>
+              </a:ext>
+            </a:extLst>
+          </p:cNvPr>
+          <p:cNvSpPr/>
+          <p:nvPr/>
+        </p:nvSpPr>
+        <p:spPr>
+          <a:xfrm>
+            <a:off x="4542503" y="2281084"/>
+            <a:ext cx="1012723" cy="255639"/>
+          </a:xfrm>
+          <a:prstGeom prst="ellipse">
+            <a:avLst/>
+          </a:prstGeom>
+          <a:noFill/>
+          <a:ln>
+            <a:solidFill>
+              <a:schemeClr val="bg1"/>
+            </a:solidFill>
+          </a:ln>
+        </p:spPr>
+        <p:style>
+          <a:lnRef idx="2">
+            <a:schemeClr val="accent1">
+              <a:shade val="15000"/>
+            </a:schemeClr>
+          </a:lnRef>
+          <a:fillRef idx="1">
+            <a:schemeClr val="accent1"/>
+          </a:fillRef>
+          <a:effectRef idx="0">
+            <a:schemeClr val="accent1"/>
+          </a:effectRef>
+          <a:fontRef idx="minor">
+            <a:schemeClr val="lt1"/>
+          </a:fontRef>
+        </p:style>
+        <p:txBody>
+          <a:bodyPr rtlCol="0" anchor="ctr"/>
+          <a:lstStyle/>
+          <a:p>
+            <a:pPr algn="ctr"/>
+            <a:endParaRPr lang="en-GB"/>
+          </a:p>
+        </p:txBody>
+      </p:sp>
+      <p:sp>
+        <p:nvSpPr>
+          <p:cNvPr id="13" name="Textfeld 12">
+            <a:extLst>
+              <a:ext uri="{FF2B5EF4-FFF2-40B4-BE49-F238E27FC236}">
+                <a16:creationId xmlns:a16="http://schemas.microsoft.com/office/drawing/2014/main" id="{14A4CD9A-2C71-EF95-3920-40D5734C81EB}"/>
+              </a:ext>
+            </a:extLst>
+          </p:cNvPr>
+          <p:cNvSpPr txBox="1"/>
+          <p:nvPr/>
+        </p:nvSpPr>
+        <p:spPr>
+          <a:xfrm>
+            <a:off x="3927987" y="3807995"/>
+            <a:ext cx="4336025" cy="646331"/>
+          </a:xfrm>
+          <a:prstGeom prst="rect">
+            <a:avLst/>
+          </a:prstGeom>
+          <a:solidFill>
+            <a:schemeClr val="bg1">
+              <a:alpha val="43172"/>
+            </a:schemeClr>
+          </a:solidFill>
+          <a:ln w="38100">
+            <a:solidFill>
+              <a:schemeClr val="bg1"/>
+            </a:solidFill>
+          </a:ln>
+        </p:spPr>
+        <p:txBody>
+          <a:bodyPr wrap="square" rtlCol="0">
+            <a:spAutoFit/>
+          </a:bodyPr>
+          <a:lstStyle/>
+          <a:p>
+            <a:pPr algn="ctr"/>
+            <a:r>
+              <a:rPr lang="en-GB" b="0" i="0" dirty="0">
+                <a:solidFill>
+                  <a:schemeClr val="bg1"/>
+                </a:solidFill>
+                <a:effectLst/>
+              </a:rPr>
+              <a:t>Test: Successful</a:t>
+            </a:r>
+          </a:p>
+          <a:p>
+            <a:pPr algn="ctr"/>
+            <a:r>
+              <a:rPr lang="en-GB" b="0" i="0" dirty="0">
+                <a:solidFill>
+                  <a:schemeClr val="bg1"/>
+                </a:solidFill>
+                <a:effectLst/>
+              </a:rPr>
+              <a:t>It’s working</a:t>
+            </a:r>
+            <a:endParaRPr lang="en-GB" i="1" dirty="0">
+              <a:solidFill>
+                <a:schemeClr val="bg1"/>
+              </a:solidFill>
+              <a:ea typeface="Amiri" panose="00000500000000000000" pitchFamily="2" charset="-78"/>
+              <a:cs typeface="Amiri" panose="00000500000000000000" pitchFamily="2" charset="-78"/>
+            </a:endParaRPr>
           </a:p>
         </p:txBody>
       </p:sp>
     </p:spTree>
     <p:extLst>
       <p:ext uri="{BB962C8B-B14F-4D97-AF65-F5344CB8AC3E}">
-        <p14:creationId xmlns:p14="http://schemas.microsoft.com/office/powerpoint/2010/main" val="4284355835"/>
+        <p14:creationId xmlns:p14="http://schemas.microsoft.com/office/powerpoint/2010/main" val="3181514972"/>
       </p:ext>
     </p:extLst>
   </p:cSld>
   <p:clrMapOvr>
     <a:masterClrMapping/>
   </p:clrMapOvr>
+  <p:timing>
+    <p:tnLst>
+      <p:par>
+        <p:cTn id="1" dur="indefinite" restart="never" nodeType="tmRoot">
+          <p:childTnLst>
+            <p:seq concurrent="1" nextAc="seek">
+              <p:cTn id="2" dur="indefinite" nodeType="mainSeq">
+                <p:childTnLst>
+                  <p:par>
+                    <p:cTn id="3" fill="hold">
+                      <p:stCondLst>
+                        <p:cond delay="indefinite"/>
+                      </p:stCondLst>
+                      <p:childTnLst>
+                        <p:par>
+                          <p:cTn id="4" fill="hold">
+                            <p:stCondLst>
+                              <p:cond delay="0"/>
+                            </p:stCondLst>
+                            <p:childTnLst>
+                              <p:par>
+                                <p:cTn id="5" presetID="1" presetClass="entr" presetSubtype="0" fill="hold" grpId="0" nodeType="clickEffect">
+                                  <p:stCondLst>
+                                    <p:cond delay="0"/>
+                                  </p:stCondLst>
+                                  <p:childTnLst>
+                                    <p:set>
+                                      <p:cBhvr>
+                                        <p:cTn id="6" dur="1" fill="hold">
+                                          <p:stCondLst>
+                                            <p:cond delay="0"/>
+                                          </p:stCondLst>
+                                        </p:cTn>
+                                        <p:tgtEl>
+                                          <p:spTgt spid="11"/>
+                                        </p:tgtEl>
+                                        <p:attrNameLst>
+                                          <p:attrName>style.visibility</p:attrName>
+                                        </p:attrNameLst>
+                                      </p:cBhvr>
+                                      <p:to>
+                                        <p:strVal val="visible"/>
+                                      </p:to>
+                                    </p:set>
+                                  </p:childTnLst>
+                                </p:cTn>
+                              </p:par>
+                            </p:childTnLst>
+                          </p:cTn>
+                        </p:par>
+                      </p:childTnLst>
+                    </p:cTn>
+                  </p:par>
+                  <p:par>
+                    <p:cTn id="7" fill="hold">
+                      <p:stCondLst>
+                        <p:cond delay="indefinite"/>
+                      </p:stCondLst>
+                      <p:childTnLst>
+                        <p:par>
+                          <p:cTn id="8" fill="hold">
+                            <p:stCondLst>
+                              <p:cond delay="0"/>
+                            </p:stCondLst>
+                            <p:childTnLst>
+                              <p:par>
+                                <p:cTn id="9" presetID="1" presetClass="entr" presetSubtype="0" fill="hold" grpId="0" nodeType="clickEffect">
+                                  <p:stCondLst>
+                                    <p:cond delay="0"/>
+                                  </p:stCondLst>
+                                  <p:childTnLst>
+                                    <p:set>
+                                      <p:cBhvr>
+                                        <p:cTn id="10" dur="1" fill="hold">
+                                          <p:stCondLst>
+                                            <p:cond delay="0"/>
+                                          </p:stCondLst>
+                                        </p:cTn>
+                                        <p:tgtEl>
+                                          <p:spTgt spid="13"/>
+                                        </p:tgtEl>
+                                        <p:attrNameLst>
+                                          <p:attrName>style.visibility</p:attrName>
+                                        </p:attrNameLst>
+                                      </p:cBhvr>
+                                      <p:to>
+                                        <p:strVal val="visible"/>
+                                      </p:to>
+                                    </p:set>
+                                  </p:childTnLst>
+                                </p:cTn>
+                              </p:par>
+                            </p:childTnLst>
+                          </p:cTn>
+                        </p:par>
+                      </p:childTnLst>
+                    </p:cTn>
+                  </p:par>
+                </p:childTnLst>
+              </p:cTn>
+              <p:prevCondLst>
+                <p:cond evt="onPrev" delay="0">
+                  <p:tgtEl>
+                    <p:sldTgt/>
+                  </p:tgtEl>
+                </p:cond>
+              </p:prevCondLst>
+              <p:nextCondLst>
+                <p:cond evt="onNext" delay="0">
+                  <p:tgtEl>
+                    <p:sldTgt/>
+                  </p:tgtEl>
+                </p:cond>
+              </p:nextCondLst>
+            </p:seq>
+          </p:childTnLst>
+        </p:cTn>
+      </p:par>
+    </p:tnLst>
+    <p:bldLst>
+      <p:bldP spid="11" grpId="0" animBg="1"/>
+      <p:bldP spid="13" grpId="0" animBg="1"/>
+    </p:bldLst>
+  </p:timing>
 </p:sld>
 </file>
 
@@ -13527,7 +14643,7 @@
         <p:spPr>
           <a:xfrm>
             <a:off x="4222035" y="495183"/>
-            <a:ext cx="7597750" cy="523220"/>
+            <a:ext cx="7597750" cy="954107"/>
           </a:xfrm>
           <a:prstGeom prst="rect">
             <a:avLst/>
@@ -13550,17 +14666,34 @@
                 </a:solidFill>
                 <a:cs typeface="Amiri"/>
               </a:rPr>
-              <a:t>Vector database: </a:t>
-            </a:r>
-            <a:r>
-              <a:rPr lang="en-GB" sz="2800" b="1" i="1" dirty="0">
+              <a:t>Embeddings: </a:t>
+            </a:r>
+          </a:p>
+          <a:p>
+            <a:r>
+              <a:rPr lang="en-GB" sz="2800" b="1" dirty="0">
                 <a:solidFill>
                   <a:schemeClr val="accent2"/>
                 </a:solidFill>
                 <a:cs typeface="Amiri"/>
               </a:rPr>
-              <a:t>Pinecone</a:t>
-            </a:r>
+              <a:t>1) </a:t>
+            </a:r>
+            <a:r>
+              <a:rPr lang="en-GB" sz="2800" b="1" dirty="0" err="1">
+                <a:solidFill>
+                  <a:schemeClr val="accent2"/>
+                </a:solidFill>
+                <a:cs typeface="Amiri"/>
+              </a:rPr>
+              <a:t>BioBERT</a:t>
+            </a:r>
+            <a:endParaRPr lang="en-GB" sz="2800" b="1" i="1" dirty="0">
+              <a:solidFill>
+                <a:schemeClr val="accent2"/>
+              </a:solidFill>
+              <a:cs typeface="Amiri"/>
+            </a:endParaRPr>
           </a:p>
         </p:txBody>
       </p:sp>
@@ -13681,10 +14814,7 @@
             <a:r>
               <a:rPr lang="en-GB" sz="2000" dirty="0">
                 <a:solidFill>
-                  <a:schemeClr val="accent1">
-                    <a:lumMod val="60000"/>
-                    <a:lumOff val="40000"/>
-                  </a:schemeClr>
+                  <a:schemeClr val="bg1"/>
                 </a:solidFill>
                 <a:cs typeface="Calibri"/>
               </a:rPr>
@@ -13702,36 +14832,13 @@
             <a:r>
               <a:rPr lang="en-GB" sz="2000" dirty="0">
                 <a:solidFill>
-                  <a:schemeClr val="bg1"/>
-                </a:solidFill>
-              </a:rPr>
-              <a:t>Vector database</a:t>
-            </a:r>
-            <a:endParaRPr lang="en-GB" sz="2000" dirty="0">
-              <a:solidFill>
-                <a:schemeClr val="bg1"/>
-              </a:solidFill>
-              <a:cs typeface="Calibri" panose="020F0502020204030204"/>
-            </a:endParaRPr>
-          </a:p>
-          <a:p>
-            <a:pPr marL="534670" indent="-260350">
-              <a:lnSpc>
-                <a:spcPct val="150000"/>
-              </a:lnSpc>
-              <a:buFont typeface="Arial" panose="020B0604020202020204" pitchFamily="34" charset="0"/>
-              <a:buChar char="•"/>
-            </a:pPr>
-            <a:r>
-              <a:rPr lang="en-GB" sz="2000" dirty="0">
-                <a:solidFill>
                   <a:schemeClr val="accent1">
                     <a:lumMod val="60000"/>
                     <a:lumOff val="40000"/>
                   </a:schemeClr>
                 </a:solidFill>
               </a:rPr>
-              <a:t>Ongoing and upcoming steps</a:t>
+              <a:t>Vector database</a:t>
             </a:r>
             <a:endParaRPr lang="en-GB" sz="2000" dirty="0">
               <a:solidFill>
@@ -13743,6 +14850,35 @@
               <a:cs typeface="Calibri" panose="020F0502020204030204"/>
             </a:endParaRPr>
           </a:p>
+          <a:p>
+            <a:pPr marL="534670" indent="-260350">
+              <a:lnSpc>
+                <a:spcPct val="150000"/>
+              </a:lnSpc>
+              <a:buFont typeface="Arial" panose="020B0604020202020204" pitchFamily="34" charset="0"/>
+              <a:buChar char="•"/>
+            </a:pPr>
+            <a:r>
+              <a:rPr lang="en-GB" sz="2000" dirty="0">
+                <a:solidFill>
+                  <a:schemeClr val="accent1">
+                    <a:lumMod val="60000"/>
+                    <a:lumOff val="40000"/>
+                  </a:schemeClr>
+                </a:solidFill>
+              </a:rPr>
+              <a:t>Ongoing and upcoming steps</a:t>
+            </a:r>
+            <a:endParaRPr lang="en-GB" sz="2000" dirty="0">
+              <a:solidFill>
+                <a:schemeClr val="accent1">
+                  <a:lumMod val="60000"/>
+                  <a:lumOff val="40000"/>
+                </a:schemeClr>
+              </a:solidFill>
+              <a:cs typeface="Calibri" panose="020F0502020204030204"/>
+            </a:endParaRPr>
+          </a:p>
         </p:txBody>
       </p:sp>
       <p:sp>
@@ -13750,7 +14886,7 @@
           <p:cNvPr id="2" name="CasellaDiTesto 1">
             <a:extLst>
               <a:ext uri="{FF2B5EF4-FFF2-40B4-BE49-F238E27FC236}">
-                <a16:creationId xmlns:a16="http://schemas.microsoft.com/office/drawing/2014/main" id="{382F9775-B4CD-186B-CDD2-51600389EE4E}"/>
+                <a16:creationId xmlns:a16="http://schemas.microsoft.com/office/drawing/2014/main" id="{6AA15AAD-AA64-943C-A4EE-F6AF73B6F501}"/>
               </a:ext>
             </a:extLst>
           </p:cNvPr>
@@ -13831,10 +14967,10 @@
       </p:sp>
       <p:sp>
         <p:nvSpPr>
-          <p:cNvPr id="3" name="TextBox 2">
+          <p:cNvPr id="3" name="Textfeld 5">
             <a:extLst>
               <a:ext uri="{FF2B5EF4-FFF2-40B4-BE49-F238E27FC236}">
-                <a16:creationId xmlns:a16="http://schemas.microsoft.com/office/drawing/2014/main" id="{AEABEB8D-9703-6182-6051-8251D74D324F}"/>
+                <a16:creationId xmlns:a16="http://schemas.microsoft.com/office/drawing/2014/main" id="{8009F741-D801-DB89-0D41-FE28E9BDC586}"/>
               </a:ext>
             </a:extLst>
           </p:cNvPr>
@@ -13843,8 +14979,8 @@
         </p:nvSpPr>
         <p:spPr>
           <a:xfrm>
-            <a:off x="4222035" y="1469559"/>
-            <a:ext cx="6274676" cy="1477328"/>
+            <a:off x="4377382" y="1318123"/>
+            <a:ext cx="7597750" cy="1703030"/>
           </a:xfrm>
           <a:prstGeom prst="rect">
             <a:avLst/>
@@ -13852,12 +14988,15 @@
           <a:noFill/>
         </p:spPr>
         <p:txBody>
-          <a:bodyPr wrap="square">
+          <a:bodyPr wrap="square" rtlCol="0">
             <a:spAutoFit/>
           </a:bodyPr>
           <a:lstStyle/>
           <a:p>
-            <a:pPr marL="285750" indent="-285750" algn="l">
+            <a:pPr marL="285750" indent="-285750">
+              <a:lnSpc>
+                <a:spcPct val="150000"/>
+              </a:lnSpc>
               <a:buFont typeface="Arial" panose="020B0604020202020204" pitchFamily="34" charset="0"/>
               <a:buChar char="•"/>
             </a:pPr>
@@ -13870,15 +15009,9 @@
                 <a:ea typeface="Amiri" panose="00000500000000000000" pitchFamily="2" charset="-78"/>
                 <a:cs typeface="Amiri" panose="00000500000000000000" pitchFamily="2" charset="-78"/>
               </a:rPr>
-              <a:t>Create a free pinecone account</a:t>
-            </a:r>
-          </a:p>
-          <a:p>
-            <a:pPr marL="285750" indent="-285750" algn="l">
-              <a:buFont typeface="Arial" panose="020B0604020202020204" pitchFamily="34" charset="0"/>
-              <a:buChar char="•"/>
-            </a:pPr>
-            <a:r>
+              <a:t>domain-specific adaptation of BERT model, pre-</a:t>
+            </a:r>
+            <a:br>
               <a:rPr lang="en-GB" dirty="0">
                 <a:solidFill>
                   <a:schemeClr val="accent2"/>
@@ -13887,19 +15020,7 @@
                 <a:ea typeface="Amiri" panose="00000500000000000000" pitchFamily="2" charset="-78"/>
                 <a:cs typeface="Amiri" panose="00000500000000000000" pitchFamily="2" charset="-78"/>
               </a:rPr>
-              <a:t>Write a ‘</a:t>
-            </a:r>
-            <a:r>
-              <a:rPr lang="en-GB" dirty="0" err="1">
-                <a:solidFill>
-                  <a:schemeClr val="accent2"/>
-                </a:solidFill>
-                <a:latin typeface="Amiri" panose="00000500000000000000" pitchFamily="2" charset="-78"/>
-                <a:ea typeface="Amiri" panose="00000500000000000000" pitchFamily="2" charset="-78"/>
-                <a:cs typeface="Amiri" panose="00000500000000000000" pitchFamily="2" charset="-78"/>
-              </a:rPr>
-              <a:t>PineconeHandler</a:t>
-            </a:r>
+            </a:br>
             <a:r>
               <a:rPr lang="en-GB" dirty="0">
                 <a:solidFill>
@@ -13909,11 +15030,14 @@
                 <a:ea typeface="Amiri" panose="00000500000000000000" pitchFamily="2" charset="-78"/>
                 <a:cs typeface="Amiri" panose="00000500000000000000" pitchFamily="2" charset="-78"/>
               </a:rPr>
-              <a:t>’ class for various operations within Pinecone</a:t>
-            </a:r>
-          </a:p>
-          <a:p>
-            <a:pPr marL="285750" indent="-285750" algn="l">
+              <a:t>trained on large-scale PubMed corpus</a:t>
+            </a:r>
+          </a:p>
+          <a:p>
+            <a:pPr marL="285750" indent="-285750">
+              <a:lnSpc>
+                <a:spcPct val="150000"/>
+              </a:lnSpc>
               <a:buFont typeface="Arial" panose="020B0604020202020204" pitchFamily="34" charset="0"/>
               <a:buChar char="•"/>
             </a:pPr>
@@ -13926,19 +15050,17 @@
                 <a:ea typeface="Amiri" panose="00000500000000000000" pitchFamily="2" charset="-78"/>
                 <a:cs typeface="Amiri" panose="00000500000000000000" pitchFamily="2" charset="-78"/>
               </a:rPr>
-              <a:t>Write an ‘</a:t>
-            </a:r>
-            <a:r>
-              <a:rPr lang="en-GB" dirty="0" err="1">
-                <a:solidFill>
-                  <a:schemeClr val="accent2"/>
-                </a:solidFill>
-                <a:latin typeface="Amiri" panose="00000500000000000000" pitchFamily="2" charset="-78"/>
-                <a:ea typeface="Amiri" panose="00000500000000000000" pitchFamily="2" charset="-78"/>
-                <a:cs typeface="Amiri" panose="00000500000000000000" pitchFamily="2" charset="-78"/>
-              </a:rPr>
-              <a:t>upload_embeddings</a:t>
-            </a:r>
+              <a:t>capture the context and semantics of biomedical texts</a:t>
+            </a:r>
+          </a:p>
+          <a:p>
+            <a:pPr marL="285750" indent="-285750">
+              <a:lnSpc>
+                <a:spcPct val="150000"/>
+              </a:lnSpc>
+              <a:buFont typeface="Arial" panose="020B0604020202020204" pitchFamily="34" charset="0"/>
+              <a:buChar char="•"/>
+            </a:pPr>
             <a:r>
               <a:rPr lang="en-GB" dirty="0">
                 <a:solidFill>
@@ -13948,19 +15070,46 @@
                 <a:ea typeface="Amiri" panose="00000500000000000000" pitchFamily="2" charset="-78"/>
                 <a:cs typeface="Amiri" panose="00000500000000000000" pitchFamily="2" charset="-78"/>
               </a:rPr>
-              <a:t>’ notebook to </a:t>
-            </a:r>
-            <a:r>
-              <a:rPr lang="en-GB" dirty="0" err="1">
-                <a:solidFill>
-                  <a:schemeClr val="accent2"/>
-                </a:solidFill>
-                <a:latin typeface="Amiri" panose="00000500000000000000" pitchFamily="2" charset="-78"/>
-                <a:ea typeface="Amiri" panose="00000500000000000000" pitchFamily="2" charset="-78"/>
-                <a:cs typeface="Amiri" panose="00000500000000000000" pitchFamily="2" charset="-78"/>
-              </a:rPr>
-              <a:t>upsert</a:t>
-            </a:r>
+              <a:t>used pre-trained version</a:t>
+            </a:r>
+          </a:p>
+        </p:txBody>
+      </p:sp>
+      <p:sp>
+        <p:nvSpPr>
+          <p:cNvPr id="4" name="Textfeld 5">
+            <a:extLst>
+              <a:ext uri="{FF2B5EF4-FFF2-40B4-BE49-F238E27FC236}">
+                <a16:creationId xmlns:a16="http://schemas.microsoft.com/office/drawing/2014/main" id="{8BA961DA-666B-BF2C-6C94-BE75085C754D}"/>
+              </a:ext>
+            </a:extLst>
+          </p:cNvPr>
+          <p:cNvSpPr txBox="1"/>
+          <p:nvPr/>
+        </p:nvSpPr>
+        <p:spPr>
+          <a:xfrm>
+            <a:off x="4377382" y="3322248"/>
+            <a:ext cx="7597750" cy="456535"/>
+          </a:xfrm>
+          <a:prstGeom prst="rect">
+            <a:avLst/>
+          </a:prstGeom>
+          <a:noFill/>
+        </p:spPr>
+        <p:txBody>
+          <a:bodyPr wrap="square" rtlCol="0">
+            <a:spAutoFit/>
+          </a:bodyPr>
+          <a:lstStyle/>
+          <a:p>
+            <a:pPr marL="285750" indent="-285750">
+              <a:lnSpc>
+                <a:spcPct val="150000"/>
+              </a:lnSpc>
+              <a:buFont typeface="Arial" panose="020B0604020202020204" pitchFamily="34" charset="0"/>
+              <a:buChar char="•"/>
+            </a:pPr>
             <a:r>
               <a:rPr lang="en-GB" dirty="0">
                 <a:solidFill>
@@ -13970,15 +15119,176 @@
                 <a:ea typeface="Amiri" panose="00000500000000000000" pitchFamily="2" charset="-78"/>
                 <a:cs typeface="Amiri" panose="00000500000000000000" pitchFamily="2" charset="-78"/>
               </a:rPr>
-              <a:t> embeddings into pinecone</a:t>
-            </a:r>
+              <a:t>To-Do: fine-tune on own data?</a:t>
+            </a:r>
+          </a:p>
+        </p:txBody>
+      </p:sp>
+      <p:sp>
+        <p:nvSpPr>
+          <p:cNvPr id="6" name="CasellaDiTesto 6">
+            <a:extLst>
+              <a:ext uri="{FF2B5EF4-FFF2-40B4-BE49-F238E27FC236}">
+                <a16:creationId xmlns:a16="http://schemas.microsoft.com/office/drawing/2014/main" id="{4403256D-D5DE-4BB8-FE9F-01BC28082B63}"/>
+              </a:ext>
+            </a:extLst>
+          </p:cNvPr>
+          <p:cNvSpPr txBox="1"/>
+          <p:nvPr/>
+        </p:nvSpPr>
+        <p:spPr>
+          <a:xfrm>
+            <a:off x="4377382" y="4046513"/>
+            <a:ext cx="7597750" cy="523220"/>
+          </a:xfrm>
+          <a:prstGeom prst="rect">
+            <a:avLst/>
+          </a:prstGeom>
+          <a:noFill/>
+        </p:spPr>
+        <p:txBody>
+          <a:bodyPr rot="0" spcFirstLastPara="0" vertOverflow="overflow" horzOverflow="overflow" vert="horz" wrap="square" lIns="91440" tIns="45720" rIns="91440" bIns="45720" numCol="1" spcCol="0" rtlCol="0" fromWordArt="0" anchor="t" anchorCtr="0" forceAA="0" compatLnSpc="1">
+            <a:prstTxWarp prst="textNoShape">
+              <a:avLst/>
+            </a:prstTxWarp>
+            <a:spAutoFit/>
+          </a:bodyPr>
+          <a:lstStyle/>
+          <a:p>
+            <a:r>
+              <a:rPr lang="en-GB" sz="2800" b="1" dirty="0">
+                <a:solidFill>
+                  <a:schemeClr val="accent2"/>
+                </a:solidFill>
+                <a:cs typeface="Amiri"/>
+              </a:rPr>
+              <a:t>2) To-Do: Embedding-Pipeline</a:t>
+            </a:r>
+            <a:endParaRPr lang="en-GB" sz="2800" b="1" i="1" dirty="0">
+              <a:solidFill>
+                <a:schemeClr val="accent2"/>
+              </a:solidFill>
+              <a:cs typeface="Amiri"/>
+            </a:endParaRPr>
+          </a:p>
+        </p:txBody>
+      </p:sp>
+      <p:sp>
+        <p:nvSpPr>
+          <p:cNvPr id="9" name="Textfeld 5">
+            <a:extLst>
+              <a:ext uri="{FF2B5EF4-FFF2-40B4-BE49-F238E27FC236}">
+                <a16:creationId xmlns:a16="http://schemas.microsoft.com/office/drawing/2014/main" id="{FF3FAABA-610A-6334-00E8-91128EC32770}"/>
+              </a:ext>
+            </a:extLst>
+          </p:cNvPr>
+          <p:cNvSpPr txBox="1"/>
+          <p:nvPr/>
+        </p:nvSpPr>
+        <p:spPr>
+          <a:xfrm>
+            <a:off x="4377382" y="4688477"/>
+            <a:ext cx="7597750" cy="1703030"/>
+          </a:xfrm>
+          <a:prstGeom prst="rect">
+            <a:avLst/>
+          </a:prstGeom>
+          <a:noFill/>
+        </p:spPr>
+        <p:txBody>
+          <a:bodyPr wrap="square" rtlCol="0">
+            <a:spAutoFit/>
+          </a:bodyPr>
+          <a:lstStyle/>
+          <a:p>
+            <a:pPr marL="285750" indent="-285750">
+              <a:lnSpc>
+                <a:spcPct val="150000"/>
+              </a:lnSpc>
+              <a:buFont typeface="Arial" panose="020B0604020202020204" pitchFamily="34" charset="0"/>
+              <a:buChar char="•"/>
+            </a:pPr>
+            <a:r>
+              <a:rPr lang="en-GB" dirty="0">
+                <a:solidFill>
+                  <a:schemeClr val="accent2"/>
+                </a:solidFill>
+                <a:latin typeface="Amiri" panose="00000500000000000000" pitchFamily="2" charset="-78"/>
+                <a:ea typeface="Amiri" panose="00000500000000000000" pitchFamily="2" charset="-78"/>
+                <a:cs typeface="Amiri" panose="00000500000000000000" pitchFamily="2" charset="-78"/>
+              </a:rPr>
+              <a:t>test different embedding models, e.g. </a:t>
+            </a:r>
+            <a:r>
+              <a:rPr lang="en-GB" i="1" dirty="0">
+                <a:solidFill>
+                  <a:schemeClr val="accent2"/>
+                </a:solidFill>
+                <a:latin typeface="Amiri" panose="00000500000000000000" pitchFamily="2" charset="-78"/>
+                <a:ea typeface="Amiri" panose="00000500000000000000" pitchFamily="2" charset="-78"/>
+                <a:cs typeface="Amiri" panose="00000500000000000000" pitchFamily="2" charset="-78"/>
+              </a:rPr>
+              <a:t>SGPT-5.8B-msmarco</a:t>
+            </a:r>
+            <a:r>
+              <a:rPr lang="en-GB" dirty="0">
+                <a:solidFill>
+                  <a:schemeClr val="accent2"/>
+                </a:solidFill>
+                <a:latin typeface="Amiri" panose="00000500000000000000" pitchFamily="2" charset="-78"/>
+                <a:ea typeface="Amiri" panose="00000500000000000000" pitchFamily="2" charset="-78"/>
+                <a:cs typeface="Amiri" panose="00000500000000000000" pitchFamily="2" charset="-78"/>
+              </a:rPr>
+              <a:t> (best results for semantic retrieval, see </a:t>
+            </a:r>
+            <a:r>
+              <a:rPr lang="en-GB" dirty="0">
+                <a:solidFill>
+                  <a:schemeClr val="accent2"/>
+                </a:solidFill>
+                <a:latin typeface="Amiri" panose="00000500000000000000" pitchFamily="2" charset="-78"/>
+                <a:ea typeface="Amiri" panose="00000500000000000000" pitchFamily="2" charset="-78"/>
+                <a:cs typeface="Amiri" panose="00000500000000000000" pitchFamily="2" charset="-78"/>
+                <a:hlinkClick r:id="rId3" tooltip="MTEB: Massive Text Embedding Benchmark"/>
+              </a:rPr>
+              <a:t>MTEB: Massive Text Embedding Benchmark</a:t>
+            </a:r>
+            <a:r>
+              <a:rPr lang="en-GB" dirty="0">
+                <a:solidFill>
+                  <a:schemeClr val="accent2"/>
+                </a:solidFill>
+                <a:latin typeface="Amiri" panose="00000500000000000000" pitchFamily="2" charset="-78"/>
+                <a:ea typeface="Amiri" panose="00000500000000000000" pitchFamily="2" charset="-78"/>
+                <a:cs typeface="Amiri" panose="00000500000000000000" pitchFamily="2" charset="-78"/>
+              </a:rPr>
+              <a:t>)</a:t>
+            </a:r>
+            <a:br>
+              <a:rPr lang="en-GB" dirty="0">
+                <a:solidFill>
+                  <a:schemeClr val="accent2"/>
+                </a:solidFill>
+                <a:latin typeface="Amiri" panose="00000500000000000000" pitchFamily="2" charset="-78"/>
+                <a:ea typeface="Amiri" panose="00000500000000000000" pitchFamily="2" charset="-78"/>
+                <a:cs typeface="Amiri" panose="00000500000000000000" pitchFamily="2" charset="-78"/>
+              </a:rPr>
+            </a:br>
+            <a:endParaRPr lang="en-GB" dirty="0">
+              <a:solidFill>
+                <a:schemeClr val="accent2"/>
+              </a:solidFill>
+              <a:latin typeface="Amiri" panose="00000500000000000000" pitchFamily="2" charset="-78"/>
+              <a:ea typeface="Amiri" panose="00000500000000000000" pitchFamily="2" charset="-78"/>
+              <a:cs typeface="Amiri" panose="00000500000000000000" pitchFamily="2" charset="-78"/>
+            </a:endParaRPr>
           </a:p>
         </p:txBody>
       </p:sp>
     </p:spTree>
     <p:extLst>
       <p:ext uri="{BB962C8B-B14F-4D97-AF65-F5344CB8AC3E}">
-        <p14:creationId xmlns:p14="http://schemas.microsoft.com/office/powerpoint/2010/main" val="2013407633"/>
+        <p14:creationId xmlns:p14="http://schemas.microsoft.com/office/powerpoint/2010/main" val="120647077"/>
       </p:ext>
     </p:extLst>
   </p:cSld>
@@ -14070,53 +15380,10 @@
       </p:sp>
       <p:sp>
         <p:nvSpPr>
-          <p:cNvPr id="5" name="CasellaDiTesto 1">
-            <a:extLst>
-              <a:ext uri="{FF2B5EF4-FFF2-40B4-BE49-F238E27FC236}">
-                <a16:creationId xmlns:a16="http://schemas.microsoft.com/office/drawing/2014/main" id="{C95A19C8-8308-645B-35D1-F3852392CC09}"/>
-              </a:ext>
-            </a:extLst>
-          </p:cNvPr>
-          <p:cNvSpPr txBox="1"/>
-          <p:nvPr/>
-        </p:nvSpPr>
-        <p:spPr>
-          <a:xfrm>
-            <a:off x="912778" y="454308"/>
-            <a:ext cx="9305279" cy="523220"/>
-          </a:xfrm>
-          <a:prstGeom prst="rect">
-            <a:avLst/>
-          </a:prstGeom>
-          <a:noFill/>
-        </p:spPr>
-        <p:txBody>
-          <a:bodyPr rot="0" spcFirstLastPara="0" vertOverflow="overflow" horzOverflow="overflow" vert="horz" wrap="square" lIns="91440" tIns="45720" rIns="91440" bIns="45720" numCol="1" spcCol="0" rtlCol="0" fromWordArt="0" anchor="t" anchorCtr="0" forceAA="0" compatLnSpc="1">
-            <a:prstTxWarp prst="textNoShape">
-              <a:avLst/>
-            </a:prstTxWarp>
-            <a:spAutoFit/>
-          </a:bodyPr>
-          <a:lstStyle/>
-          <a:p>
-            <a:r>
-              <a:rPr lang="en-GB" sz="2800" b="1" dirty="0">
-                <a:solidFill>
-                  <a:schemeClr val="accent2"/>
-                </a:solidFill>
-                <a:cs typeface="Amiri"/>
-              </a:rPr>
-              <a:t>Python script to upload embeddings</a:t>
-            </a:r>
-          </a:p>
-        </p:txBody>
-      </p:sp>
-      <p:sp>
-        <p:nvSpPr>
           <p:cNvPr id="2" name="CasellaDiTesto 1">
             <a:extLst>
               <a:ext uri="{FF2B5EF4-FFF2-40B4-BE49-F238E27FC236}">
-                <a16:creationId xmlns:a16="http://schemas.microsoft.com/office/drawing/2014/main" id="{3C79C3FC-CB68-9C17-5BE9-45C518EBF9F3}"/>
+                <a16:creationId xmlns:a16="http://schemas.microsoft.com/office/drawing/2014/main" id="{6FE84CCB-E39C-D846-E01E-8D68D6243FD9}"/>
               </a:ext>
             </a:extLst>
           </p:cNvPr>
@@ -14195,10 +15462,53 @@
           </a:p>
         </p:txBody>
       </p:sp>
+      <p:sp>
+        <p:nvSpPr>
+          <p:cNvPr id="3" name="CasellaDiTesto 1">
+            <a:extLst>
+              <a:ext uri="{FF2B5EF4-FFF2-40B4-BE49-F238E27FC236}">
+                <a16:creationId xmlns:a16="http://schemas.microsoft.com/office/drawing/2014/main" id="{4DDB1793-A519-F762-FB6C-6F3790EB18B8}"/>
+              </a:ext>
+            </a:extLst>
+          </p:cNvPr>
+          <p:cNvSpPr txBox="1"/>
+          <p:nvPr/>
+        </p:nvSpPr>
+        <p:spPr>
+          <a:xfrm>
+            <a:off x="980512" y="2621775"/>
+            <a:ext cx="9305279" cy="954107"/>
+          </a:xfrm>
+          <a:prstGeom prst="rect">
+            <a:avLst/>
+          </a:prstGeom>
+          <a:noFill/>
+        </p:spPr>
+        <p:txBody>
+          <a:bodyPr rot="0" spcFirstLastPara="0" vertOverflow="overflow" horzOverflow="overflow" vert="horz" wrap="square" lIns="91440" tIns="45720" rIns="91440" bIns="45720" numCol="1" spcCol="0" rtlCol="0" fromWordArt="0" anchor="t" anchorCtr="0" forceAA="0" compatLnSpc="1">
+            <a:prstTxWarp prst="textNoShape">
+              <a:avLst/>
+            </a:prstTxWarp>
+            <a:spAutoFit/>
+          </a:bodyPr>
+          <a:lstStyle/>
+          <a:p>
+            <a:r>
+              <a:rPr lang="en-GB" sz="2800" b="1" dirty="0">
+                <a:solidFill>
+                  <a:schemeClr val="accent2"/>
+                </a:solidFill>
+                <a:cs typeface="Amiri"/>
+              </a:rPr>
+              <a:t>Live-Demo: Retrieval of most similar abstracts based on test queries</a:t>
+            </a:r>
+          </a:p>
+        </p:txBody>
+      </p:sp>
     </p:spTree>
     <p:extLst>
       <p:ext uri="{BB962C8B-B14F-4D97-AF65-F5344CB8AC3E}">
-        <p14:creationId xmlns:p14="http://schemas.microsoft.com/office/powerpoint/2010/main" val="3329336041"/>
+        <p14:creationId xmlns:p14="http://schemas.microsoft.com/office/powerpoint/2010/main" val="4284355835"/>
       </p:ext>
     </p:extLst>
   </p:cSld>
@@ -14263,14 +15573,17 @@
                 </a:solidFill>
                 <a:cs typeface="Amiri"/>
               </a:rPr>
-              <a:t>Ongoing steps</a:t>
-            </a:r>
-            <a:endParaRPr lang="en-GB" sz="2800" b="1" i="1" dirty="0">
-              <a:solidFill>
-                <a:schemeClr val="accent2"/>
-              </a:solidFill>
-              <a:cs typeface="Amiri"/>
-            </a:endParaRPr>
+              <a:t>Vector database: </a:t>
+            </a:r>
+            <a:r>
+              <a:rPr lang="en-GB" sz="2800" b="1" i="1" dirty="0">
+                <a:solidFill>
+                  <a:schemeClr val="accent2"/>
+                </a:solidFill>
+                <a:cs typeface="Amiri"/>
+              </a:rPr>
+              <a:t>Pinecone</a:t>
+            </a:r>
           </a:p>
         </p:txBody>
       </p:sp>
@@ -14412,6 +15725,716 @@
             <a:r>
               <a:rPr lang="en-GB" sz="2000" dirty="0">
                 <a:solidFill>
+                  <a:schemeClr val="bg1"/>
+                </a:solidFill>
+              </a:rPr>
+              <a:t>Vector database</a:t>
+            </a:r>
+            <a:endParaRPr lang="en-GB" sz="2000" dirty="0">
+              <a:solidFill>
+                <a:schemeClr val="bg1"/>
+              </a:solidFill>
+              <a:cs typeface="Calibri" panose="020F0502020204030204"/>
+            </a:endParaRPr>
+          </a:p>
+          <a:p>
+            <a:pPr marL="534670" indent="-260350">
+              <a:lnSpc>
+                <a:spcPct val="150000"/>
+              </a:lnSpc>
+              <a:buFont typeface="Arial" panose="020B0604020202020204" pitchFamily="34" charset="0"/>
+              <a:buChar char="•"/>
+            </a:pPr>
+            <a:r>
+              <a:rPr lang="en-GB" sz="2000" dirty="0">
+                <a:solidFill>
+                  <a:schemeClr val="accent1">
+                    <a:lumMod val="60000"/>
+                    <a:lumOff val="40000"/>
+                  </a:schemeClr>
+                </a:solidFill>
+              </a:rPr>
+              <a:t>Ongoing and upcoming steps</a:t>
+            </a:r>
+            <a:endParaRPr lang="en-GB" sz="2000" dirty="0">
+              <a:solidFill>
+                <a:schemeClr val="accent1">
+                  <a:lumMod val="60000"/>
+                  <a:lumOff val="40000"/>
+                </a:schemeClr>
+              </a:solidFill>
+              <a:cs typeface="Calibri" panose="020F0502020204030204"/>
+            </a:endParaRPr>
+          </a:p>
+        </p:txBody>
+      </p:sp>
+      <p:sp>
+        <p:nvSpPr>
+          <p:cNvPr id="2" name="CasellaDiTesto 1">
+            <a:extLst>
+              <a:ext uri="{FF2B5EF4-FFF2-40B4-BE49-F238E27FC236}">
+                <a16:creationId xmlns:a16="http://schemas.microsoft.com/office/drawing/2014/main" id="{382F9775-B4CD-186B-CDD2-51600389EE4E}"/>
+              </a:ext>
+            </a:extLst>
+          </p:cNvPr>
+          <p:cNvSpPr txBox="1"/>
+          <p:nvPr/>
+        </p:nvSpPr>
+        <p:spPr>
+          <a:xfrm>
+            <a:off x="6429829" y="6465325"/>
+            <a:ext cx="5663318" cy="369332"/>
+          </a:xfrm>
+          <a:prstGeom prst="rect">
+            <a:avLst/>
+          </a:prstGeom>
+          <a:noFill/>
+        </p:spPr>
+        <p:txBody>
+          <a:bodyPr wrap="square" rtlCol="0">
+            <a:spAutoFit/>
+          </a:bodyPr>
+          <a:lstStyle/>
+          <a:p>
+            <a:pPr algn="r"/>
+            <a:r>
+              <a:rPr lang="it-IT" dirty="0">
+                <a:solidFill>
+                  <a:schemeClr val="bg1"/>
+                </a:solidFill>
+                <a:latin typeface="Amiri" panose="00000500000000000000" pitchFamily="2" charset="-78"/>
+                <a:ea typeface="Amiri" panose="00000500000000000000" pitchFamily="2" charset="-78"/>
+                <a:cs typeface="Amiri" panose="00000500000000000000" pitchFamily="2" charset="-78"/>
+              </a:rPr>
+              <a:t>Sandra </a:t>
+            </a:r>
+            <a:r>
+              <a:rPr lang="it-IT" dirty="0" err="1">
+                <a:solidFill>
+                  <a:schemeClr val="bg1"/>
+                </a:solidFill>
+                <a:latin typeface="Amiri" panose="00000500000000000000" pitchFamily="2" charset="-78"/>
+                <a:ea typeface="Amiri" panose="00000500000000000000" pitchFamily="2" charset="-78"/>
+                <a:cs typeface="Amiri" panose="00000500000000000000" pitchFamily="2" charset="-78"/>
+              </a:rPr>
+              <a:t>Friebolin</a:t>
+            </a:r>
+            <a:r>
+              <a:rPr lang="it-IT" dirty="0">
+                <a:solidFill>
+                  <a:schemeClr val="bg1"/>
+                </a:solidFill>
+                <a:latin typeface="Amiri" panose="00000500000000000000" pitchFamily="2" charset="-78"/>
+                <a:ea typeface="Amiri" panose="00000500000000000000" pitchFamily="2" charset="-78"/>
+                <a:cs typeface="Amiri" panose="00000500000000000000" pitchFamily="2" charset="-78"/>
+              </a:rPr>
+              <a:t>, Matteo Malvestiti, Yusuf </a:t>
+            </a:r>
+            <a:r>
+              <a:rPr lang="it-IT" dirty="0" err="1">
+                <a:solidFill>
+                  <a:schemeClr val="bg1"/>
+                </a:solidFill>
+                <a:latin typeface="Amiri" panose="00000500000000000000" pitchFamily="2" charset="-78"/>
+                <a:ea typeface="Amiri" panose="00000500000000000000" pitchFamily="2" charset="-78"/>
+                <a:cs typeface="Amiri" panose="00000500000000000000" pitchFamily="2" charset="-78"/>
+              </a:rPr>
+              <a:t>Berber</a:t>
+            </a:r>
+            <a:endParaRPr lang="it-IT" dirty="0">
+              <a:solidFill>
+                <a:schemeClr val="bg1"/>
+              </a:solidFill>
+              <a:latin typeface="Amiri" panose="00000500000000000000" pitchFamily="2" charset="-78"/>
+              <a:ea typeface="Amiri" panose="00000500000000000000" pitchFamily="2" charset="-78"/>
+              <a:cs typeface="Amiri" panose="00000500000000000000" pitchFamily="2" charset="-78"/>
+            </a:endParaRPr>
+          </a:p>
+        </p:txBody>
+      </p:sp>
+      <p:sp>
+        <p:nvSpPr>
+          <p:cNvPr id="3" name="TextBox 2">
+            <a:extLst>
+              <a:ext uri="{FF2B5EF4-FFF2-40B4-BE49-F238E27FC236}">
+                <a16:creationId xmlns:a16="http://schemas.microsoft.com/office/drawing/2014/main" id="{AEABEB8D-9703-6182-6051-8251D74D324F}"/>
+              </a:ext>
+            </a:extLst>
+          </p:cNvPr>
+          <p:cNvSpPr txBox="1"/>
+          <p:nvPr/>
+        </p:nvSpPr>
+        <p:spPr>
+          <a:xfrm>
+            <a:off x="4222035" y="1469559"/>
+            <a:ext cx="6274676" cy="1477328"/>
+          </a:xfrm>
+          <a:prstGeom prst="rect">
+            <a:avLst/>
+          </a:prstGeom>
+          <a:noFill/>
+        </p:spPr>
+        <p:txBody>
+          <a:bodyPr wrap="square">
+            <a:spAutoFit/>
+          </a:bodyPr>
+          <a:lstStyle/>
+          <a:p>
+            <a:pPr marL="285750" indent="-285750" algn="l">
+              <a:buFont typeface="Arial" panose="020B0604020202020204" pitchFamily="34" charset="0"/>
+              <a:buChar char="•"/>
+            </a:pPr>
+            <a:r>
+              <a:rPr lang="en-GB" dirty="0">
+                <a:solidFill>
+                  <a:schemeClr val="accent2"/>
+                </a:solidFill>
+                <a:latin typeface="Amiri" panose="00000500000000000000" pitchFamily="2" charset="-78"/>
+                <a:ea typeface="Amiri" panose="00000500000000000000" pitchFamily="2" charset="-78"/>
+                <a:cs typeface="Amiri" panose="00000500000000000000" pitchFamily="2" charset="-78"/>
+              </a:rPr>
+              <a:t>Create a free pinecone account</a:t>
+            </a:r>
+          </a:p>
+          <a:p>
+            <a:pPr marL="285750" indent="-285750" algn="l">
+              <a:buFont typeface="Arial" panose="020B0604020202020204" pitchFamily="34" charset="0"/>
+              <a:buChar char="•"/>
+            </a:pPr>
+            <a:r>
+              <a:rPr lang="en-GB" dirty="0">
+                <a:solidFill>
+                  <a:schemeClr val="accent2"/>
+                </a:solidFill>
+                <a:latin typeface="Amiri" panose="00000500000000000000" pitchFamily="2" charset="-78"/>
+                <a:ea typeface="Amiri" panose="00000500000000000000" pitchFamily="2" charset="-78"/>
+                <a:cs typeface="Amiri" panose="00000500000000000000" pitchFamily="2" charset="-78"/>
+              </a:rPr>
+              <a:t>Write a ‘</a:t>
+            </a:r>
+            <a:r>
+              <a:rPr lang="en-GB" dirty="0" err="1">
+                <a:solidFill>
+                  <a:schemeClr val="accent2"/>
+                </a:solidFill>
+                <a:latin typeface="Amiri" panose="00000500000000000000" pitchFamily="2" charset="-78"/>
+                <a:ea typeface="Amiri" panose="00000500000000000000" pitchFamily="2" charset="-78"/>
+                <a:cs typeface="Amiri" panose="00000500000000000000" pitchFamily="2" charset="-78"/>
+              </a:rPr>
+              <a:t>PineconeHandler</a:t>
+            </a:r>
+            <a:r>
+              <a:rPr lang="en-GB" dirty="0">
+                <a:solidFill>
+                  <a:schemeClr val="accent2"/>
+                </a:solidFill>
+                <a:latin typeface="Amiri" panose="00000500000000000000" pitchFamily="2" charset="-78"/>
+                <a:ea typeface="Amiri" panose="00000500000000000000" pitchFamily="2" charset="-78"/>
+                <a:cs typeface="Amiri" panose="00000500000000000000" pitchFamily="2" charset="-78"/>
+              </a:rPr>
+              <a:t>’ class for various operations within Pinecone</a:t>
+            </a:r>
+          </a:p>
+          <a:p>
+            <a:pPr marL="285750" indent="-285750" algn="l">
+              <a:buFont typeface="Arial" panose="020B0604020202020204" pitchFamily="34" charset="0"/>
+              <a:buChar char="•"/>
+            </a:pPr>
+            <a:r>
+              <a:rPr lang="en-GB" dirty="0">
+                <a:solidFill>
+                  <a:schemeClr val="accent2"/>
+                </a:solidFill>
+                <a:latin typeface="Amiri" panose="00000500000000000000" pitchFamily="2" charset="-78"/>
+                <a:ea typeface="Amiri" panose="00000500000000000000" pitchFamily="2" charset="-78"/>
+                <a:cs typeface="Amiri" panose="00000500000000000000" pitchFamily="2" charset="-78"/>
+              </a:rPr>
+              <a:t>Write an ‘</a:t>
+            </a:r>
+            <a:r>
+              <a:rPr lang="en-GB" dirty="0" err="1">
+                <a:solidFill>
+                  <a:schemeClr val="accent2"/>
+                </a:solidFill>
+                <a:latin typeface="Amiri" panose="00000500000000000000" pitchFamily="2" charset="-78"/>
+                <a:ea typeface="Amiri" panose="00000500000000000000" pitchFamily="2" charset="-78"/>
+                <a:cs typeface="Amiri" panose="00000500000000000000" pitchFamily="2" charset="-78"/>
+              </a:rPr>
+              <a:t>upload_embeddings</a:t>
+            </a:r>
+            <a:r>
+              <a:rPr lang="en-GB" dirty="0">
+                <a:solidFill>
+                  <a:schemeClr val="accent2"/>
+                </a:solidFill>
+                <a:latin typeface="Amiri" panose="00000500000000000000" pitchFamily="2" charset="-78"/>
+                <a:ea typeface="Amiri" panose="00000500000000000000" pitchFamily="2" charset="-78"/>
+                <a:cs typeface="Amiri" panose="00000500000000000000" pitchFamily="2" charset="-78"/>
+              </a:rPr>
+              <a:t>’ notebook to </a:t>
+            </a:r>
+            <a:r>
+              <a:rPr lang="en-GB" dirty="0" err="1">
+                <a:solidFill>
+                  <a:schemeClr val="accent2"/>
+                </a:solidFill>
+                <a:latin typeface="Amiri" panose="00000500000000000000" pitchFamily="2" charset="-78"/>
+                <a:ea typeface="Amiri" panose="00000500000000000000" pitchFamily="2" charset="-78"/>
+                <a:cs typeface="Amiri" panose="00000500000000000000" pitchFamily="2" charset="-78"/>
+              </a:rPr>
+              <a:t>upsert</a:t>
+            </a:r>
+            <a:r>
+              <a:rPr lang="en-GB" dirty="0">
+                <a:solidFill>
+                  <a:schemeClr val="accent2"/>
+                </a:solidFill>
+                <a:latin typeface="Amiri" panose="00000500000000000000" pitchFamily="2" charset="-78"/>
+                <a:ea typeface="Amiri" panose="00000500000000000000" pitchFamily="2" charset="-78"/>
+                <a:cs typeface="Amiri" panose="00000500000000000000" pitchFamily="2" charset="-78"/>
+              </a:rPr>
+              <a:t> embeddings into pinecone</a:t>
+            </a:r>
+          </a:p>
+        </p:txBody>
+      </p:sp>
+    </p:spTree>
+    <p:extLst>
+      <p:ext uri="{BB962C8B-B14F-4D97-AF65-F5344CB8AC3E}">
+        <p14:creationId xmlns:p14="http://schemas.microsoft.com/office/powerpoint/2010/main" val="2013407633"/>
+      </p:ext>
+    </p:extLst>
+  </p:cSld>
+  <p:clrMapOvr>
+    <a:masterClrMapping/>
+  </p:clrMapOvr>
+</p:sld>
+</file>
+
+<file path=ppt/slides/slide14.xml><?xml version="1.0" encoding="utf-8"?>
+<p:sld xmlns:a="http://schemas.openxmlformats.org/drawingml/2006/main" xmlns:r="http://schemas.openxmlformats.org/officeDocument/2006/relationships" xmlns:p="http://schemas.openxmlformats.org/presentationml/2006/main">
+  <p:cSld>
+    <p:spTree>
+      <p:nvGrpSpPr>
+        <p:cNvPr id="1" name=""/>
+        <p:cNvGrpSpPr/>
+        <p:nvPr/>
+      </p:nvGrpSpPr>
+      <p:grpSpPr>
+        <a:xfrm>
+          <a:off x="0" y="0"/>
+          <a:ext cx="0" cy="0"/>
+          <a:chOff x="0" y="0"/>
+          <a:chExt cx="0" cy="0"/>
+        </a:xfrm>
+      </p:grpSpPr>
+      <p:sp>
+        <p:nvSpPr>
+          <p:cNvPr id="4" name="Rettangolo 4">
+            <a:extLst>
+              <a:ext uri="{FF2B5EF4-FFF2-40B4-BE49-F238E27FC236}">
+                <a16:creationId xmlns:a16="http://schemas.microsoft.com/office/drawing/2014/main" id="{FCDD8295-0CBB-4C6C-B18F-83BB6233E986}"/>
+              </a:ext>
+            </a:extLst>
+          </p:cNvPr>
+          <p:cNvSpPr/>
+          <p:nvPr/>
+        </p:nvSpPr>
+        <p:spPr>
+          <a:xfrm>
+            <a:off x="-343149" y="454308"/>
+            <a:ext cx="851383" cy="5515429"/>
+          </a:xfrm>
+          <a:prstGeom prst="rect">
+            <a:avLst/>
+          </a:prstGeom>
+        </p:spPr>
+        <p:style>
+          <a:lnRef idx="3">
+            <a:schemeClr val="lt1"/>
+          </a:lnRef>
+          <a:fillRef idx="1">
+            <a:schemeClr val="accent2"/>
+          </a:fillRef>
+          <a:effectRef idx="1">
+            <a:schemeClr val="accent2"/>
+          </a:effectRef>
+          <a:fontRef idx="minor">
+            <a:schemeClr val="lt1"/>
+          </a:fontRef>
+        </p:style>
+        <p:txBody>
+          <a:bodyPr lIns="91440" tIns="45720" rIns="91440" bIns="45720" rtlCol="0" anchor="ctr"/>
+          <a:lstStyle/>
+          <a:p>
+            <a:pPr marL="534670" indent="-260350">
+              <a:lnSpc>
+                <a:spcPct val="150000"/>
+              </a:lnSpc>
+            </a:pPr>
+            <a:endParaRPr lang="en-GB" sz="2000">
+              <a:solidFill>
+                <a:srgbClr val="FFFFFF"/>
+              </a:solidFill>
+              <a:cs typeface="Calibri"/>
+            </a:endParaRPr>
+          </a:p>
+          <a:p>
+            <a:pPr marL="285750" indent="-285750">
+              <a:lnSpc>
+                <a:spcPct val="150000"/>
+              </a:lnSpc>
+              <a:buFont typeface="Arial" panose="020B0604020202020204" pitchFamily="34" charset="0"/>
+              <a:buChar char="•"/>
+            </a:pPr>
+            <a:endParaRPr lang="en-GB" sz="2000"/>
+          </a:p>
+        </p:txBody>
+      </p:sp>
+      <p:sp>
+        <p:nvSpPr>
+          <p:cNvPr id="5" name="CasellaDiTesto 1">
+            <a:extLst>
+              <a:ext uri="{FF2B5EF4-FFF2-40B4-BE49-F238E27FC236}">
+                <a16:creationId xmlns:a16="http://schemas.microsoft.com/office/drawing/2014/main" id="{C95A19C8-8308-645B-35D1-F3852392CC09}"/>
+              </a:ext>
+            </a:extLst>
+          </p:cNvPr>
+          <p:cNvSpPr txBox="1"/>
+          <p:nvPr/>
+        </p:nvSpPr>
+        <p:spPr>
+          <a:xfrm>
+            <a:off x="912778" y="454308"/>
+            <a:ext cx="9305279" cy="523220"/>
+          </a:xfrm>
+          <a:prstGeom prst="rect">
+            <a:avLst/>
+          </a:prstGeom>
+          <a:noFill/>
+        </p:spPr>
+        <p:txBody>
+          <a:bodyPr rot="0" spcFirstLastPara="0" vertOverflow="overflow" horzOverflow="overflow" vert="horz" wrap="square" lIns="91440" tIns="45720" rIns="91440" bIns="45720" numCol="1" spcCol="0" rtlCol="0" fromWordArt="0" anchor="t" anchorCtr="0" forceAA="0" compatLnSpc="1">
+            <a:prstTxWarp prst="textNoShape">
+              <a:avLst/>
+            </a:prstTxWarp>
+            <a:spAutoFit/>
+          </a:bodyPr>
+          <a:lstStyle/>
+          <a:p>
+            <a:r>
+              <a:rPr lang="en-GB" sz="2800" b="1" dirty="0">
+                <a:solidFill>
+                  <a:schemeClr val="accent2"/>
+                </a:solidFill>
+                <a:cs typeface="Amiri"/>
+              </a:rPr>
+              <a:t>Python script to upload embeddings</a:t>
+            </a:r>
+          </a:p>
+        </p:txBody>
+      </p:sp>
+      <p:sp>
+        <p:nvSpPr>
+          <p:cNvPr id="2" name="CasellaDiTesto 1">
+            <a:extLst>
+              <a:ext uri="{FF2B5EF4-FFF2-40B4-BE49-F238E27FC236}">
+                <a16:creationId xmlns:a16="http://schemas.microsoft.com/office/drawing/2014/main" id="{3C79C3FC-CB68-9C17-5BE9-45C518EBF9F3}"/>
+              </a:ext>
+            </a:extLst>
+          </p:cNvPr>
+          <p:cNvSpPr txBox="1"/>
+          <p:nvPr/>
+        </p:nvSpPr>
+        <p:spPr>
+          <a:xfrm>
+            <a:off x="6429829" y="6465325"/>
+            <a:ext cx="5663318" cy="369332"/>
+          </a:xfrm>
+          <a:prstGeom prst="rect">
+            <a:avLst/>
+          </a:prstGeom>
+          <a:noFill/>
+        </p:spPr>
+        <p:txBody>
+          <a:bodyPr wrap="square" rtlCol="0">
+            <a:spAutoFit/>
+          </a:bodyPr>
+          <a:lstStyle/>
+          <a:p>
+            <a:pPr algn="r"/>
+            <a:r>
+              <a:rPr lang="it-IT" dirty="0">
+                <a:solidFill>
+                  <a:schemeClr val="bg1"/>
+                </a:solidFill>
+                <a:latin typeface="Amiri" panose="00000500000000000000" pitchFamily="2" charset="-78"/>
+                <a:ea typeface="Amiri" panose="00000500000000000000" pitchFamily="2" charset="-78"/>
+                <a:cs typeface="Amiri" panose="00000500000000000000" pitchFamily="2" charset="-78"/>
+              </a:rPr>
+              <a:t>Sandra </a:t>
+            </a:r>
+            <a:r>
+              <a:rPr lang="it-IT" dirty="0" err="1">
+                <a:solidFill>
+                  <a:schemeClr val="bg1"/>
+                </a:solidFill>
+                <a:latin typeface="Amiri" panose="00000500000000000000" pitchFamily="2" charset="-78"/>
+                <a:ea typeface="Amiri" panose="00000500000000000000" pitchFamily="2" charset="-78"/>
+                <a:cs typeface="Amiri" panose="00000500000000000000" pitchFamily="2" charset="-78"/>
+              </a:rPr>
+              <a:t>Friebolin</a:t>
+            </a:r>
+            <a:r>
+              <a:rPr lang="it-IT" dirty="0">
+                <a:solidFill>
+                  <a:schemeClr val="bg1"/>
+                </a:solidFill>
+                <a:latin typeface="Amiri" panose="00000500000000000000" pitchFamily="2" charset="-78"/>
+                <a:ea typeface="Amiri" panose="00000500000000000000" pitchFamily="2" charset="-78"/>
+                <a:cs typeface="Amiri" panose="00000500000000000000" pitchFamily="2" charset="-78"/>
+              </a:rPr>
+              <a:t>, Matteo Malvestiti, Yusuf </a:t>
+            </a:r>
+            <a:r>
+              <a:rPr lang="it-IT" dirty="0" err="1">
+                <a:solidFill>
+                  <a:schemeClr val="bg1"/>
+                </a:solidFill>
+                <a:latin typeface="Amiri" panose="00000500000000000000" pitchFamily="2" charset="-78"/>
+                <a:ea typeface="Amiri" panose="00000500000000000000" pitchFamily="2" charset="-78"/>
+                <a:cs typeface="Amiri" panose="00000500000000000000" pitchFamily="2" charset="-78"/>
+              </a:rPr>
+              <a:t>Berber</a:t>
+            </a:r>
+            <a:endParaRPr lang="it-IT" dirty="0">
+              <a:solidFill>
+                <a:schemeClr val="bg1"/>
+              </a:solidFill>
+              <a:latin typeface="Amiri" panose="00000500000000000000" pitchFamily="2" charset="-78"/>
+              <a:ea typeface="Amiri" panose="00000500000000000000" pitchFamily="2" charset="-78"/>
+              <a:cs typeface="Amiri" panose="00000500000000000000" pitchFamily="2" charset="-78"/>
+            </a:endParaRPr>
+          </a:p>
+        </p:txBody>
+      </p:sp>
+    </p:spTree>
+    <p:extLst>
+      <p:ext uri="{BB962C8B-B14F-4D97-AF65-F5344CB8AC3E}">
+        <p14:creationId xmlns:p14="http://schemas.microsoft.com/office/powerpoint/2010/main" val="3329336041"/>
+      </p:ext>
+    </p:extLst>
+  </p:cSld>
+  <p:clrMapOvr>
+    <a:masterClrMapping/>
+  </p:clrMapOvr>
+</p:sld>
+</file>
+
+<file path=ppt/slides/slide15.xml><?xml version="1.0" encoding="utf-8"?>
+<p:sld xmlns:a="http://schemas.openxmlformats.org/drawingml/2006/main" xmlns:r="http://schemas.openxmlformats.org/officeDocument/2006/relationships" xmlns:p="http://schemas.openxmlformats.org/presentationml/2006/main">
+  <p:cSld>
+    <p:spTree>
+      <p:nvGrpSpPr>
+        <p:cNvPr id="1" name=""/>
+        <p:cNvGrpSpPr/>
+        <p:nvPr/>
+      </p:nvGrpSpPr>
+      <p:grpSpPr>
+        <a:xfrm>
+          <a:off x="0" y="0"/>
+          <a:ext cx="0" cy="0"/>
+          <a:chOff x="0" y="0"/>
+          <a:chExt cx="0" cy="0"/>
+        </a:xfrm>
+      </p:grpSpPr>
+      <p:sp>
+        <p:nvSpPr>
+          <p:cNvPr id="7" name="CasellaDiTesto 6">
+            <a:extLst>
+              <a:ext uri="{FF2B5EF4-FFF2-40B4-BE49-F238E27FC236}">
+                <a16:creationId xmlns:a16="http://schemas.microsoft.com/office/drawing/2014/main" id="{9402257E-7B57-4EC6-99B6-A66E50CCD937}"/>
+              </a:ext>
+            </a:extLst>
+          </p:cNvPr>
+          <p:cNvSpPr txBox="1"/>
+          <p:nvPr/>
+        </p:nvSpPr>
+        <p:spPr>
+          <a:xfrm>
+            <a:off x="4222035" y="495183"/>
+            <a:ext cx="7597750" cy="523220"/>
+          </a:xfrm>
+          <a:prstGeom prst="rect">
+            <a:avLst/>
+          </a:prstGeom>
+          <a:noFill/>
+        </p:spPr>
+        <p:txBody>
+          <a:bodyPr rot="0" spcFirstLastPara="0" vertOverflow="overflow" horzOverflow="overflow" vert="horz" wrap="square" lIns="91440" tIns="45720" rIns="91440" bIns="45720" numCol="1" spcCol="0" rtlCol="0" fromWordArt="0" anchor="t" anchorCtr="0" forceAA="0" compatLnSpc="1">
+            <a:prstTxWarp prst="textNoShape">
+              <a:avLst/>
+            </a:prstTxWarp>
+            <a:spAutoFit/>
+          </a:bodyPr>
+          <a:lstStyle/>
+          <a:p>
+            <a:r>
+              <a:rPr lang="en-GB" sz="2800" b="1" dirty="0">
+                <a:solidFill>
+                  <a:schemeClr val="accent2"/>
+                </a:solidFill>
+                <a:cs typeface="Amiri"/>
+              </a:rPr>
+              <a:t>Ongoing steps</a:t>
+            </a:r>
+            <a:endParaRPr lang="en-GB" sz="2800" b="1" i="1" dirty="0">
+              <a:solidFill>
+                <a:schemeClr val="accent2"/>
+              </a:solidFill>
+              <a:cs typeface="Amiri"/>
+            </a:endParaRPr>
+          </a:p>
+        </p:txBody>
+      </p:sp>
+      <p:sp>
+        <p:nvSpPr>
+          <p:cNvPr id="8" name="Rettangolo 4">
+            <a:extLst>
+              <a:ext uri="{FF2B5EF4-FFF2-40B4-BE49-F238E27FC236}">
+                <a16:creationId xmlns:a16="http://schemas.microsoft.com/office/drawing/2014/main" id="{83A85DDA-E48A-895F-2601-36FF8C9BBF71}"/>
+              </a:ext>
+            </a:extLst>
+          </p:cNvPr>
+          <p:cNvSpPr/>
+          <p:nvPr/>
+        </p:nvSpPr>
+        <p:spPr>
+          <a:xfrm>
+            <a:off x="376750" y="498176"/>
+            <a:ext cx="3249688" cy="5515429"/>
+          </a:xfrm>
+          <a:prstGeom prst="rect">
+            <a:avLst/>
+          </a:prstGeom>
+        </p:spPr>
+        <p:style>
+          <a:lnRef idx="3">
+            <a:schemeClr val="lt1"/>
+          </a:lnRef>
+          <a:fillRef idx="1">
+            <a:schemeClr val="accent2"/>
+          </a:fillRef>
+          <a:effectRef idx="1">
+            <a:schemeClr val="accent2"/>
+          </a:effectRef>
+          <a:fontRef idx="minor">
+            <a:schemeClr val="lt1"/>
+          </a:fontRef>
+        </p:style>
+        <p:txBody>
+          <a:bodyPr lIns="91440" tIns="45720" rIns="91440" bIns="45720" rtlCol="0" anchor="ctr"/>
+          <a:lstStyle/>
+          <a:p>
+            <a:pPr marL="534670" indent="-260350">
+              <a:lnSpc>
+                <a:spcPct val="150000"/>
+              </a:lnSpc>
+            </a:pPr>
+            <a:r>
+              <a:rPr lang="en-GB" sz="2000" u="sng" dirty="0">
+                <a:latin typeface="Verdana"/>
+                <a:ea typeface="Verdana"/>
+              </a:rPr>
+              <a:t>Index</a:t>
+            </a:r>
+            <a:endParaRPr lang="en-GB" sz="2000" dirty="0">
+              <a:latin typeface="Verdana"/>
+              <a:ea typeface="Verdana"/>
+            </a:endParaRPr>
+          </a:p>
+          <a:p>
+            <a:pPr marL="534670" indent="-260350">
+              <a:lnSpc>
+                <a:spcPct val="150000"/>
+              </a:lnSpc>
+            </a:pPr>
+            <a:endParaRPr lang="en-GB" sz="2000" dirty="0">
+              <a:cs typeface="Calibri" panose="020F0502020204030204"/>
+            </a:endParaRPr>
+          </a:p>
+          <a:p>
+            <a:pPr marL="534670" indent="-260350">
+              <a:lnSpc>
+                <a:spcPct val="150000"/>
+              </a:lnSpc>
+              <a:buFont typeface="Arial" panose="020B0604020202020204" pitchFamily="34" charset="0"/>
+              <a:buChar char="•"/>
+            </a:pPr>
+            <a:r>
+              <a:rPr lang="en-GB" sz="2000" dirty="0">
+                <a:solidFill>
+                  <a:schemeClr val="accent1">
+                    <a:lumMod val="60000"/>
+                    <a:lumOff val="40000"/>
+                  </a:schemeClr>
+                </a:solidFill>
+              </a:rPr>
+              <a:t>Dataset download and pre-processing</a:t>
+            </a:r>
+          </a:p>
+          <a:p>
+            <a:pPr marL="534670" indent="-260350">
+              <a:lnSpc>
+                <a:spcPct val="150000"/>
+              </a:lnSpc>
+              <a:buFont typeface="Arial" panose="020B0604020202020204" pitchFamily="34" charset="0"/>
+              <a:buChar char="•"/>
+            </a:pPr>
+            <a:r>
+              <a:rPr lang="en-GB" sz="2000" dirty="0">
+                <a:solidFill>
+                  <a:schemeClr val="accent1">
+                    <a:lumMod val="60000"/>
+                    <a:lumOff val="40000"/>
+                  </a:schemeClr>
+                </a:solidFill>
+              </a:rPr>
+              <a:t>Documents’ database</a:t>
+            </a:r>
+          </a:p>
+          <a:p>
+            <a:pPr marL="534670" indent="-260350">
+              <a:lnSpc>
+                <a:spcPct val="150000"/>
+              </a:lnSpc>
+              <a:buFont typeface="Arial" panose="020B0604020202020204" pitchFamily="34" charset="0"/>
+              <a:buChar char="•"/>
+            </a:pPr>
+            <a:r>
+              <a:rPr lang="en-GB" sz="2000" dirty="0">
+                <a:solidFill>
+                  <a:schemeClr val="accent1">
+                    <a:lumMod val="60000"/>
+                    <a:lumOff val="40000"/>
+                  </a:schemeClr>
+                </a:solidFill>
+                <a:cs typeface="Calibri"/>
+              </a:rPr>
+              <a:t>Embeddings</a:t>
+            </a:r>
+          </a:p>
+          <a:p>
+            <a:pPr marL="534670" indent="-260350">
+              <a:lnSpc>
+                <a:spcPct val="150000"/>
+              </a:lnSpc>
+              <a:buFont typeface="Arial" panose="020B0604020202020204" pitchFamily="34" charset="0"/>
+              <a:buChar char="•"/>
+            </a:pPr>
+            <a:r>
+              <a:rPr lang="en-GB" sz="2000" dirty="0">
+                <a:solidFill>
                   <a:schemeClr val="accent1">
                     <a:lumMod val="60000"/>
                     <a:lumOff val="40000"/>
@@ -14782,7 +16805,7 @@
 </p:sld>
 </file>
 
-<file path=ppt/slides/slide14.xml><?xml version="1.0" encoding="utf-8"?>
+<file path=ppt/slides/slide16.xml><?xml version="1.0" encoding="utf-8"?>
 <p:sld xmlns:a="http://schemas.openxmlformats.org/drawingml/2006/main" xmlns:r="http://schemas.openxmlformats.org/officeDocument/2006/relationships" xmlns:p="http://schemas.openxmlformats.org/presentationml/2006/main">
   <p:cSld>
     <p:spTree>
@@ -16621,6 +18644,130 @@
           </a:p>
         </p:txBody>
       </p:sp>
+      <p:pic>
+        <p:nvPicPr>
+          <p:cNvPr id="3" name="Grafik 2" descr="Ein Bild, das Text, Software, Schrift, Screenshot enthält.&#10;&#10;Automatisch generierte Beschreibung">
+            <a:extLst>
+              <a:ext uri="{FF2B5EF4-FFF2-40B4-BE49-F238E27FC236}">
+                <a16:creationId xmlns:a16="http://schemas.microsoft.com/office/drawing/2014/main" id="{043C1902-68E4-5BA3-3C87-27A6BB6414A1}"/>
+              </a:ext>
+            </a:extLst>
+          </p:cNvPr>
+          <p:cNvPicPr>
+            <a:picLocks noChangeAspect="1"/>
+          </p:cNvPicPr>
+          <p:nvPr/>
+        </p:nvPicPr>
+        <p:blipFill>
+          <a:blip r:embed="rId3"/>
+          <a:stretch>
+            <a:fillRect/>
+          </a:stretch>
+        </p:blipFill>
+        <p:spPr>
+          <a:xfrm>
+            <a:off x="4667862" y="3150448"/>
+            <a:ext cx="6706096" cy="2054297"/>
+          </a:xfrm>
+          <a:prstGeom prst="rect">
+            <a:avLst/>
+          </a:prstGeom>
+        </p:spPr>
+      </p:pic>
+      <p:pic>
+        <p:nvPicPr>
+          <p:cNvPr id="1032" name="Picture 8" descr="Docker Logo - RandomBrick.de">
+            <a:extLst>
+              <a:ext uri="{FF2B5EF4-FFF2-40B4-BE49-F238E27FC236}">
+                <a16:creationId xmlns:a16="http://schemas.microsoft.com/office/drawing/2014/main" id="{DAD4D0D9-7F7C-9710-0F54-F348EF2B9C73}"/>
+              </a:ext>
+            </a:extLst>
+          </p:cNvPr>
+          <p:cNvPicPr>
+            <a:picLocks noChangeAspect="1" noChangeArrowheads="1"/>
+          </p:cNvPicPr>
+          <p:nvPr/>
+        </p:nvPicPr>
+        <p:blipFill>
+          <a:blip r:embed="rId4">
+            <a:extLst>
+              <a:ext uri="{28A0092B-C50C-407E-A947-70E740481C1C}">
+                <a14:useLocalDpi xmlns:a14="http://schemas.microsoft.com/office/drawing/2010/main" val="0"/>
+              </a:ext>
+            </a:extLst>
+          </a:blip>
+          <a:srcRect/>
+          <a:stretch>
+            <a:fillRect/>
+          </a:stretch>
+        </p:blipFill>
+        <p:spPr bwMode="auto">
+          <a:xfrm>
+            <a:off x="7363132" y="694932"/>
+            <a:ext cx="3173273" cy="2115515"/>
+          </a:xfrm>
+          <a:prstGeom prst="rect">
+            <a:avLst/>
+          </a:prstGeom>
+          <a:noFill/>
+          <a:extLst>
+            <a:ext uri="{909E8E84-426E-40DD-AFC4-6F175D3DCCD1}">
+              <a14:hiddenFill xmlns:a14="http://schemas.microsoft.com/office/drawing/2010/main">
+                <a:solidFill>
+                  <a:srgbClr val="FFFFFF"/>
+                </a:solidFill>
+              </a14:hiddenFill>
+            </a:ext>
+          </a:extLst>
+        </p:spPr>
+      </p:pic>
+      <p:pic>
+        <p:nvPicPr>
+          <p:cNvPr id="1030" name="Picture 6" descr="Marketplace">
+            <a:extLst>
+              <a:ext uri="{FF2B5EF4-FFF2-40B4-BE49-F238E27FC236}">
+                <a16:creationId xmlns:a16="http://schemas.microsoft.com/office/drawing/2014/main" id="{B9E08650-0BB4-2ED3-0540-B588639C6D61}"/>
+              </a:ext>
+            </a:extLst>
+          </p:cNvPr>
+          <p:cNvPicPr>
+            <a:picLocks noChangeAspect="1" noChangeArrowheads="1"/>
+          </p:cNvPicPr>
+          <p:nvPr/>
+        </p:nvPicPr>
+        <p:blipFill>
+          <a:blip r:embed="rId5">
+            <a:extLst>
+              <a:ext uri="{28A0092B-C50C-407E-A947-70E740481C1C}">
+                <a14:useLocalDpi xmlns:a14="http://schemas.microsoft.com/office/drawing/2010/main" val="0"/>
+              </a:ext>
+            </a:extLst>
+          </a:blip>
+          <a:srcRect/>
+          <a:stretch>
+            <a:fillRect/>
+          </a:stretch>
+        </p:blipFill>
+        <p:spPr bwMode="auto">
+          <a:xfrm>
+            <a:off x="6173167" y="1278488"/>
+            <a:ext cx="1401916" cy="1401916"/>
+          </a:xfrm>
+          <a:prstGeom prst="rect">
+            <a:avLst/>
+          </a:prstGeom>
+          <a:noFill/>
+          <a:extLst>
+            <a:ext uri="{909E8E84-426E-40DD-AFC4-6F175D3DCCD1}">
+              <a14:hiddenFill xmlns:a14="http://schemas.microsoft.com/office/drawing/2010/main">
+                <a:solidFill>
+                  <a:srgbClr val="FFFFFF"/>
+                </a:solidFill>
+              </a14:hiddenFill>
+            </a:ext>
+          </a:extLst>
+        </p:spPr>
+      </p:pic>
     </p:spTree>
     <p:extLst>
       <p:ext uri="{BB962C8B-B14F-4D97-AF65-F5344CB8AC3E}">
@@ -16716,49 +18863,6 @@
       </p:sp>
       <p:sp>
         <p:nvSpPr>
-          <p:cNvPr id="5" name="CasellaDiTesto 1">
-            <a:extLst>
-              <a:ext uri="{FF2B5EF4-FFF2-40B4-BE49-F238E27FC236}">
-                <a16:creationId xmlns:a16="http://schemas.microsoft.com/office/drawing/2014/main" id="{C95A19C8-8308-645B-35D1-F3852392CC09}"/>
-              </a:ext>
-            </a:extLst>
-          </p:cNvPr>
-          <p:cNvSpPr txBox="1"/>
-          <p:nvPr/>
-        </p:nvSpPr>
-        <p:spPr>
-          <a:xfrm>
-            <a:off x="912778" y="454308"/>
-            <a:ext cx="9305279" cy="523220"/>
-          </a:xfrm>
-          <a:prstGeom prst="rect">
-            <a:avLst/>
-          </a:prstGeom>
-          <a:noFill/>
-        </p:spPr>
-        <p:txBody>
-          <a:bodyPr rot="0" spcFirstLastPara="0" vertOverflow="overflow" horzOverflow="overflow" vert="horz" wrap="square" lIns="91440" tIns="45720" rIns="91440" bIns="45720" numCol="1" spcCol="0" rtlCol="0" fromWordArt="0" anchor="t" anchorCtr="0" forceAA="0" compatLnSpc="1">
-            <a:prstTxWarp prst="textNoShape">
-              <a:avLst/>
-            </a:prstTxWarp>
-            <a:spAutoFit/>
-          </a:bodyPr>
-          <a:lstStyle/>
-          <a:p>
-            <a:r>
-              <a:rPr lang="en-GB" sz="2800" b="1" dirty="0">
-                <a:solidFill>
-                  <a:schemeClr val="accent2"/>
-                </a:solidFill>
-                <a:cs typeface="Amiri"/>
-              </a:rPr>
-              <a:t>Docker setup</a:t>
-            </a:r>
-          </a:p>
-        </p:txBody>
-      </p:sp>
-      <p:sp>
-        <p:nvSpPr>
           <p:cNvPr id="2" name="CasellaDiTesto 1">
             <a:extLst>
               <a:ext uri="{FF2B5EF4-FFF2-40B4-BE49-F238E27FC236}">
@@ -16838,6 +18942,119 @@
               <a:ea typeface="Amiri" panose="00000500000000000000" pitchFamily="2" charset="-78"/>
               <a:cs typeface="Amiri" panose="00000500000000000000" pitchFamily="2" charset="-78"/>
             </a:endParaRPr>
+          </a:p>
+        </p:txBody>
+      </p:sp>
+      <p:pic>
+        <p:nvPicPr>
+          <p:cNvPr id="6" name="Grafik 5" descr="Ein Bild, das Text, Screenshot enthält.&#10;&#10;Automatisch generierte Beschreibung">
+            <a:extLst>
+              <a:ext uri="{FF2B5EF4-FFF2-40B4-BE49-F238E27FC236}">
+                <a16:creationId xmlns:a16="http://schemas.microsoft.com/office/drawing/2014/main" id="{58F7AB77-794D-60A5-F0FA-0279D35466F5}"/>
+              </a:ext>
+            </a:extLst>
+          </p:cNvPr>
+          <p:cNvPicPr>
+            <a:picLocks noChangeAspect="1"/>
+          </p:cNvPicPr>
+          <p:nvPr/>
+        </p:nvPicPr>
+        <p:blipFill>
+          <a:blip r:embed="rId3"/>
+          <a:stretch>
+            <a:fillRect/>
+          </a:stretch>
+        </p:blipFill>
+        <p:spPr>
+          <a:xfrm>
+            <a:off x="857271" y="1540759"/>
+            <a:ext cx="6925628" cy="3996359"/>
+          </a:xfrm>
+          <a:prstGeom prst="rect">
+            <a:avLst/>
+          </a:prstGeom>
+          <a:ln w="76200">
+            <a:solidFill>
+              <a:schemeClr val="accent1"/>
+            </a:solidFill>
+          </a:ln>
+        </p:spPr>
+      </p:pic>
+      <p:pic>
+        <p:nvPicPr>
+          <p:cNvPr id="9" name="Grafik 8" descr="Ein Bild, das Text, Screenshot, Software enthält.&#10;&#10;Automatisch generierte Beschreibung">
+            <a:extLst>
+              <a:ext uri="{FF2B5EF4-FFF2-40B4-BE49-F238E27FC236}">
+                <a16:creationId xmlns:a16="http://schemas.microsoft.com/office/drawing/2014/main" id="{F856E510-66E2-8DD4-87BC-49FADE7BBE75}"/>
+              </a:ext>
+            </a:extLst>
+          </p:cNvPr>
+          <p:cNvPicPr>
+            <a:picLocks noChangeAspect="1"/>
+          </p:cNvPicPr>
+          <p:nvPr/>
+        </p:nvPicPr>
+        <p:blipFill>
+          <a:blip r:embed="rId4"/>
+          <a:stretch>
+            <a:fillRect/>
+          </a:stretch>
+        </p:blipFill>
+        <p:spPr>
+          <a:xfrm>
+            <a:off x="5873473" y="2337964"/>
+            <a:ext cx="6219674" cy="3428794"/>
+          </a:xfrm>
+          <a:prstGeom prst="rect">
+            <a:avLst/>
+          </a:prstGeom>
+          <a:ln w="76200">
+            <a:solidFill>
+              <a:schemeClr val="accent1"/>
+            </a:solidFill>
+          </a:ln>
+        </p:spPr>
+      </p:pic>
+      <p:sp>
+        <p:nvSpPr>
+          <p:cNvPr id="10" name="CasellaDiTesto 1">
+            <a:extLst>
+              <a:ext uri="{FF2B5EF4-FFF2-40B4-BE49-F238E27FC236}">
+                <a16:creationId xmlns:a16="http://schemas.microsoft.com/office/drawing/2014/main" id="{7011ADD2-EDE4-2579-0B91-6BEB07F57754}"/>
+              </a:ext>
+            </a:extLst>
+          </p:cNvPr>
+          <p:cNvSpPr txBox="1"/>
+          <p:nvPr/>
+        </p:nvSpPr>
+        <p:spPr>
+          <a:xfrm>
+            <a:off x="912778" y="454308"/>
+            <a:ext cx="9305279" cy="523220"/>
+          </a:xfrm>
+          <a:prstGeom prst="rect">
+            <a:avLst/>
+          </a:prstGeom>
+          <a:noFill/>
+        </p:spPr>
+        <p:txBody>
+          <a:bodyPr rot="0" spcFirstLastPara="0" vertOverflow="overflow" horzOverflow="overflow" vert="horz" wrap="square" lIns="91440" tIns="45720" rIns="91440" bIns="45720" numCol="1" spcCol="0" rtlCol="0" fromWordArt="0" anchor="t" anchorCtr="0" forceAA="0" compatLnSpc="1">
+            <a:prstTxWarp prst="textNoShape">
+              <a:avLst/>
+            </a:prstTxWarp>
+            <a:spAutoFit/>
+          </a:bodyPr>
+          <a:lstStyle/>
+          <a:p>
+            <a:r>
+              <a:rPr lang="en-GB" sz="2800" b="1" dirty="0">
+                <a:solidFill>
+                  <a:schemeClr val="accent2"/>
+                </a:solidFill>
+                <a:cs typeface="Amiri"/>
+              </a:rPr>
+              <a:t>We handle the connection through a python notebook</a:t>
+            </a:r>
           </a:p>
         </p:txBody>
       </p:sp>
@@ -16972,7 +19189,7 @@
                 </a:solidFill>
                 <a:cs typeface="Amiri"/>
               </a:rPr>
-              <a:t>Python script to upload Abstracts and metadata</a:t>
+              <a:t>How the index looks like</a:t>
             </a:r>
           </a:p>
         </p:txBody>
@@ -16982,7 +19199,7 @@
           <p:cNvPr id="2" name="CasellaDiTesto 1">
             <a:extLst>
               <a:ext uri="{FF2B5EF4-FFF2-40B4-BE49-F238E27FC236}">
-                <a16:creationId xmlns:a16="http://schemas.microsoft.com/office/drawing/2014/main" id="{0F4818E9-B576-239A-54A2-784B7D499A5F}"/>
+                <a16:creationId xmlns:a16="http://schemas.microsoft.com/office/drawing/2014/main" id="{1F8AF9EB-6392-D2B7-C526-E8B4D6C836CC}"/>
               </a:ext>
             </a:extLst>
           </p:cNvPr>
@@ -17061,10 +19278,442 @@
           </a:p>
         </p:txBody>
       </p:sp>
+      <p:pic>
+        <p:nvPicPr>
+          <p:cNvPr id="6" name="Grafik 5" descr="Ein Bild, das Screenshot, Text, Software, Multimedia-Software enthält.&#10;&#10;Automatisch generierte Beschreibung">
+            <a:extLst>
+              <a:ext uri="{FF2B5EF4-FFF2-40B4-BE49-F238E27FC236}">
+                <a16:creationId xmlns:a16="http://schemas.microsoft.com/office/drawing/2014/main" id="{3DD99ED9-F909-6327-1DD9-8948BA0C9987}"/>
+              </a:ext>
+            </a:extLst>
+          </p:cNvPr>
+          <p:cNvPicPr>
+            <a:picLocks noChangeAspect="1"/>
+          </p:cNvPicPr>
+          <p:nvPr/>
+        </p:nvPicPr>
+        <p:blipFill>
+          <a:blip r:embed="rId3"/>
+          <a:stretch>
+            <a:fillRect/>
+          </a:stretch>
+        </p:blipFill>
+        <p:spPr>
+          <a:xfrm>
+            <a:off x="912778" y="1049415"/>
+            <a:ext cx="9745764" cy="4920322"/>
+          </a:xfrm>
+          <a:prstGeom prst="rect">
+            <a:avLst/>
+          </a:prstGeom>
+        </p:spPr>
+      </p:pic>
+      <p:pic>
+        <p:nvPicPr>
+          <p:cNvPr id="8" name="Grafik 7" descr="Ein Bild, das Text, Screenshot, Schrift, Reihe enthält.&#10;&#10;Automatisch generierte Beschreibung">
+            <a:extLst>
+              <a:ext uri="{FF2B5EF4-FFF2-40B4-BE49-F238E27FC236}">
+                <a16:creationId xmlns:a16="http://schemas.microsoft.com/office/drawing/2014/main" id="{0A6A5665-B6C7-7645-81D3-52E1B94C49EC}"/>
+              </a:ext>
+            </a:extLst>
+          </p:cNvPr>
+          <p:cNvPicPr>
+            <a:picLocks noChangeAspect="1"/>
+          </p:cNvPicPr>
+          <p:nvPr/>
+        </p:nvPicPr>
+        <p:blipFill>
+          <a:blip r:embed="rId4"/>
+          <a:stretch>
+            <a:fillRect/>
+          </a:stretch>
+        </p:blipFill>
+        <p:spPr>
+          <a:xfrm>
+            <a:off x="7922957" y="2335103"/>
+            <a:ext cx="2528734" cy="3634634"/>
+          </a:xfrm>
+          <a:prstGeom prst="rect">
+            <a:avLst/>
+          </a:prstGeom>
+        </p:spPr>
+      </p:pic>
+      <p:sp>
+        <p:nvSpPr>
+          <p:cNvPr id="9" name="Oval 8">
+            <a:extLst>
+              <a:ext uri="{FF2B5EF4-FFF2-40B4-BE49-F238E27FC236}">
+                <a16:creationId xmlns:a16="http://schemas.microsoft.com/office/drawing/2014/main" id="{A772A749-D6DF-0F34-AAD1-83FEAF37D65B}"/>
+              </a:ext>
+            </a:extLst>
+          </p:cNvPr>
+          <p:cNvSpPr/>
+          <p:nvPr/>
+        </p:nvSpPr>
+        <p:spPr>
+          <a:xfrm>
+            <a:off x="4936701" y="2930014"/>
+            <a:ext cx="825002" cy="125983"/>
+          </a:xfrm>
+          <a:prstGeom prst="ellipse">
+            <a:avLst/>
+          </a:prstGeom>
+          <a:noFill/>
+          <a:ln w="12700"/>
+        </p:spPr>
+        <p:style>
+          <a:lnRef idx="2">
+            <a:schemeClr val="accent1">
+              <a:shade val="15000"/>
+            </a:schemeClr>
+          </a:lnRef>
+          <a:fillRef idx="1">
+            <a:schemeClr val="accent1"/>
+          </a:fillRef>
+          <a:effectRef idx="0">
+            <a:schemeClr val="accent1"/>
+          </a:effectRef>
+          <a:fontRef idx="minor">
+            <a:schemeClr val="lt1"/>
+          </a:fontRef>
+        </p:style>
+        <p:txBody>
+          <a:bodyPr rtlCol="0" anchor="ctr"/>
+          <a:lstStyle/>
+          <a:p>
+            <a:pPr algn="ctr"/>
+            <a:endParaRPr lang="en-GB"/>
+          </a:p>
+        </p:txBody>
+      </p:sp>
+      <p:sp>
+        <p:nvSpPr>
+          <p:cNvPr id="10" name="Oval 9">
+            <a:extLst>
+              <a:ext uri="{FF2B5EF4-FFF2-40B4-BE49-F238E27FC236}">
+                <a16:creationId xmlns:a16="http://schemas.microsoft.com/office/drawing/2014/main" id="{CFAE8452-B28B-C3B0-FC4D-EFFD01A4E476}"/>
+              </a:ext>
+            </a:extLst>
+          </p:cNvPr>
+          <p:cNvSpPr/>
+          <p:nvPr/>
+        </p:nvSpPr>
+        <p:spPr>
+          <a:xfrm>
+            <a:off x="4936701" y="4026437"/>
+            <a:ext cx="825002" cy="125983"/>
+          </a:xfrm>
+          <a:prstGeom prst="ellipse">
+            <a:avLst/>
+          </a:prstGeom>
+          <a:noFill/>
+          <a:ln w="12700"/>
+        </p:spPr>
+        <p:style>
+          <a:lnRef idx="2">
+            <a:schemeClr val="accent1">
+              <a:shade val="15000"/>
+            </a:schemeClr>
+          </a:lnRef>
+          <a:fillRef idx="1">
+            <a:schemeClr val="accent1"/>
+          </a:fillRef>
+          <a:effectRef idx="0">
+            <a:schemeClr val="accent1"/>
+          </a:effectRef>
+          <a:fontRef idx="minor">
+            <a:schemeClr val="lt1"/>
+          </a:fontRef>
+        </p:style>
+        <p:txBody>
+          <a:bodyPr rtlCol="0" anchor="ctr"/>
+          <a:lstStyle/>
+          <a:p>
+            <a:pPr algn="ctr"/>
+            <a:endParaRPr lang="en-GB"/>
+          </a:p>
+        </p:txBody>
+      </p:sp>
+      <p:sp>
+        <p:nvSpPr>
+          <p:cNvPr id="11" name="Oval 10">
+            <a:extLst>
+              <a:ext uri="{FF2B5EF4-FFF2-40B4-BE49-F238E27FC236}">
+                <a16:creationId xmlns:a16="http://schemas.microsoft.com/office/drawing/2014/main" id="{49E0E63D-D33B-3AC4-BBCE-EA82B08F7081}"/>
+              </a:ext>
+            </a:extLst>
+          </p:cNvPr>
+          <p:cNvSpPr/>
+          <p:nvPr/>
+        </p:nvSpPr>
+        <p:spPr>
+          <a:xfrm>
+            <a:off x="4936701" y="5122860"/>
+            <a:ext cx="825002" cy="125983"/>
+          </a:xfrm>
+          <a:prstGeom prst="ellipse">
+            <a:avLst/>
+          </a:prstGeom>
+          <a:noFill/>
+          <a:ln w="12700"/>
+        </p:spPr>
+        <p:style>
+          <a:lnRef idx="2">
+            <a:schemeClr val="accent1">
+              <a:shade val="15000"/>
+            </a:schemeClr>
+          </a:lnRef>
+          <a:fillRef idx="1">
+            <a:schemeClr val="accent1"/>
+          </a:fillRef>
+          <a:effectRef idx="0">
+            <a:schemeClr val="accent1"/>
+          </a:effectRef>
+          <a:fontRef idx="minor">
+            <a:schemeClr val="lt1"/>
+          </a:fontRef>
+        </p:style>
+        <p:txBody>
+          <a:bodyPr rtlCol="0" anchor="ctr"/>
+          <a:lstStyle/>
+          <a:p>
+            <a:pPr algn="ctr"/>
+            <a:endParaRPr lang="en-GB"/>
+          </a:p>
+        </p:txBody>
+      </p:sp>
+      <p:sp>
+        <p:nvSpPr>
+          <p:cNvPr id="12" name="Oval 11">
+            <a:extLst>
+              <a:ext uri="{FF2B5EF4-FFF2-40B4-BE49-F238E27FC236}">
+                <a16:creationId xmlns:a16="http://schemas.microsoft.com/office/drawing/2014/main" id="{61C0AC54-DD49-47DE-7BAB-723FF30F83FD}"/>
+              </a:ext>
+            </a:extLst>
+          </p:cNvPr>
+          <p:cNvSpPr/>
+          <p:nvPr/>
+        </p:nvSpPr>
+        <p:spPr>
+          <a:xfrm>
+            <a:off x="8584389" y="2468025"/>
+            <a:ext cx="825002" cy="125983"/>
+          </a:xfrm>
+          <a:prstGeom prst="ellipse">
+            <a:avLst/>
+          </a:prstGeom>
+          <a:noFill/>
+          <a:ln w="12700"/>
+        </p:spPr>
+        <p:style>
+          <a:lnRef idx="2">
+            <a:schemeClr val="accent1">
+              <a:shade val="15000"/>
+            </a:schemeClr>
+          </a:lnRef>
+          <a:fillRef idx="1">
+            <a:schemeClr val="accent1"/>
+          </a:fillRef>
+          <a:effectRef idx="0">
+            <a:schemeClr val="accent1"/>
+          </a:effectRef>
+          <a:fontRef idx="minor">
+            <a:schemeClr val="lt1"/>
+          </a:fontRef>
+        </p:style>
+        <p:txBody>
+          <a:bodyPr rtlCol="0" anchor="ctr"/>
+          <a:lstStyle/>
+          <a:p>
+            <a:pPr algn="ctr"/>
+            <a:endParaRPr lang="en-GB"/>
+          </a:p>
+        </p:txBody>
+      </p:sp>
+      <p:sp>
+        <p:nvSpPr>
+          <p:cNvPr id="13" name="Oval 12">
+            <a:extLst>
+              <a:ext uri="{FF2B5EF4-FFF2-40B4-BE49-F238E27FC236}">
+                <a16:creationId xmlns:a16="http://schemas.microsoft.com/office/drawing/2014/main" id="{23A75D70-BD29-4D60-CB24-C5BD51069E5E}"/>
+              </a:ext>
+            </a:extLst>
+          </p:cNvPr>
+          <p:cNvSpPr/>
+          <p:nvPr/>
+        </p:nvSpPr>
+        <p:spPr>
+          <a:xfrm>
+            <a:off x="8584388" y="3562131"/>
+            <a:ext cx="1375689" cy="125983"/>
+          </a:xfrm>
+          <a:prstGeom prst="ellipse">
+            <a:avLst/>
+          </a:prstGeom>
+          <a:noFill/>
+          <a:ln w="12700"/>
+        </p:spPr>
+        <p:style>
+          <a:lnRef idx="2">
+            <a:schemeClr val="accent1">
+              <a:shade val="15000"/>
+            </a:schemeClr>
+          </a:lnRef>
+          <a:fillRef idx="1">
+            <a:schemeClr val="accent1"/>
+          </a:fillRef>
+          <a:effectRef idx="0">
+            <a:schemeClr val="accent1"/>
+          </a:effectRef>
+          <a:fontRef idx="minor">
+            <a:schemeClr val="lt1"/>
+          </a:fontRef>
+        </p:style>
+        <p:txBody>
+          <a:bodyPr rtlCol="0" anchor="ctr"/>
+          <a:lstStyle/>
+          <a:p>
+            <a:pPr algn="ctr"/>
+            <a:endParaRPr lang="en-GB"/>
+          </a:p>
+        </p:txBody>
+      </p:sp>
+      <p:sp>
+        <p:nvSpPr>
+          <p:cNvPr id="14" name="Oval 13">
+            <a:extLst>
+              <a:ext uri="{FF2B5EF4-FFF2-40B4-BE49-F238E27FC236}">
+                <a16:creationId xmlns:a16="http://schemas.microsoft.com/office/drawing/2014/main" id="{EA86E2B1-688F-0D79-92A3-2B7241186C73}"/>
+              </a:ext>
+            </a:extLst>
+          </p:cNvPr>
+          <p:cNvSpPr/>
+          <p:nvPr/>
+        </p:nvSpPr>
+        <p:spPr>
+          <a:xfrm>
+            <a:off x="8584389" y="4643346"/>
+            <a:ext cx="825002" cy="125983"/>
+          </a:xfrm>
+          <a:prstGeom prst="ellipse">
+            <a:avLst/>
+          </a:prstGeom>
+          <a:noFill/>
+          <a:ln w="12700"/>
+        </p:spPr>
+        <p:style>
+          <a:lnRef idx="2">
+            <a:schemeClr val="accent1">
+              <a:shade val="15000"/>
+            </a:schemeClr>
+          </a:lnRef>
+          <a:fillRef idx="1">
+            <a:schemeClr val="accent1"/>
+          </a:fillRef>
+          <a:effectRef idx="0">
+            <a:schemeClr val="accent1"/>
+          </a:effectRef>
+          <a:fontRef idx="minor">
+            <a:schemeClr val="lt1"/>
+          </a:fontRef>
+        </p:style>
+        <p:txBody>
+          <a:bodyPr rtlCol="0" anchor="ctr"/>
+          <a:lstStyle/>
+          <a:p>
+            <a:pPr algn="ctr"/>
+            <a:endParaRPr lang="en-GB"/>
+          </a:p>
+        </p:txBody>
+      </p:sp>
+      <p:cxnSp>
+        <p:nvCxnSpPr>
+          <p:cNvPr id="16" name="Gerade Verbindung mit Pfeil 15">
+            <a:extLst>
+              <a:ext uri="{FF2B5EF4-FFF2-40B4-BE49-F238E27FC236}">
+                <a16:creationId xmlns:a16="http://schemas.microsoft.com/office/drawing/2014/main" id="{E2CC391A-1FE0-60B6-7E1A-1CC982DABBBC}"/>
+              </a:ext>
+            </a:extLst>
+          </p:cNvPr>
+          <p:cNvCxnSpPr>
+            <a:cxnSpLocks/>
+          </p:cNvCxnSpPr>
+          <p:nvPr/>
+        </p:nvCxnSpPr>
+        <p:spPr>
+          <a:xfrm flipH="1" flipV="1">
+            <a:off x="9733935" y="3814916"/>
+            <a:ext cx="1091381" cy="274512"/>
+          </a:xfrm>
+          <a:prstGeom prst="straightConnector1">
+            <a:avLst/>
+          </a:prstGeom>
+          <a:ln>
+            <a:tailEnd type="triangle"/>
+          </a:ln>
+        </p:spPr>
+        <p:style>
+          <a:lnRef idx="1">
+            <a:schemeClr val="accent1"/>
+          </a:lnRef>
+          <a:fillRef idx="0">
+            <a:schemeClr val="accent1"/>
+          </a:fillRef>
+          <a:effectRef idx="0">
+            <a:schemeClr val="accent1"/>
+          </a:effectRef>
+          <a:fontRef idx="minor">
+            <a:schemeClr val="tx1"/>
+          </a:fontRef>
+        </p:style>
+      </p:cxnSp>
+      <p:sp>
+        <p:nvSpPr>
+          <p:cNvPr id="18" name="TextBox 2">
+            <a:extLst>
+              <a:ext uri="{FF2B5EF4-FFF2-40B4-BE49-F238E27FC236}">
+                <a16:creationId xmlns:a16="http://schemas.microsoft.com/office/drawing/2014/main" id="{C72B8A57-2E52-EC55-E307-93E2C3D18BFB}"/>
+              </a:ext>
+            </a:extLst>
+          </p:cNvPr>
+          <p:cNvSpPr txBox="1"/>
+          <p:nvPr/>
+        </p:nvSpPr>
+        <p:spPr>
+          <a:xfrm>
+            <a:off x="10707505" y="4089428"/>
+            <a:ext cx="1556960" cy="276999"/>
+          </a:xfrm>
+          <a:prstGeom prst="rect">
+            <a:avLst/>
+          </a:prstGeom>
+          <a:noFill/>
+        </p:spPr>
+        <p:txBody>
+          <a:bodyPr wrap="square">
+            <a:spAutoFit/>
+          </a:bodyPr>
+          <a:lstStyle/>
+          <a:p>
+            <a:pPr algn="l"/>
+            <a:r>
+              <a:rPr lang="en-GB" sz="1200" dirty="0">
+                <a:solidFill>
+                  <a:schemeClr val="accent2"/>
+                </a:solidFill>
+                <a:latin typeface="Amiri" panose="00000500000000000000" pitchFamily="2" charset="-78"/>
+                <a:ea typeface="Amiri" panose="00000500000000000000" pitchFamily="2" charset="-78"/>
+                <a:cs typeface="Amiri" panose="00000500000000000000" pitchFamily="2" charset="-78"/>
+              </a:rPr>
+              <a:t>a question for later</a:t>
+            </a:r>
+          </a:p>
+        </p:txBody>
+      </p:sp>
     </p:spTree>
     <p:extLst>
       <p:ext uri="{BB962C8B-B14F-4D97-AF65-F5344CB8AC3E}">
-        <p14:creationId xmlns:p14="http://schemas.microsoft.com/office/powerpoint/2010/main" val="3765915467"/>
+        <p14:creationId xmlns:p14="http://schemas.microsoft.com/office/powerpoint/2010/main" val="4037267130"/>
       </p:ext>
     </p:extLst>
   </p:cSld>
@@ -17192,7 +19841,7 @@
                 </a:solidFill>
                 <a:cs typeface="Amiri"/>
               </a:rPr>
-              <a:t>How the index looks like</a:t>
+              <a:t>Some query example to prove it’s working properly</a:t>
             </a:r>
           </a:p>
         </p:txBody>
@@ -17281,10 +19930,140 @@
           </a:p>
         </p:txBody>
       </p:sp>
+      <p:pic>
+        <p:nvPicPr>
+          <p:cNvPr id="6" name="Grafik 5" descr="Ein Bild, das Text, Screenshot, Software, Multimedia-Software enthält.&#10;&#10;Automatisch generierte Beschreibung">
+            <a:extLst>
+              <a:ext uri="{FF2B5EF4-FFF2-40B4-BE49-F238E27FC236}">
+                <a16:creationId xmlns:a16="http://schemas.microsoft.com/office/drawing/2014/main" id="{43ED95F0-5AFB-5503-771C-1D99AAF39028}"/>
+              </a:ext>
+            </a:extLst>
+          </p:cNvPr>
+          <p:cNvPicPr>
+            <a:picLocks noChangeAspect="1"/>
+          </p:cNvPicPr>
+          <p:nvPr/>
+        </p:nvPicPr>
+        <p:blipFill>
+          <a:blip r:embed="rId3"/>
+          <a:stretch>
+            <a:fillRect/>
+          </a:stretch>
+        </p:blipFill>
+        <p:spPr>
+          <a:xfrm>
+            <a:off x="3239665" y="1256106"/>
+            <a:ext cx="8622891" cy="4827063"/>
+          </a:xfrm>
+          <a:prstGeom prst="rect">
+            <a:avLst/>
+          </a:prstGeom>
+          <a:ln w="76200">
+            <a:solidFill>
+              <a:schemeClr val="accent1"/>
+            </a:solidFill>
+          </a:ln>
+        </p:spPr>
+      </p:pic>
+      <p:sp>
+        <p:nvSpPr>
+          <p:cNvPr id="7" name="TextBox 2">
+            <a:extLst>
+              <a:ext uri="{FF2B5EF4-FFF2-40B4-BE49-F238E27FC236}">
+                <a16:creationId xmlns:a16="http://schemas.microsoft.com/office/drawing/2014/main" id="{82F39900-44F8-668F-5DB0-8B2245C64F73}"/>
+              </a:ext>
+            </a:extLst>
+          </p:cNvPr>
+          <p:cNvSpPr txBox="1"/>
+          <p:nvPr/>
+        </p:nvSpPr>
+        <p:spPr>
+          <a:xfrm>
+            <a:off x="919409" y="1256106"/>
+            <a:ext cx="1909080" cy="646331"/>
+          </a:xfrm>
+          <a:prstGeom prst="rect">
+            <a:avLst/>
+          </a:prstGeom>
+          <a:noFill/>
+        </p:spPr>
+        <p:txBody>
+          <a:bodyPr wrap="square">
+            <a:spAutoFit/>
+          </a:bodyPr>
+          <a:lstStyle/>
+          <a:p>
+            <a:pPr algn="r"/>
+            <a:r>
+              <a:rPr lang="en-GB" dirty="0">
+                <a:solidFill>
+                  <a:schemeClr val="accent2"/>
+                </a:solidFill>
+                <a:latin typeface="Amiri" panose="00000500000000000000" pitchFamily="2" charset="-78"/>
+                <a:ea typeface="Amiri" panose="00000500000000000000" pitchFamily="2" charset="-78"/>
+                <a:cs typeface="Amiri" panose="00000500000000000000" pitchFamily="2" charset="-78"/>
+              </a:rPr>
+              <a:t>Many results for “covid”</a:t>
+            </a:r>
+          </a:p>
+        </p:txBody>
+      </p:sp>
+      <p:sp>
+        <p:nvSpPr>
+          <p:cNvPr id="8" name="Oval 7">
+            <a:extLst>
+              <a:ext uri="{FF2B5EF4-FFF2-40B4-BE49-F238E27FC236}">
+                <a16:creationId xmlns:a16="http://schemas.microsoft.com/office/drawing/2014/main" id="{67347F4F-57D3-63BB-12FD-4F637E59747E}"/>
+              </a:ext>
+            </a:extLst>
+          </p:cNvPr>
+          <p:cNvSpPr/>
+          <p:nvPr/>
+        </p:nvSpPr>
+        <p:spPr>
+          <a:xfrm>
+            <a:off x="5014230" y="1882773"/>
+            <a:ext cx="609823" cy="172169"/>
+          </a:xfrm>
+          <a:prstGeom prst="ellipse">
+            <a:avLst/>
+          </a:prstGeom>
+          <a:noFill/>
+          <a:ln>
+            <a:solidFill>
+              <a:schemeClr val="bg1"/>
+            </a:solidFill>
+          </a:ln>
+        </p:spPr>
+        <p:style>
+          <a:lnRef idx="2">
+            <a:schemeClr val="accent1">
+              <a:shade val="15000"/>
+            </a:schemeClr>
+          </a:lnRef>
+          <a:fillRef idx="1">
+            <a:schemeClr val="accent1"/>
+          </a:fillRef>
+          <a:effectRef idx="0">
+            <a:schemeClr val="accent1"/>
+          </a:effectRef>
+          <a:fontRef idx="minor">
+            <a:schemeClr val="lt1"/>
+          </a:fontRef>
+        </p:style>
+        <p:txBody>
+          <a:bodyPr rtlCol="0" anchor="ctr"/>
+          <a:lstStyle/>
+          <a:p>
+            <a:pPr algn="ctr"/>
+            <a:endParaRPr lang="en-GB"/>
+          </a:p>
+        </p:txBody>
+      </p:sp>
     </p:spTree>
     <p:extLst>
       <p:ext uri="{BB962C8B-B14F-4D97-AF65-F5344CB8AC3E}">
-        <p14:creationId xmlns:p14="http://schemas.microsoft.com/office/powerpoint/2010/main" val="4037267130"/>
+        <p14:creationId xmlns:p14="http://schemas.microsoft.com/office/powerpoint/2010/main" val="596605745"/>
       </p:ext>
     </p:extLst>
   </p:cSld>
@@ -17313,79 +20092,10 @@
       </p:grpSpPr>
       <p:sp>
         <p:nvSpPr>
-          <p:cNvPr id="7" name="CasellaDiTesto 6">
+          <p:cNvPr id="4" name="Rettangolo 4">
             <a:extLst>
               <a:ext uri="{FF2B5EF4-FFF2-40B4-BE49-F238E27FC236}">
-                <a16:creationId xmlns:a16="http://schemas.microsoft.com/office/drawing/2014/main" id="{9402257E-7B57-4EC6-99B6-A66E50CCD937}"/>
-              </a:ext>
-            </a:extLst>
-          </p:cNvPr>
-          <p:cNvSpPr txBox="1"/>
-          <p:nvPr/>
-        </p:nvSpPr>
-        <p:spPr>
-          <a:xfrm>
-            <a:off x="4222035" y="495183"/>
-            <a:ext cx="7597750" cy="954107"/>
-          </a:xfrm>
-          <a:prstGeom prst="rect">
-            <a:avLst/>
-          </a:prstGeom>
-          <a:noFill/>
-        </p:spPr>
-        <p:txBody>
-          <a:bodyPr rot="0" spcFirstLastPara="0" vertOverflow="overflow" horzOverflow="overflow" vert="horz" wrap="square" lIns="91440" tIns="45720" rIns="91440" bIns="45720" numCol="1" spcCol="0" rtlCol="0" fromWordArt="0" anchor="t" anchorCtr="0" forceAA="0" compatLnSpc="1">
-            <a:prstTxWarp prst="textNoShape">
-              <a:avLst/>
-            </a:prstTxWarp>
-            <a:spAutoFit/>
-          </a:bodyPr>
-          <a:lstStyle/>
-          <a:p>
-            <a:r>
-              <a:rPr lang="en-GB" sz="2800" b="1" dirty="0">
-                <a:solidFill>
-                  <a:schemeClr val="accent2"/>
-                </a:solidFill>
-                <a:cs typeface="Amiri"/>
-              </a:rPr>
-              <a:t>Embeddings: </a:t>
-            </a:r>
-          </a:p>
-          <a:p>
-            <a:r>
-              <a:rPr lang="en-GB" sz="2800" b="1" dirty="0">
-                <a:solidFill>
-                  <a:schemeClr val="accent2"/>
-                </a:solidFill>
-                <a:cs typeface="Amiri"/>
-              </a:rPr>
-              <a:t>1) </a:t>
-            </a:r>
-            <a:r>
-              <a:rPr lang="en-GB" sz="2800" b="1" dirty="0" err="1">
-                <a:solidFill>
-                  <a:schemeClr val="accent2"/>
-                </a:solidFill>
-                <a:cs typeface="Amiri"/>
-              </a:rPr>
-              <a:t>BioBERT</a:t>
-            </a:r>
-            <a:endParaRPr lang="en-GB" sz="2800" b="1" i="1" dirty="0">
-              <a:solidFill>
-                <a:schemeClr val="accent2"/>
-              </a:solidFill>
-              <a:cs typeface="Amiri"/>
-            </a:endParaRPr>
-          </a:p>
-        </p:txBody>
-      </p:sp>
-      <p:sp>
-        <p:nvSpPr>
-          <p:cNvPr id="8" name="Rettangolo 4">
-            <a:extLst>
-              <a:ext uri="{FF2B5EF4-FFF2-40B4-BE49-F238E27FC236}">
-                <a16:creationId xmlns:a16="http://schemas.microsoft.com/office/drawing/2014/main" id="{83A85DDA-E48A-895F-2601-36FF8C9BBF71}"/>
+                <a16:creationId xmlns:a16="http://schemas.microsoft.com/office/drawing/2014/main" id="{FCDD8295-0CBB-4C6C-B18F-83BB6233E986}"/>
               </a:ext>
             </a:extLst>
           </p:cNvPr>
@@ -17394,8 +20104,8 @@
         </p:nvSpPr>
         <p:spPr>
           <a:xfrm>
-            <a:off x="376750" y="498176"/>
-            <a:ext cx="3249688" cy="5515429"/>
+            <a:off x="-343149" y="454308"/>
+            <a:ext cx="851383" cy="5515429"/>
           </a:xfrm>
           <a:prstGeom prst="rect">
             <a:avLst/>
@@ -17424,143 +20134,65 @@
                 <a:spcPct val="150000"/>
               </a:lnSpc>
             </a:pPr>
-            <a:r>
-              <a:rPr lang="en-GB" sz="2000" u="sng" dirty="0">
-                <a:latin typeface="Verdana"/>
-                <a:ea typeface="Verdana"/>
-              </a:rPr>
-              <a:t>Index</a:t>
-            </a:r>
-            <a:endParaRPr lang="en-GB" sz="2000" dirty="0">
-              <a:latin typeface="Verdana"/>
-              <a:ea typeface="Verdana"/>
+            <a:endParaRPr lang="en-GB" sz="2000">
+              <a:solidFill>
+                <a:srgbClr val="FFFFFF"/>
+              </a:solidFill>
+              <a:cs typeface="Calibri"/>
             </a:endParaRPr>
           </a:p>
           <a:p>
-            <a:pPr marL="534670" indent="-260350">
-              <a:lnSpc>
-                <a:spcPct val="150000"/>
-              </a:lnSpc>
-            </a:pPr>
-            <a:endParaRPr lang="en-GB" sz="2000" dirty="0">
-              <a:cs typeface="Calibri" panose="020F0502020204030204"/>
-            </a:endParaRPr>
-          </a:p>
-          <a:p>
-            <a:pPr marL="534670" indent="-260350">
+            <a:pPr marL="285750" indent="-285750">
               <a:lnSpc>
                 <a:spcPct val="150000"/>
               </a:lnSpc>
               <a:buFont typeface="Arial" panose="020B0604020202020204" pitchFamily="34" charset="0"/>
               <a:buChar char="•"/>
             </a:pPr>
-            <a:r>
-              <a:rPr lang="en-GB" sz="2000" dirty="0">
+            <a:endParaRPr lang="en-GB" sz="2000"/>
+          </a:p>
+        </p:txBody>
+      </p:sp>
+      <p:sp>
+        <p:nvSpPr>
+          <p:cNvPr id="5" name="CasellaDiTesto 1">
+            <a:extLst>
+              <a:ext uri="{FF2B5EF4-FFF2-40B4-BE49-F238E27FC236}">
+                <a16:creationId xmlns:a16="http://schemas.microsoft.com/office/drawing/2014/main" id="{C95A19C8-8308-645B-35D1-F3852392CC09}"/>
+              </a:ext>
+            </a:extLst>
+          </p:cNvPr>
+          <p:cNvSpPr txBox="1"/>
+          <p:nvPr/>
+        </p:nvSpPr>
+        <p:spPr>
+          <a:xfrm>
+            <a:off x="912778" y="454308"/>
+            <a:ext cx="9305279" cy="523220"/>
+          </a:xfrm>
+          <a:prstGeom prst="rect">
+            <a:avLst/>
+          </a:prstGeom>
+          <a:noFill/>
+        </p:spPr>
+        <p:txBody>
+          <a:bodyPr rot="0" spcFirstLastPara="0" vertOverflow="overflow" horzOverflow="overflow" vert="horz" wrap="square" lIns="91440" tIns="45720" rIns="91440" bIns="45720" numCol="1" spcCol="0" rtlCol="0" fromWordArt="0" anchor="t" anchorCtr="0" forceAA="0" compatLnSpc="1">
+            <a:prstTxWarp prst="textNoShape">
+              <a:avLst/>
+            </a:prstTxWarp>
+            <a:spAutoFit/>
+          </a:bodyPr>
+          <a:lstStyle/>
+          <a:p>
+            <a:r>
+              <a:rPr lang="en-GB" sz="2800" b="1" dirty="0">
                 <a:solidFill>
-                  <a:schemeClr val="accent1">
-                    <a:lumMod val="60000"/>
-                    <a:lumOff val="40000"/>
-                  </a:schemeClr>
+                  <a:schemeClr val="accent2"/>
                 </a:solidFill>
-              </a:rPr>
-              <a:t>Dataset download and pre-processing</a:t>
-            </a:r>
-          </a:p>
-          <a:p>
-            <a:pPr marL="534670" indent="-260350">
-              <a:lnSpc>
-                <a:spcPct val="150000"/>
-              </a:lnSpc>
-              <a:buFont typeface="Arial" panose="020B0604020202020204" pitchFamily="34" charset="0"/>
-              <a:buChar char="•"/>
-            </a:pPr>
-            <a:r>
-              <a:rPr lang="en-GB" sz="2000" dirty="0">
-                <a:solidFill>
-                  <a:schemeClr val="accent1">
-                    <a:lumMod val="60000"/>
-                    <a:lumOff val="40000"/>
-                  </a:schemeClr>
-                </a:solidFill>
-              </a:rPr>
-              <a:t>Documents’ database</a:t>
-            </a:r>
-          </a:p>
-          <a:p>
-            <a:pPr marL="534670" indent="-260350">
-              <a:lnSpc>
-                <a:spcPct val="150000"/>
-              </a:lnSpc>
-              <a:buFont typeface="Arial" panose="020B0604020202020204" pitchFamily="34" charset="0"/>
-              <a:buChar char="•"/>
-            </a:pPr>
-            <a:r>
-              <a:rPr lang="en-GB" sz="2000" dirty="0">
-                <a:solidFill>
-                  <a:schemeClr val="bg1"/>
-                </a:solidFill>
-                <a:cs typeface="Calibri"/>
-              </a:rPr>
-              <a:t>Embeddings</a:t>
-            </a:r>
-          </a:p>
-          <a:p>
-            <a:pPr marL="534670" indent="-260350">
-              <a:lnSpc>
-                <a:spcPct val="150000"/>
-              </a:lnSpc>
-              <a:buFont typeface="Arial" panose="020B0604020202020204" pitchFamily="34" charset="0"/>
-              <a:buChar char="•"/>
-            </a:pPr>
-            <a:r>
-              <a:rPr lang="en-GB" sz="2000" dirty="0">
-                <a:solidFill>
-                  <a:schemeClr val="accent1">
-                    <a:lumMod val="60000"/>
-                    <a:lumOff val="40000"/>
-                  </a:schemeClr>
-                </a:solidFill>
-              </a:rPr>
-              <a:t>Vector database</a:t>
-            </a:r>
-            <a:endParaRPr lang="en-GB" sz="2000" dirty="0">
-              <a:solidFill>
-                <a:schemeClr val="accent1">
-                  <a:lumMod val="60000"/>
-                  <a:lumOff val="40000"/>
-                </a:schemeClr>
-              </a:solidFill>
-              <a:cs typeface="Calibri" panose="020F0502020204030204"/>
-            </a:endParaRPr>
-          </a:p>
-          <a:p>
-            <a:pPr marL="534670" indent="-260350">
-              <a:lnSpc>
-                <a:spcPct val="150000"/>
-              </a:lnSpc>
-              <a:buFont typeface="Arial" panose="020B0604020202020204" pitchFamily="34" charset="0"/>
-              <a:buChar char="•"/>
-            </a:pPr>
-            <a:r>
-              <a:rPr lang="en-GB" sz="2000" dirty="0">
-                <a:solidFill>
-                  <a:schemeClr val="accent1">
-                    <a:lumMod val="60000"/>
-                    <a:lumOff val="40000"/>
-                  </a:schemeClr>
-                </a:solidFill>
-              </a:rPr>
-              <a:t>Ongoing and upcoming steps</a:t>
-            </a:r>
-            <a:endParaRPr lang="en-GB" sz="2000" dirty="0">
-              <a:solidFill>
-                <a:schemeClr val="accent1">
-                  <a:lumMod val="60000"/>
-                  <a:lumOff val="40000"/>
-                </a:schemeClr>
-              </a:solidFill>
-              <a:cs typeface="Calibri" panose="020F0502020204030204"/>
-            </a:endParaRPr>
+                <a:cs typeface="Amiri"/>
+              </a:rPr>
+              <a:t>Some query example to prove it’s working properly</a:t>
+            </a:r>
           </a:p>
         </p:txBody>
       </p:sp>
@@ -17569,7 +20201,7 @@
           <p:cNvPr id="2" name="CasellaDiTesto 1">
             <a:extLst>
               <a:ext uri="{FF2B5EF4-FFF2-40B4-BE49-F238E27FC236}">
-                <a16:creationId xmlns:a16="http://schemas.microsoft.com/office/drawing/2014/main" id="{6AA15AAD-AA64-943C-A4EE-F6AF73B6F501}"/>
+                <a16:creationId xmlns:a16="http://schemas.microsoft.com/office/drawing/2014/main" id="{1F8AF9EB-6392-D2B7-C526-E8B4D6C836CC}"/>
               </a:ext>
             </a:extLst>
           </p:cNvPr>
@@ -17650,10 +20282,10 @@
       </p:sp>
       <p:sp>
         <p:nvSpPr>
-          <p:cNvPr id="3" name="Textfeld 5">
+          <p:cNvPr id="7" name="TextBox 2">
             <a:extLst>
               <a:ext uri="{FF2B5EF4-FFF2-40B4-BE49-F238E27FC236}">
-                <a16:creationId xmlns:a16="http://schemas.microsoft.com/office/drawing/2014/main" id="{8009F741-D801-DB89-0D41-FE28E9BDC586}"/>
+                <a16:creationId xmlns:a16="http://schemas.microsoft.com/office/drawing/2014/main" id="{82F39900-44F8-668F-5DB0-8B2245C64F73}"/>
               </a:ext>
             </a:extLst>
           </p:cNvPr>
@@ -17662,8 +20294,8 @@
         </p:nvSpPr>
         <p:spPr>
           <a:xfrm>
-            <a:off x="4377382" y="1318123"/>
-            <a:ext cx="7597750" cy="1703030"/>
+            <a:off x="648929" y="1256106"/>
+            <a:ext cx="2179560" cy="923330"/>
           </a:xfrm>
           <a:prstGeom prst="rect">
             <a:avLst/>
@@ -17671,18 +20303,12 @@
           <a:noFill/>
         </p:spPr>
         <p:txBody>
-          <a:bodyPr wrap="square" rtlCol="0">
+          <a:bodyPr wrap="square">
             <a:spAutoFit/>
           </a:bodyPr>
           <a:lstStyle/>
           <a:p>
-            <a:pPr marL="285750" indent="-285750">
-              <a:lnSpc>
-                <a:spcPct val="150000"/>
-              </a:lnSpc>
-              <a:buFont typeface="Arial" panose="020B0604020202020204" pitchFamily="34" charset="0"/>
-              <a:buChar char="•"/>
-            </a:pPr>
+            <a:pPr algn="r"/>
             <a:r>
               <a:rPr lang="en-GB" dirty="0">
                 <a:solidFill>
@@ -17692,7 +20318,98 @@
                 <a:ea typeface="Amiri" panose="00000500000000000000" pitchFamily="2" charset="-78"/>
                 <a:cs typeface="Amiri" panose="00000500000000000000" pitchFamily="2" charset="-78"/>
               </a:rPr>
-              <a:t>domain-specific adaptation of BERT model, pre-</a:t>
+              <a:t>Something more elaborated:</a:t>
+            </a:r>
+          </a:p>
+          <a:p>
+            <a:pPr algn="r"/>
+            <a:r>
+              <a:rPr lang="en-GB" dirty="0">
+                <a:solidFill>
+                  <a:schemeClr val="accent2"/>
+                </a:solidFill>
+                <a:latin typeface="Amiri" panose="00000500000000000000" pitchFamily="2" charset="-78"/>
+                <a:ea typeface="Amiri" panose="00000500000000000000" pitchFamily="2" charset="-78"/>
+                <a:cs typeface="Amiri" panose="00000500000000000000" pitchFamily="2" charset="-78"/>
+              </a:rPr>
+              <a:t>a Boolean search</a:t>
+            </a:r>
+          </a:p>
+        </p:txBody>
+      </p:sp>
+      <p:pic>
+        <p:nvPicPr>
+          <p:cNvPr id="8" name="Grafik 7" descr="Ein Bild, das Text, Screenshot, Schrift enthält.&#10;&#10;Automatisch generierte Beschreibung">
+            <a:extLst>
+              <a:ext uri="{FF2B5EF4-FFF2-40B4-BE49-F238E27FC236}">
+                <a16:creationId xmlns:a16="http://schemas.microsoft.com/office/drawing/2014/main" id="{C9F9BA84-D8F6-8913-4DAF-C8A7DC10B07A}"/>
+              </a:ext>
+            </a:extLst>
+          </p:cNvPr>
+          <p:cNvPicPr>
+            <a:picLocks noChangeAspect="1"/>
+          </p:cNvPicPr>
+          <p:nvPr/>
+        </p:nvPicPr>
+        <p:blipFill>
+          <a:blip r:embed="rId3"/>
+          <a:stretch>
+            <a:fillRect/>
+          </a:stretch>
+        </p:blipFill>
+        <p:spPr>
+          <a:xfrm>
+            <a:off x="3473962" y="1256106"/>
+            <a:ext cx="5244076" cy="4718574"/>
+          </a:xfrm>
+          <a:prstGeom prst="rect">
+            <a:avLst/>
+          </a:prstGeom>
+          <a:ln w="76200">
+            <a:solidFill>
+              <a:schemeClr val="accent1"/>
+            </a:solidFill>
+          </a:ln>
+        </p:spPr>
+      </p:pic>
+      <p:sp>
+        <p:nvSpPr>
+          <p:cNvPr id="10" name="Textfeld 9">
+            <a:extLst>
+              <a:ext uri="{FF2B5EF4-FFF2-40B4-BE49-F238E27FC236}">
+                <a16:creationId xmlns:a16="http://schemas.microsoft.com/office/drawing/2014/main" id="{CDD0F481-05FE-80CD-39C5-0A35643E56E3}"/>
+              </a:ext>
+            </a:extLst>
+          </p:cNvPr>
+          <p:cNvSpPr txBox="1"/>
+          <p:nvPr/>
+        </p:nvSpPr>
+        <p:spPr>
+          <a:xfrm>
+            <a:off x="8956657" y="4769408"/>
+            <a:ext cx="3136490" cy="1200329"/>
+          </a:xfrm>
+          <a:prstGeom prst="rect">
+            <a:avLst/>
+          </a:prstGeom>
+          <a:noFill/>
+        </p:spPr>
+        <p:txBody>
+          <a:bodyPr wrap="square">
+            <a:spAutoFit/>
+          </a:bodyPr>
+          <a:lstStyle/>
+          <a:p>
+            <a:r>
+              <a:rPr lang="en-GB" dirty="0">
+                <a:solidFill>
+                  <a:schemeClr val="accent2"/>
+                </a:solidFill>
+                <a:latin typeface="Amiri" panose="00000500000000000000" pitchFamily="2" charset="-78"/>
+                <a:ea typeface="Amiri" panose="00000500000000000000" pitchFamily="2" charset="-78"/>
+                <a:cs typeface="Amiri" panose="00000500000000000000" pitchFamily="2" charset="-78"/>
+              </a:rPr>
+              <a:t>No mentions for covid in 2015!</a:t>
             </a:r>
             <a:br>
               <a:rPr lang="en-GB" dirty="0">
@@ -17713,271 +20430,144 @@
                 <a:ea typeface="Amiri" panose="00000500000000000000" pitchFamily="2" charset="-78"/>
                 <a:cs typeface="Amiri" panose="00000500000000000000" pitchFamily="2" charset="-78"/>
               </a:rPr>
-              <a:t>trained on large-scale PubMed corpus</a:t>
-            </a:r>
-          </a:p>
-          <a:p>
-            <a:pPr marL="285750" indent="-285750">
-              <a:lnSpc>
-                <a:spcPct val="150000"/>
-              </a:lnSpc>
-              <a:buFont typeface="Arial" panose="020B0604020202020204" pitchFamily="34" charset="0"/>
-              <a:buChar char="•"/>
-            </a:pPr>
-            <a:r>
-              <a:rPr lang="en-GB" dirty="0">
-                <a:solidFill>
-                  <a:schemeClr val="accent2"/>
-                </a:solidFill>
-                <a:latin typeface="Amiri" panose="00000500000000000000" pitchFamily="2" charset="-78"/>
-                <a:ea typeface="Amiri" panose="00000500000000000000" pitchFamily="2" charset="-78"/>
-                <a:cs typeface="Amiri" panose="00000500000000000000" pitchFamily="2" charset="-78"/>
-              </a:rPr>
-              <a:t>capture the context and semantics of biomedical texts</a:t>
-            </a:r>
-          </a:p>
-          <a:p>
-            <a:pPr marL="285750" indent="-285750">
-              <a:lnSpc>
-                <a:spcPct val="150000"/>
-              </a:lnSpc>
-              <a:buFont typeface="Arial" panose="020B0604020202020204" pitchFamily="34" charset="0"/>
-              <a:buChar char="•"/>
-            </a:pPr>
-            <a:r>
-              <a:rPr lang="en-GB" dirty="0">
-                <a:solidFill>
-                  <a:schemeClr val="accent2"/>
-                </a:solidFill>
-                <a:latin typeface="Amiri" panose="00000500000000000000" pitchFamily="2" charset="-78"/>
-                <a:ea typeface="Amiri" panose="00000500000000000000" pitchFamily="2" charset="-78"/>
-                <a:cs typeface="Amiri" panose="00000500000000000000" pitchFamily="2" charset="-78"/>
-              </a:rPr>
-              <a:t>used pre-trained version</a:t>
-            </a:r>
-          </a:p>
-        </p:txBody>
-      </p:sp>
-      <p:sp>
-        <p:nvSpPr>
-          <p:cNvPr id="4" name="Textfeld 5">
-            <a:extLst>
-              <a:ext uri="{FF2B5EF4-FFF2-40B4-BE49-F238E27FC236}">
-                <a16:creationId xmlns:a16="http://schemas.microsoft.com/office/drawing/2014/main" id="{8BA961DA-666B-BF2C-6C94-BE75085C754D}"/>
-              </a:ext>
-            </a:extLst>
-          </p:cNvPr>
-          <p:cNvSpPr txBox="1"/>
-          <p:nvPr/>
-        </p:nvSpPr>
-        <p:spPr>
-          <a:xfrm>
-            <a:off x="4377382" y="3322248"/>
-            <a:ext cx="7597750" cy="456535"/>
-          </a:xfrm>
-          <a:prstGeom prst="rect">
-            <a:avLst/>
-          </a:prstGeom>
-          <a:noFill/>
-        </p:spPr>
-        <p:txBody>
-          <a:bodyPr wrap="square" rtlCol="0">
-            <a:spAutoFit/>
-          </a:bodyPr>
-          <a:lstStyle/>
-          <a:p>
-            <a:pPr marL="285750" indent="-285750">
-              <a:lnSpc>
-                <a:spcPct val="150000"/>
-              </a:lnSpc>
-              <a:buFont typeface="Arial" panose="020B0604020202020204" pitchFamily="34" charset="0"/>
-              <a:buChar char="•"/>
-            </a:pPr>
-            <a:r>
-              <a:rPr lang="en-GB" dirty="0">
-                <a:solidFill>
-                  <a:schemeClr val="accent2"/>
-                </a:solidFill>
-                <a:latin typeface="Amiri" panose="00000500000000000000" pitchFamily="2" charset="-78"/>
-                <a:ea typeface="Amiri" panose="00000500000000000000" pitchFamily="2" charset="-78"/>
-                <a:cs typeface="Amiri" panose="00000500000000000000" pitchFamily="2" charset="-78"/>
-              </a:rPr>
-              <a:t>To-Do: fine-tune on own data?</a:t>
-            </a:r>
-          </a:p>
-        </p:txBody>
-      </p:sp>
-      <p:sp>
-        <p:nvSpPr>
-          <p:cNvPr id="6" name="CasellaDiTesto 6">
-            <a:extLst>
-              <a:ext uri="{FF2B5EF4-FFF2-40B4-BE49-F238E27FC236}">
-                <a16:creationId xmlns:a16="http://schemas.microsoft.com/office/drawing/2014/main" id="{4403256D-D5DE-4BB8-FE9F-01BC28082B63}"/>
-              </a:ext>
-            </a:extLst>
-          </p:cNvPr>
-          <p:cNvSpPr txBox="1"/>
-          <p:nvPr/>
-        </p:nvSpPr>
-        <p:spPr>
-          <a:xfrm>
-            <a:off x="4377382" y="4046513"/>
-            <a:ext cx="7597750" cy="523220"/>
-          </a:xfrm>
-          <a:prstGeom prst="rect">
-            <a:avLst/>
-          </a:prstGeom>
-          <a:noFill/>
-        </p:spPr>
-        <p:txBody>
-          <a:bodyPr rot="0" spcFirstLastPara="0" vertOverflow="overflow" horzOverflow="overflow" vert="horz" wrap="square" lIns="91440" tIns="45720" rIns="91440" bIns="45720" numCol="1" spcCol="0" rtlCol="0" fromWordArt="0" anchor="t" anchorCtr="0" forceAA="0" compatLnSpc="1">
-            <a:prstTxWarp prst="textNoShape">
-              <a:avLst/>
-            </a:prstTxWarp>
-            <a:spAutoFit/>
-          </a:bodyPr>
-          <a:lstStyle/>
-          <a:p>
-            <a:r>
-              <a:rPr lang="en-GB" sz="2800" b="1" dirty="0">
-                <a:solidFill>
-                  <a:schemeClr val="accent2"/>
-                </a:solidFill>
-                <a:cs typeface="Amiri"/>
-              </a:rPr>
-              <a:t>2) To-Do: Embedding-Pipeline</a:t>
-            </a:r>
-            <a:endParaRPr lang="en-GB" sz="2800" b="1" i="1" dirty="0">
-              <a:solidFill>
-                <a:schemeClr val="accent2"/>
-              </a:solidFill>
-              <a:cs typeface="Amiri"/>
-            </a:endParaRPr>
-          </a:p>
-        </p:txBody>
-      </p:sp>
-      <p:sp>
-        <p:nvSpPr>
-          <p:cNvPr id="9" name="Textfeld 5">
-            <a:extLst>
-              <a:ext uri="{FF2B5EF4-FFF2-40B4-BE49-F238E27FC236}">
-                <a16:creationId xmlns:a16="http://schemas.microsoft.com/office/drawing/2014/main" id="{FF3FAABA-610A-6334-00E8-91128EC32770}"/>
-              </a:ext>
-            </a:extLst>
-          </p:cNvPr>
-          <p:cNvSpPr txBox="1"/>
-          <p:nvPr/>
-        </p:nvSpPr>
-        <p:spPr>
-          <a:xfrm>
-            <a:off x="4377382" y="4688477"/>
-            <a:ext cx="7597750" cy="1703030"/>
-          </a:xfrm>
-          <a:prstGeom prst="rect">
-            <a:avLst/>
-          </a:prstGeom>
-          <a:noFill/>
-        </p:spPr>
-        <p:txBody>
-          <a:bodyPr wrap="square" rtlCol="0">
-            <a:spAutoFit/>
-          </a:bodyPr>
-          <a:lstStyle/>
-          <a:p>
-            <a:pPr marL="285750" indent="-285750">
-              <a:lnSpc>
-                <a:spcPct val="150000"/>
-              </a:lnSpc>
-              <a:buFont typeface="Arial" panose="020B0604020202020204" pitchFamily="34" charset="0"/>
-              <a:buChar char="•"/>
-            </a:pPr>
-            <a:r>
-              <a:rPr lang="en-GB" dirty="0">
-                <a:solidFill>
-                  <a:schemeClr val="accent2"/>
-                </a:solidFill>
-                <a:latin typeface="Amiri" panose="00000500000000000000" pitchFamily="2" charset="-78"/>
-                <a:ea typeface="Amiri" panose="00000500000000000000" pitchFamily="2" charset="-78"/>
-                <a:cs typeface="Amiri" panose="00000500000000000000" pitchFamily="2" charset="-78"/>
-              </a:rPr>
-              <a:t>test different embedding models, e.g. </a:t>
-            </a:r>
-            <a:r>
-              <a:rPr lang="en-GB" i="1" dirty="0">
-                <a:solidFill>
-                  <a:schemeClr val="accent2"/>
-                </a:solidFill>
-                <a:latin typeface="Amiri" panose="00000500000000000000" pitchFamily="2" charset="-78"/>
-                <a:ea typeface="Amiri" panose="00000500000000000000" pitchFamily="2" charset="-78"/>
-                <a:cs typeface="Amiri" panose="00000500000000000000" pitchFamily="2" charset="-78"/>
-              </a:rPr>
-              <a:t>SGPT-5.8B-msmarco</a:t>
-            </a:r>
-            <a:r>
-              <a:rPr lang="en-GB" dirty="0">
-                <a:solidFill>
-                  <a:schemeClr val="accent2"/>
-                </a:solidFill>
-                <a:latin typeface="Amiri" panose="00000500000000000000" pitchFamily="2" charset="-78"/>
-                <a:ea typeface="Amiri" panose="00000500000000000000" pitchFamily="2" charset="-78"/>
-                <a:cs typeface="Amiri" panose="00000500000000000000" pitchFamily="2" charset="-78"/>
-              </a:rPr>
-              <a:t> (best results for semantic retrieval, see </a:t>
-            </a:r>
-            <a:r>
-              <a:rPr lang="en-GB" dirty="0">
-                <a:solidFill>
-                  <a:schemeClr val="accent2"/>
-                </a:solidFill>
-                <a:latin typeface="Amiri" panose="00000500000000000000" pitchFamily="2" charset="-78"/>
-                <a:ea typeface="Amiri" panose="00000500000000000000" pitchFamily="2" charset="-78"/>
-                <a:cs typeface="Amiri" panose="00000500000000000000" pitchFamily="2" charset="-78"/>
-                <a:hlinkClick r:id="rId3" tooltip="MTEB: Massive Text Embedding Benchmark"/>
-              </a:rPr>
-              <a:t>MTEB: Massive Text Embedding Benchmark</a:t>
-            </a:r>
-            <a:r>
-              <a:rPr lang="en-GB" dirty="0">
-                <a:solidFill>
-                  <a:schemeClr val="accent2"/>
-                </a:solidFill>
-                <a:latin typeface="Amiri" panose="00000500000000000000" pitchFamily="2" charset="-78"/>
-                <a:ea typeface="Amiri" panose="00000500000000000000" pitchFamily="2" charset="-78"/>
-                <a:cs typeface="Amiri" panose="00000500000000000000" pitchFamily="2" charset="-78"/>
-              </a:rPr>
-              <a:t>)</a:t>
-            </a:r>
-            <a:br>
-              <a:rPr lang="en-GB" dirty="0">
-                <a:solidFill>
-                  <a:schemeClr val="accent2"/>
-                </a:solidFill>
-                <a:latin typeface="Amiri" panose="00000500000000000000" pitchFamily="2" charset="-78"/>
-                <a:ea typeface="Amiri" panose="00000500000000000000" pitchFamily="2" charset="-78"/>
-                <a:cs typeface="Amiri" panose="00000500000000000000" pitchFamily="2" charset="-78"/>
-              </a:rPr>
-            </a:br>
-            <a:endParaRPr lang="en-GB" dirty="0">
-              <a:solidFill>
-                <a:schemeClr val="accent2"/>
-              </a:solidFill>
-              <a:latin typeface="Amiri" panose="00000500000000000000" pitchFamily="2" charset="-78"/>
-              <a:ea typeface="Amiri" panose="00000500000000000000" pitchFamily="2" charset="-78"/>
-              <a:cs typeface="Amiri" panose="00000500000000000000" pitchFamily="2" charset="-78"/>
-            </a:endParaRPr>
+              <a:t>Didn’t anyone write about it before the pandemic??</a:t>
+            </a:r>
           </a:p>
         </p:txBody>
       </p:sp>
     </p:spTree>
     <p:extLst>
       <p:ext uri="{BB962C8B-B14F-4D97-AF65-F5344CB8AC3E}">
-        <p14:creationId xmlns:p14="http://schemas.microsoft.com/office/powerpoint/2010/main" val="120647077"/>
+        <p14:creationId xmlns:p14="http://schemas.microsoft.com/office/powerpoint/2010/main" val="2670311090"/>
       </p:ext>
     </p:extLst>
   </p:cSld>
   <p:clrMapOvr>
     <a:masterClrMapping/>
   </p:clrMapOvr>
+  <p:timing>
+    <p:tnLst>
+      <p:par>
+        <p:cTn id="1" dur="indefinite" restart="never" nodeType="tmRoot">
+          <p:childTnLst>
+            <p:seq concurrent="1" nextAc="seek">
+              <p:cTn id="2" dur="indefinite" nodeType="mainSeq">
+                <p:childTnLst>
+                  <p:par>
+                    <p:cTn id="3" fill="hold">
+                      <p:stCondLst>
+                        <p:cond delay="indefinite"/>
+                      </p:stCondLst>
+                      <p:childTnLst>
+                        <p:par>
+                          <p:cTn id="4" fill="hold">
+                            <p:stCondLst>
+                              <p:cond delay="0"/>
+                            </p:stCondLst>
+                            <p:childTnLst>
+                              <p:par>
+                                <p:cTn id="5" presetID="1" presetClass="entr" presetSubtype="0" fill="hold" nodeType="clickEffect">
+                                  <p:stCondLst>
+                                    <p:cond delay="0"/>
+                                  </p:stCondLst>
+                                  <p:childTnLst>
+                                    <p:set>
+                                      <p:cBhvr>
+                                        <p:cTn id="6" dur="1" fill="hold">
+                                          <p:stCondLst>
+                                            <p:cond delay="0"/>
+                                          </p:stCondLst>
+                                        </p:cTn>
+                                        <p:tgtEl>
+                                          <p:spTgt spid="8"/>
+                                        </p:tgtEl>
+                                        <p:attrNameLst>
+                                          <p:attrName>style.visibility</p:attrName>
+                                        </p:attrNameLst>
+                                      </p:cBhvr>
+                                      <p:to>
+                                        <p:strVal val="visible"/>
+                                      </p:to>
+                                    </p:set>
+                                  </p:childTnLst>
+                                </p:cTn>
+                              </p:par>
+                            </p:childTnLst>
+                          </p:cTn>
+                        </p:par>
+                      </p:childTnLst>
+                    </p:cTn>
+                  </p:par>
+                  <p:par>
+                    <p:cTn id="7" fill="hold">
+                      <p:stCondLst>
+                        <p:cond delay="indefinite"/>
+                      </p:stCondLst>
+                      <p:childTnLst>
+                        <p:par>
+                          <p:cTn id="8" fill="hold">
+                            <p:stCondLst>
+                              <p:cond delay="0"/>
+                            </p:stCondLst>
+                            <p:childTnLst>
+                              <p:par>
+                                <p:cTn id="9" presetID="1" presetClass="entr" presetSubtype="0" fill="hold" grpId="0" nodeType="clickEffect">
+                                  <p:stCondLst>
+                                    <p:cond delay="0"/>
+                                  </p:stCondLst>
+                                  <p:childTnLst>
+                                    <p:set>
+                                      <p:cBhvr>
+                                        <p:cTn id="10" dur="1" fill="hold">
+                                          <p:stCondLst>
+                                            <p:cond delay="0"/>
+                                          </p:stCondLst>
+                                        </p:cTn>
+                                        <p:tgtEl>
+                                          <p:spTgt spid="10"/>
+                                        </p:tgtEl>
+                                        <p:attrNameLst>
+                                          <p:attrName>style.visibility</p:attrName>
+                                        </p:attrNameLst>
+                                      </p:cBhvr>
+                                      <p:to>
+                                        <p:strVal val="visible"/>
+                                      </p:to>
+                                    </p:set>
+                                  </p:childTnLst>
+                                </p:cTn>
+                              </p:par>
+                            </p:childTnLst>
+                          </p:cTn>
+                        </p:par>
+                      </p:childTnLst>
+                    </p:cTn>
+                  </p:par>
+                </p:childTnLst>
+              </p:cTn>
+              <p:prevCondLst>
+                <p:cond evt="onPrev" delay="0">
+                  <p:tgtEl>
+                    <p:sldTgt/>
+                  </p:tgtEl>
+                </p:cond>
+              </p:prevCondLst>
+              <p:nextCondLst>
+                <p:cond evt="onNext" delay="0">
+                  <p:tgtEl>
+                    <p:sldTgt/>
+                  </p:tgtEl>
+                </p:cond>
+              </p:nextCondLst>
+            </p:seq>
+          </p:childTnLst>
+        </p:cTn>
+      </p:par>
+    </p:tnLst>
+    <p:bldLst>
+      <p:bldP spid="10" grpId="0"/>
+    </p:bldLst>
+  </p:timing>
 </p:sld>
 </file>
 

</xml_diff>